<commit_message>
added shortest path section
</commit_message>
<xml_diff>
--- a/graphAlgorithms/shortPaths.pptx
+++ b/graphAlgorithms/shortPaths.pptx
@@ -147,6 +147,36 @@
       </a:defRPr>
     </a:lvl9pPr>
   </p:defaultTextStyle>
+  <p:extLst>
+    <p:ext uri="{EFAFB233-063F-42B5-8137-9DF3F51BA10A}">
+      <p15:sldGuideLst xmlns:p15="http://schemas.microsoft.com/office/powerpoint/2012/main">
+        <p15:guide id="1" orient="horz" pos="2160">
+          <p15:clr>
+            <a:srgbClr val="A4A3A4"/>
+          </p15:clr>
+        </p15:guide>
+        <p15:guide id="2" pos="2880">
+          <p15:clr>
+            <a:srgbClr val="A4A3A4"/>
+          </p15:clr>
+        </p15:guide>
+      </p15:sldGuideLst>
+    </p:ext>
+    <p:ext uri="{2D200454-40CA-4A62-9FC3-DE9A4176ACB9}">
+      <p15:notesGuideLst xmlns:p15="http://schemas.microsoft.com/office/powerpoint/2012/main">
+        <p15:guide id="1" orient="horz" pos="2924">
+          <p15:clr>
+            <a:srgbClr val="A4A3A4"/>
+          </p15:clr>
+        </p15:guide>
+        <p15:guide id="2" pos="2200">
+          <p15:clr>
+            <a:srgbClr val="A4A3A4"/>
+          </p15:clr>
+        </p15:guide>
+      </p15:notesGuideLst>
+    </p:ext>
+  </p:extLst>
 </p:presentation>
 </file>
 
@@ -662,35 +692,35 @@
           <a:p>
             <a:pPr lvl="0"/>
             <a:r>
-              <a:rPr lang="en-US" noProof="0" smtClean="0"/>
+              <a:rPr lang="en-US" noProof="0"/>
               <a:t>Click to edit Master notes styles</a:t>
             </a:r>
           </a:p>
           <a:p>
             <a:pPr lvl="1"/>
             <a:r>
-              <a:rPr lang="en-US" noProof="0" smtClean="0"/>
+              <a:rPr lang="en-US" noProof="0"/>
               <a:t>Second Level</a:t>
             </a:r>
           </a:p>
           <a:p>
             <a:pPr lvl="2"/>
             <a:r>
-              <a:rPr lang="en-US" noProof="0" smtClean="0"/>
+              <a:rPr lang="en-US" noProof="0"/>
               <a:t>Third Level</a:t>
             </a:r>
           </a:p>
           <a:p>
             <a:pPr lvl="3"/>
             <a:r>
-              <a:rPr lang="en-US" noProof="0" smtClean="0"/>
+              <a:rPr lang="en-US" noProof="0"/>
               <a:t>Fourth Level</a:t>
             </a:r>
           </a:p>
           <a:p>
             <a:pPr lvl="4"/>
             <a:r>
-              <a:rPr lang="en-US" noProof="0" smtClean="0"/>
+              <a:rPr lang="en-US" noProof="0"/>
               <a:t>Fifth Level</a:t>
             </a:r>
           </a:p>
@@ -1487,10 +1517,9 @@
           <a:lstStyle/>
           <a:p>
             <a:r>
-              <a:rPr lang="en-US" smtClean="0"/>
+              <a:rPr lang="en-US"/>
               <a:t>Click to edit Master title style</a:t>
             </a:r>
-            <a:endParaRPr lang="en-US"/>
           </a:p>
         </p:txBody>
       </p:sp>
@@ -1552,10 +1581,9 @@
           </a:lstStyle>
           <a:p>
             <a:r>
-              <a:rPr lang="en-US" smtClean="0"/>
+              <a:rPr lang="en-US"/>
               <a:t>Click to edit Master subtitle style</a:t>
             </a:r>
-            <a:endParaRPr lang="en-US"/>
           </a:p>
         </p:txBody>
       </p:sp>
@@ -1600,10 +1628,9 @@
           <a:lstStyle/>
           <a:p>
             <a:r>
-              <a:rPr lang="en-US" smtClean="0"/>
+              <a:rPr lang="en-US"/>
               <a:t>Click to edit Master title style</a:t>
             </a:r>
-            <a:endParaRPr lang="en-US"/>
           </a:p>
         </p:txBody>
       </p:sp>
@@ -1624,38 +1651,37 @@
           <a:p>
             <a:pPr lvl="0"/>
             <a:r>
-              <a:rPr lang="en-US" smtClean="0"/>
+              <a:rPr lang="en-US"/>
               <a:t>Click to edit Master text styles</a:t>
             </a:r>
           </a:p>
           <a:p>
             <a:pPr lvl="1"/>
             <a:r>
-              <a:rPr lang="en-US" smtClean="0"/>
+              <a:rPr lang="en-US"/>
               <a:t>Second level</a:t>
             </a:r>
           </a:p>
           <a:p>
             <a:pPr lvl="2"/>
             <a:r>
-              <a:rPr lang="en-US" smtClean="0"/>
+              <a:rPr lang="en-US"/>
               <a:t>Third level</a:t>
             </a:r>
           </a:p>
           <a:p>
             <a:pPr lvl="3"/>
             <a:r>
-              <a:rPr lang="en-US" smtClean="0"/>
+              <a:rPr lang="en-US"/>
               <a:t>Fourth level</a:t>
             </a:r>
           </a:p>
           <a:p>
             <a:pPr lvl="4"/>
             <a:r>
-              <a:rPr lang="en-US" smtClean="0"/>
+              <a:rPr lang="en-US"/>
               <a:t>Fifth level</a:t>
             </a:r>
-            <a:endParaRPr lang="en-US"/>
           </a:p>
         </p:txBody>
       </p:sp>
@@ -1705,10 +1731,9 @@
           <a:lstStyle/>
           <a:p>
             <a:r>
-              <a:rPr lang="en-US" smtClean="0"/>
+              <a:rPr lang="en-US"/>
               <a:t>Click to edit Master title style</a:t>
             </a:r>
-            <a:endParaRPr lang="en-US"/>
           </a:p>
         </p:txBody>
       </p:sp>
@@ -1734,38 +1759,37 @@
           <a:p>
             <a:pPr lvl="0"/>
             <a:r>
-              <a:rPr lang="en-US" smtClean="0"/>
+              <a:rPr lang="en-US"/>
               <a:t>Click to edit Master text styles</a:t>
             </a:r>
           </a:p>
           <a:p>
             <a:pPr lvl="1"/>
             <a:r>
-              <a:rPr lang="en-US" smtClean="0"/>
+              <a:rPr lang="en-US"/>
               <a:t>Second level</a:t>
             </a:r>
           </a:p>
           <a:p>
             <a:pPr lvl="2"/>
             <a:r>
-              <a:rPr lang="en-US" smtClean="0"/>
+              <a:rPr lang="en-US"/>
               <a:t>Third level</a:t>
             </a:r>
           </a:p>
           <a:p>
             <a:pPr lvl="3"/>
             <a:r>
-              <a:rPr lang="en-US" smtClean="0"/>
+              <a:rPr lang="en-US"/>
               <a:t>Fourth level</a:t>
             </a:r>
           </a:p>
           <a:p>
             <a:pPr lvl="4"/>
             <a:r>
-              <a:rPr lang="en-US" smtClean="0"/>
+              <a:rPr lang="en-US"/>
               <a:t>Fifth level</a:t>
             </a:r>
-            <a:endParaRPr lang="en-US"/>
           </a:p>
         </p:txBody>
       </p:sp>
@@ -1815,10 +1839,9 @@
           <a:lstStyle/>
           <a:p>
             <a:r>
-              <a:rPr lang="en-US" smtClean="0"/>
+              <a:rPr lang="en-US"/>
               <a:t>Click to edit Master title style</a:t>
             </a:r>
-            <a:endParaRPr lang="en-US"/>
           </a:p>
         </p:txBody>
       </p:sp>
@@ -1880,10 +1903,9 @@
           </a:lstStyle>
           <a:p>
             <a:r>
-              <a:rPr lang="en-US" smtClean="0"/>
+              <a:rPr lang="en-US"/>
               <a:t>Click to edit Master subtitle style</a:t>
             </a:r>
-            <a:endParaRPr lang="en-US"/>
           </a:p>
         </p:txBody>
       </p:sp>
@@ -1932,10 +1954,9 @@
           </a:lstStyle>
           <a:p>
             <a:r>
-              <a:rPr lang="en-US" dirty="0" smtClean="0"/>
+              <a:rPr lang="en-US" dirty="0"/>
               <a:t>Click to edit Master title style</a:t>
             </a:r>
-            <a:endParaRPr lang="en-US" dirty="0"/>
           </a:p>
         </p:txBody>
       </p:sp>
@@ -1956,38 +1977,37 @@
           <a:p>
             <a:pPr lvl="0"/>
             <a:r>
-              <a:rPr lang="en-US" smtClean="0"/>
+              <a:rPr lang="en-US"/>
               <a:t>Click to edit Master text styles</a:t>
             </a:r>
           </a:p>
           <a:p>
             <a:pPr lvl="1"/>
             <a:r>
-              <a:rPr lang="en-US" smtClean="0"/>
+              <a:rPr lang="en-US"/>
               <a:t>Second level</a:t>
             </a:r>
           </a:p>
           <a:p>
             <a:pPr lvl="2"/>
             <a:r>
-              <a:rPr lang="en-US" smtClean="0"/>
+              <a:rPr lang="en-US"/>
               <a:t>Third level</a:t>
             </a:r>
           </a:p>
           <a:p>
             <a:pPr lvl="3"/>
             <a:r>
-              <a:rPr lang="en-US" smtClean="0"/>
+              <a:rPr lang="en-US"/>
               <a:t>Fourth level</a:t>
             </a:r>
           </a:p>
           <a:p>
             <a:pPr lvl="4"/>
             <a:r>
-              <a:rPr lang="en-US" smtClean="0"/>
+              <a:rPr lang="en-US"/>
               <a:t>Fifth level</a:t>
             </a:r>
-            <a:endParaRPr lang="en-US"/>
           </a:p>
         </p:txBody>
       </p:sp>
@@ -2041,10 +2061,9 @@
           </a:lstStyle>
           <a:p>
             <a:r>
-              <a:rPr lang="en-US" smtClean="0"/>
+              <a:rPr lang="en-US"/>
               <a:t>Click to edit Master title style</a:t>
             </a:r>
-            <a:endParaRPr lang="en-US"/>
           </a:p>
         </p:txBody>
       </p:sp>
@@ -2107,7 +2126,7 @@
           <a:p>
             <a:pPr lvl="0"/>
             <a:r>
-              <a:rPr lang="en-US" smtClean="0"/>
+              <a:rPr lang="en-US"/>
               <a:t>Click to edit Master text styles</a:t>
             </a:r>
           </a:p>
@@ -2154,10 +2173,9 @@
           <a:lstStyle/>
           <a:p>
             <a:r>
-              <a:rPr lang="en-US" smtClean="0"/>
+              <a:rPr lang="en-US"/>
               <a:t>Click to edit Master title style</a:t>
             </a:r>
-            <a:endParaRPr lang="en-US"/>
           </a:p>
         </p:txBody>
       </p:sp>
@@ -2211,38 +2229,37 @@
           <a:p>
             <a:pPr lvl="0"/>
             <a:r>
-              <a:rPr lang="en-US" smtClean="0"/>
+              <a:rPr lang="en-US"/>
               <a:t>Click to edit Master text styles</a:t>
             </a:r>
           </a:p>
           <a:p>
             <a:pPr lvl="1"/>
             <a:r>
-              <a:rPr lang="en-US" smtClean="0"/>
+              <a:rPr lang="en-US"/>
               <a:t>Second level</a:t>
             </a:r>
           </a:p>
           <a:p>
             <a:pPr lvl="2"/>
             <a:r>
-              <a:rPr lang="en-US" smtClean="0"/>
+              <a:rPr lang="en-US"/>
               <a:t>Third level</a:t>
             </a:r>
           </a:p>
           <a:p>
             <a:pPr lvl="3"/>
             <a:r>
-              <a:rPr lang="en-US" smtClean="0"/>
+              <a:rPr lang="en-US"/>
               <a:t>Fourth level</a:t>
             </a:r>
           </a:p>
           <a:p>
             <a:pPr lvl="4"/>
             <a:r>
-              <a:rPr lang="en-US" smtClean="0"/>
+              <a:rPr lang="en-US"/>
               <a:t>Fifth level</a:t>
             </a:r>
-            <a:endParaRPr lang="en-US"/>
           </a:p>
         </p:txBody>
       </p:sp>
@@ -2296,38 +2313,37 @@
           <a:p>
             <a:pPr lvl="0"/>
             <a:r>
-              <a:rPr lang="en-US" smtClean="0"/>
+              <a:rPr lang="en-US"/>
               <a:t>Click to edit Master text styles</a:t>
             </a:r>
           </a:p>
           <a:p>
             <a:pPr lvl="1"/>
             <a:r>
-              <a:rPr lang="en-US" smtClean="0"/>
+              <a:rPr lang="en-US"/>
               <a:t>Second level</a:t>
             </a:r>
           </a:p>
           <a:p>
             <a:pPr lvl="2"/>
             <a:r>
-              <a:rPr lang="en-US" smtClean="0"/>
+              <a:rPr lang="en-US"/>
               <a:t>Third level</a:t>
             </a:r>
           </a:p>
           <a:p>
             <a:pPr lvl="3"/>
             <a:r>
-              <a:rPr lang="en-US" smtClean="0"/>
+              <a:rPr lang="en-US"/>
               <a:t>Fourth level</a:t>
             </a:r>
           </a:p>
           <a:p>
             <a:pPr lvl="4"/>
             <a:r>
-              <a:rPr lang="en-US" smtClean="0"/>
+              <a:rPr lang="en-US"/>
               <a:t>Fifth level</a:t>
             </a:r>
-            <a:endParaRPr lang="en-US"/>
           </a:p>
         </p:txBody>
       </p:sp>
@@ -2381,10 +2397,9 @@
           </a:lstStyle>
           <a:p>
             <a:r>
-              <a:rPr lang="en-US" smtClean="0"/>
+              <a:rPr lang="en-US"/>
               <a:t>Click to edit Master title style</a:t>
             </a:r>
-            <a:endParaRPr lang="en-US"/>
           </a:p>
         </p:txBody>
       </p:sp>
@@ -2447,7 +2462,7 @@
           <a:p>
             <a:pPr lvl="0"/>
             <a:r>
-              <a:rPr lang="en-US" smtClean="0"/>
+              <a:rPr lang="en-US"/>
               <a:t>Click to edit Master text styles</a:t>
             </a:r>
           </a:p>
@@ -2503,38 +2518,37 @@
           <a:p>
             <a:pPr lvl="0"/>
             <a:r>
-              <a:rPr lang="en-US" smtClean="0"/>
+              <a:rPr lang="en-US"/>
               <a:t>Click to edit Master text styles</a:t>
             </a:r>
           </a:p>
           <a:p>
             <a:pPr lvl="1"/>
             <a:r>
-              <a:rPr lang="en-US" smtClean="0"/>
+              <a:rPr lang="en-US"/>
               <a:t>Second level</a:t>
             </a:r>
           </a:p>
           <a:p>
             <a:pPr lvl="2"/>
             <a:r>
-              <a:rPr lang="en-US" smtClean="0"/>
+              <a:rPr lang="en-US"/>
               <a:t>Third level</a:t>
             </a:r>
           </a:p>
           <a:p>
             <a:pPr lvl="3"/>
             <a:r>
-              <a:rPr lang="en-US" smtClean="0"/>
+              <a:rPr lang="en-US"/>
               <a:t>Fourth level</a:t>
             </a:r>
           </a:p>
           <a:p>
             <a:pPr lvl="4"/>
             <a:r>
-              <a:rPr lang="en-US" smtClean="0"/>
+              <a:rPr lang="en-US"/>
               <a:t>Fifth level</a:t>
             </a:r>
-            <a:endParaRPr lang="en-US"/>
           </a:p>
         </p:txBody>
       </p:sp>
@@ -2597,7 +2611,7 @@
           <a:p>
             <a:pPr lvl="0"/>
             <a:r>
-              <a:rPr lang="en-US" smtClean="0"/>
+              <a:rPr lang="en-US"/>
               <a:t>Click to edit Master text styles</a:t>
             </a:r>
           </a:p>
@@ -2653,38 +2667,37 @@
           <a:p>
             <a:pPr lvl="0"/>
             <a:r>
-              <a:rPr lang="en-US" smtClean="0"/>
+              <a:rPr lang="en-US"/>
               <a:t>Click to edit Master text styles</a:t>
             </a:r>
           </a:p>
           <a:p>
             <a:pPr lvl="1"/>
             <a:r>
-              <a:rPr lang="en-US" smtClean="0"/>
+              <a:rPr lang="en-US"/>
               <a:t>Second level</a:t>
             </a:r>
           </a:p>
           <a:p>
             <a:pPr lvl="2"/>
             <a:r>
-              <a:rPr lang="en-US" smtClean="0"/>
+              <a:rPr lang="en-US"/>
               <a:t>Third level</a:t>
             </a:r>
           </a:p>
           <a:p>
             <a:pPr lvl="3"/>
             <a:r>
-              <a:rPr lang="en-US" smtClean="0"/>
+              <a:rPr lang="en-US"/>
               <a:t>Fourth level</a:t>
             </a:r>
           </a:p>
           <a:p>
             <a:pPr lvl="4"/>
             <a:r>
-              <a:rPr lang="en-US" smtClean="0"/>
+              <a:rPr lang="en-US"/>
               <a:t>Fifth level</a:t>
             </a:r>
-            <a:endParaRPr lang="en-US"/>
           </a:p>
         </p:txBody>
       </p:sp>
@@ -2729,10 +2742,9 @@
           <a:lstStyle/>
           <a:p>
             <a:r>
-              <a:rPr lang="en-US" smtClean="0"/>
+              <a:rPr lang="en-US"/>
               <a:t>Click to edit Master title style</a:t>
             </a:r>
-            <a:endParaRPr lang="en-US"/>
           </a:p>
         </p:txBody>
       </p:sp>
@@ -2811,10 +2823,9 @@
           </a:lstStyle>
           <a:p>
             <a:r>
-              <a:rPr lang="en-US" smtClean="0"/>
+              <a:rPr lang="en-US"/>
               <a:t>Click to edit Master title style</a:t>
             </a:r>
-            <a:endParaRPr lang="en-US"/>
           </a:p>
         </p:txBody>
       </p:sp>
@@ -2868,38 +2879,37 @@
           <a:p>
             <a:pPr lvl="0"/>
             <a:r>
-              <a:rPr lang="en-US" smtClean="0"/>
+              <a:rPr lang="en-US"/>
               <a:t>Click to edit Master text styles</a:t>
             </a:r>
           </a:p>
           <a:p>
             <a:pPr lvl="1"/>
             <a:r>
-              <a:rPr lang="en-US" smtClean="0"/>
+              <a:rPr lang="en-US"/>
               <a:t>Second level</a:t>
             </a:r>
           </a:p>
           <a:p>
             <a:pPr lvl="2"/>
             <a:r>
-              <a:rPr lang="en-US" smtClean="0"/>
+              <a:rPr lang="en-US"/>
               <a:t>Third level</a:t>
             </a:r>
           </a:p>
           <a:p>
             <a:pPr lvl="3"/>
             <a:r>
-              <a:rPr lang="en-US" smtClean="0"/>
+              <a:rPr lang="en-US"/>
               <a:t>Fourth level</a:t>
             </a:r>
           </a:p>
           <a:p>
             <a:pPr lvl="4"/>
             <a:r>
-              <a:rPr lang="en-US" smtClean="0"/>
+              <a:rPr lang="en-US"/>
               <a:t>Fifth level</a:t>
             </a:r>
-            <a:endParaRPr lang="en-US"/>
           </a:p>
         </p:txBody>
       </p:sp>
@@ -2962,7 +2972,7 @@
           <a:p>
             <a:pPr lvl="0"/>
             <a:r>
-              <a:rPr lang="en-US" smtClean="0"/>
+              <a:rPr lang="en-US"/>
               <a:t>Click to edit Master text styles</a:t>
             </a:r>
           </a:p>
@@ -3009,10 +3019,9 @@
           <a:lstStyle/>
           <a:p>
             <a:r>
-              <a:rPr lang="en-US" smtClean="0"/>
+              <a:rPr lang="en-US"/>
               <a:t>Click to edit Master title style</a:t>
             </a:r>
-            <a:endParaRPr lang="en-US"/>
           </a:p>
         </p:txBody>
       </p:sp>
@@ -3033,38 +3042,37 @@
           <a:p>
             <a:pPr lvl="0"/>
             <a:r>
-              <a:rPr lang="en-US" smtClean="0"/>
+              <a:rPr lang="en-US"/>
               <a:t>Click to edit Master text styles</a:t>
             </a:r>
           </a:p>
           <a:p>
             <a:pPr lvl="1"/>
             <a:r>
-              <a:rPr lang="en-US" smtClean="0"/>
+              <a:rPr lang="en-US"/>
               <a:t>Second level</a:t>
             </a:r>
           </a:p>
           <a:p>
             <a:pPr lvl="2"/>
             <a:r>
-              <a:rPr lang="en-US" smtClean="0"/>
+              <a:rPr lang="en-US"/>
               <a:t>Third level</a:t>
             </a:r>
           </a:p>
           <a:p>
             <a:pPr lvl="3"/>
             <a:r>
-              <a:rPr lang="en-US" smtClean="0"/>
+              <a:rPr lang="en-US"/>
               <a:t>Fourth level</a:t>
             </a:r>
           </a:p>
           <a:p>
             <a:pPr lvl="4"/>
             <a:r>
-              <a:rPr lang="en-US" smtClean="0"/>
+              <a:rPr lang="en-US"/>
               <a:t>Fifth level</a:t>
             </a:r>
-            <a:endParaRPr lang="en-US"/>
           </a:p>
         </p:txBody>
       </p:sp>
@@ -3118,10 +3126,9 @@
           </a:lstStyle>
           <a:p>
             <a:r>
-              <a:rPr lang="en-US" smtClean="0"/>
+              <a:rPr lang="en-US"/>
               <a:t>Click to edit Master title style</a:t>
             </a:r>
-            <a:endParaRPr lang="en-US"/>
           </a:p>
         </p:txBody>
       </p:sp>
@@ -3183,7 +3190,7 @@
           </a:lstStyle>
           <a:p>
             <a:pPr lvl="0"/>
-            <a:endParaRPr lang="en-US" noProof="0" smtClean="0"/>
+            <a:endParaRPr lang="en-US" noProof="0"/>
           </a:p>
         </p:txBody>
       </p:sp>
@@ -3246,7 +3253,7 @@
           <a:p>
             <a:pPr lvl="0"/>
             <a:r>
-              <a:rPr lang="en-US" smtClean="0"/>
+              <a:rPr lang="en-US"/>
               <a:t>Click to edit Master text styles</a:t>
             </a:r>
           </a:p>
@@ -3293,10 +3300,9 @@
           <a:lstStyle/>
           <a:p>
             <a:r>
-              <a:rPr lang="en-US" smtClean="0"/>
+              <a:rPr lang="en-US"/>
               <a:t>Click to edit Master title style</a:t>
             </a:r>
-            <a:endParaRPr lang="en-US"/>
           </a:p>
         </p:txBody>
       </p:sp>
@@ -3317,38 +3323,37 @@
           <a:p>
             <a:pPr lvl="0"/>
             <a:r>
-              <a:rPr lang="en-US" smtClean="0"/>
+              <a:rPr lang="en-US"/>
               <a:t>Click to edit Master text styles</a:t>
             </a:r>
           </a:p>
           <a:p>
             <a:pPr lvl="1"/>
             <a:r>
-              <a:rPr lang="en-US" smtClean="0"/>
+              <a:rPr lang="en-US"/>
               <a:t>Second level</a:t>
             </a:r>
           </a:p>
           <a:p>
             <a:pPr lvl="2"/>
             <a:r>
-              <a:rPr lang="en-US" smtClean="0"/>
+              <a:rPr lang="en-US"/>
               <a:t>Third level</a:t>
             </a:r>
           </a:p>
           <a:p>
             <a:pPr lvl="3"/>
             <a:r>
-              <a:rPr lang="en-US" smtClean="0"/>
+              <a:rPr lang="en-US"/>
               <a:t>Fourth level</a:t>
             </a:r>
           </a:p>
           <a:p>
             <a:pPr lvl="4"/>
             <a:r>
-              <a:rPr lang="en-US" smtClean="0"/>
+              <a:rPr lang="en-US"/>
               <a:t>Fifth level</a:t>
             </a:r>
-            <a:endParaRPr lang="en-US"/>
           </a:p>
         </p:txBody>
       </p:sp>
@@ -3398,10 +3403,9 @@
           <a:lstStyle/>
           <a:p>
             <a:r>
-              <a:rPr lang="en-US" smtClean="0"/>
+              <a:rPr lang="en-US"/>
               <a:t>Click to edit Master title style</a:t>
             </a:r>
-            <a:endParaRPr lang="en-US"/>
           </a:p>
         </p:txBody>
       </p:sp>
@@ -3427,38 +3431,37 @@
           <a:p>
             <a:pPr lvl="0"/>
             <a:r>
-              <a:rPr lang="en-US" smtClean="0"/>
+              <a:rPr lang="en-US"/>
               <a:t>Click to edit Master text styles</a:t>
             </a:r>
           </a:p>
           <a:p>
             <a:pPr lvl="1"/>
             <a:r>
-              <a:rPr lang="en-US" smtClean="0"/>
+              <a:rPr lang="en-US"/>
               <a:t>Second level</a:t>
             </a:r>
           </a:p>
           <a:p>
             <a:pPr lvl="2"/>
             <a:r>
-              <a:rPr lang="en-US" smtClean="0"/>
+              <a:rPr lang="en-US"/>
               <a:t>Third level</a:t>
             </a:r>
           </a:p>
           <a:p>
             <a:pPr lvl="3"/>
             <a:r>
-              <a:rPr lang="en-US" smtClean="0"/>
+              <a:rPr lang="en-US"/>
               <a:t>Fourth level</a:t>
             </a:r>
           </a:p>
           <a:p>
             <a:pPr lvl="4"/>
             <a:r>
-              <a:rPr lang="en-US" smtClean="0"/>
+              <a:rPr lang="en-US"/>
               <a:t>Fifth level</a:t>
             </a:r>
-            <a:endParaRPr lang="en-US"/>
           </a:p>
         </p:txBody>
       </p:sp>
@@ -3512,10 +3515,9 @@
           </a:lstStyle>
           <a:p>
             <a:r>
-              <a:rPr lang="en-US" smtClean="0"/>
+              <a:rPr lang="en-US"/>
               <a:t>Click to edit Master title style</a:t>
             </a:r>
-            <a:endParaRPr lang="en-US"/>
           </a:p>
         </p:txBody>
       </p:sp>
@@ -3578,7 +3580,7 @@
           <a:p>
             <a:pPr lvl="0"/>
             <a:r>
-              <a:rPr lang="en-US" smtClean="0"/>
+              <a:rPr lang="en-US"/>
               <a:t>Click to edit Master text styles</a:t>
             </a:r>
           </a:p>
@@ -3625,10 +3627,9 @@
           <a:lstStyle/>
           <a:p>
             <a:r>
-              <a:rPr lang="en-US" smtClean="0"/>
+              <a:rPr lang="en-US"/>
               <a:t>Click to edit Master title style</a:t>
             </a:r>
-            <a:endParaRPr lang="en-US"/>
           </a:p>
         </p:txBody>
       </p:sp>
@@ -3682,38 +3683,37 @@
           <a:p>
             <a:pPr lvl="0"/>
             <a:r>
-              <a:rPr lang="en-US" smtClean="0"/>
+              <a:rPr lang="en-US"/>
               <a:t>Click to edit Master text styles</a:t>
             </a:r>
           </a:p>
           <a:p>
             <a:pPr lvl="1"/>
             <a:r>
-              <a:rPr lang="en-US" smtClean="0"/>
+              <a:rPr lang="en-US"/>
               <a:t>Second level</a:t>
             </a:r>
           </a:p>
           <a:p>
             <a:pPr lvl="2"/>
             <a:r>
-              <a:rPr lang="en-US" smtClean="0"/>
+              <a:rPr lang="en-US"/>
               <a:t>Third level</a:t>
             </a:r>
           </a:p>
           <a:p>
             <a:pPr lvl="3"/>
             <a:r>
-              <a:rPr lang="en-US" smtClean="0"/>
+              <a:rPr lang="en-US"/>
               <a:t>Fourth level</a:t>
             </a:r>
           </a:p>
           <a:p>
             <a:pPr lvl="4"/>
             <a:r>
-              <a:rPr lang="en-US" smtClean="0"/>
+              <a:rPr lang="en-US"/>
               <a:t>Fifth level</a:t>
             </a:r>
-            <a:endParaRPr lang="en-US"/>
           </a:p>
         </p:txBody>
       </p:sp>
@@ -3767,38 +3767,37 @@
           <a:p>
             <a:pPr lvl="0"/>
             <a:r>
-              <a:rPr lang="en-US" smtClean="0"/>
+              <a:rPr lang="en-US"/>
               <a:t>Click to edit Master text styles</a:t>
             </a:r>
           </a:p>
           <a:p>
             <a:pPr lvl="1"/>
             <a:r>
-              <a:rPr lang="en-US" smtClean="0"/>
+              <a:rPr lang="en-US"/>
               <a:t>Second level</a:t>
             </a:r>
           </a:p>
           <a:p>
             <a:pPr lvl="2"/>
             <a:r>
-              <a:rPr lang="en-US" smtClean="0"/>
+              <a:rPr lang="en-US"/>
               <a:t>Third level</a:t>
             </a:r>
           </a:p>
           <a:p>
             <a:pPr lvl="3"/>
             <a:r>
-              <a:rPr lang="en-US" smtClean="0"/>
+              <a:rPr lang="en-US"/>
               <a:t>Fourth level</a:t>
             </a:r>
           </a:p>
           <a:p>
             <a:pPr lvl="4"/>
             <a:r>
-              <a:rPr lang="en-US" smtClean="0"/>
+              <a:rPr lang="en-US"/>
               <a:t>Fifth level</a:t>
             </a:r>
-            <a:endParaRPr lang="en-US"/>
           </a:p>
         </p:txBody>
       </p:sp>
@@ -3852,10 +3851,9 @@
           </a:lstStyle>
           <a:p>
             <a:r>
-              <a:rPr lang="en-US" smtClean="0"/>
+              <a:rPr lang="en-US"/>
               <a:t>Click to edit Master title style</a:t>
             </a:r>
-            <a:endParaRPr lang="en-US"/>
           </a:p>
         </p:txBody>
       </p:sp>
@@ -3918,7 +3916,7 @@
           <a:p>
             <a:pPr lvl="0"/>
             <a:r>
-              <a:rPr lang="en-US" smtClean="0"/>
+              <a:rPr lang="en-US"/>
               <a:t>Click to edit Master text styles</a:t>
             </a:r>
           </a:p>
@@ -3974,38 +3972,37 @@
           <a:p>
             <a:pPr lvl="0"/>
             <a:r>
-              <a:rPr lang="en-US" smtClean="0"/>
+              <a:rPr lang="en-US"/>
               <a:t>Click to edit Master text styles</a:t>
             </a:r>
           </a:p>
           <a:p>
             <a:pPr lvl="1"/>
             <a:r>
-              <a:rPr lang="en-US" smtClean="0"/>
+              <a:rPr lang="en-US"/>
               <a:t>Second level</a:t>
             </a:r>
           </a:p>
           <a:p>
             <a:pPr lvl="2"/>
             <a:r>
-              <a:rPr lang="en-US" smtClean="0"/>
+              <a:rPr lang="en-US"/>
               <a:t>Third level</a:t>
             </a:r>
           </a:p>
           <a:p>
             <a:pPr lvl="3"/>
             <a:r>
-              <a:rPr lang="en-US" smtClean="0"/>
+              <a:rPr lang="en-US"/>
               <a:t>Fourth level</a:t>
             </a:r>
           </a:p>
           <a:p>
             <a:pPr lvl="4"/>
             <a:r>
-              <a:rPr lang="en-US" smtClean="0"/>
+              <a:rPr lang="en-US"/>
               <a:t>Fifth level</a:t>
             </a:r>
-            <a:endParaRPr lang="en-US"/>
           </a:p>
         </p:txBody>
       </p:sp>
@@ -4068,7 +4065,7 @@
           <a:p>
             <a:pPr lvl="0"/>
             <a:r>
-              <a:rPr lang="en-US" smtClean="0"/>
+              <a:rPr lang="en-US"/>
               <a:t>Click to edit Master text styles</a:t>
             </a:r>
           </a:p>
@@ -4124,38 +4121,37 @@
           <a:p>
             <a:pPr lvl="0"/>
             <a:r>
-              <a:rPr lang="en-US" smtClean="0"/>
+              <a:rPr lang="en-US"/>
               <a:t>Click to edit Master text styles</a:t>
             </a:r>
           </a:p>
           <a:p>
             <a:pPr lvl="1"/>
             <a:r>
-              <a:rPr lang="en-US" smtClean="0"/>
+              <a:rPr lang="en-US"/>
               <a:t>Second level</a:t>
             </a:r>
           </a:p>
           <a:p>
             <a:pPr lvl="2"/>
             <a:r>
-              <a:rPr lang="en-US" smtClean="0"/>
+              <a:rPr lang="en-US"/>
               <a:t>Third level</a:t>
             </a:r>
           </a:p>
           <a:p>
             <a:pPr lvl="3"/>
             <a:r>
-              <a:rPr lang="en-US" smtClean="0"/>
+              <a:rPr lang="en-US"/>
               <a:t>Fourth level</a:t>
             </a:r>
           </a:p>
           <a:p>
             <a:pPr lvl="4"/>
             <a:r>
-              <a:rPr lang="en-US" smtClean="0"/>
+              <a:rPr lang="en-US"/>
               <a:t>Fifth level</a:t>
             </a:r>
-            <a:endParaRPr lang="en-US"/>
           </a:p>
         </p:txBody>
       </p:sp>
@@ -4200,10 +4196,9 @@
           <a:lstStyle/>
           <a:p>
             <a:r>
-              <a:rPr lang="en-US" smtClean="0"/>
+              <a:rPr lang="en-US"/>
               <a:t>Click to edit Master title style</a:t>
             </a:r>
-            <a:endParaRPr lang="en-US"/>
           </a:p>
         </p:txBody>
       </p:sp>
@@ -4282,10 +4277,9 @@
           </a:lstStyle>
           <a:p>
             <a:r>
-              <a:rPr lang="en-US" smtClean="0"/>
+              <a:rPr lang="en-US"/>
               <a:t>Click to edit Master title style</a:t>
             </a:r>
-            <a:endParaRPr lang="en-US"/>
           </a:p>
         </p:txBody>
       </p:sp>
@@ -4339,38 +4333,37 @@
           <a:p>
             <a:pPr lvl="0"/>
             <a:r>
-              <a:rPr lang="en-US" smtClean="0"/>
+              <a:rPr lang="en-US"/>
               <a:t>Click to edit Master text styles</a:t>
             </a:r>
           </a:p>
           <a:p>
             <a:pPr lvl="1"/>
             <a:r>
-              <a:rPr lang="en-US" smtClean="0"/>
+              <a:rPr lang="en-US"/>
               <a:t>Second level</a:t>
             </a:r>
           </a:p>
           <a:p>
             <a:pPr lvl="2"/>
             <a:r>
-              <a:rPr lang="en-US" smtClean="0"/>
+              <a:rPr lang="en-US"/>
               <a:t>Third level</a:t>
             </a:r>
           </a:p>
           <a:p>
             <a:pPr lvl="3"/>
             <a:r>
-              <a:rPr lang="en-US" smtClean="0"/>
+              <a:rPr lang="en-US"/>
               <a:t>Fourth level</a:t>
             </a:r>
           </a:p>
           <a:p>
             <a:pPr lvl="4"/>
             <a:r>
-              <a:rPr lang="en-US" smtClean="0"/>
+              <a:rPr lang="en-US"/>
               <a:t>Fifth level</a:t>
             </a:r>
-            <a:endParaRPr lang="en-US"/>
           </a:p>
         </p:txBody>
       </p:sp>
@@ -4433,7 +4426,7 @@
           <a:p>
             <a:pPr lvl="0"/>
             <a:r>
-              <a:rPr lang="en-US" smtClean="0"/>
+              <a:rPr lang="en-US"/>
               <a:t>Click to edit Master text styles</a:t>
             </a:r>
           </a:p>
@@ -4489,10 +4482,9 @@
           </a:lstStyle>
           <a:p>
             <a:r>
-              <a:rPr lang="en-US" smtClean="0"/>
+              <a:rPr lang="en-US"/>
               <a:t>Click to edit Master title style</a:t>
             </a:r>
-            <a:endParaRPr lang="en-US"/>
           </a:p>
         </p:txBody>
       </p:sp>
@@ -4554,7 +4546,7 @@
           </a:lstStyle>
           <a:p>
             <a:pPr lvl="0"/>
-            <a:endParaRPr lang="en-US" noProof="0" smtClean="0"/>
+            <a:endParaRPr lang="en-US" noProof="0"/>
           </a:p>
         </p:txBody>
       </p:sp>
@@ -4617,7 +4609,7 @@
           <a:p>
             <a:pPr lvl="0"/>
             <a:r>
-              <a:rPr lang="en-US" smtClean="0"/>
+              <a:rPr lang="en-US"/>
               <a:t>Click to edit Master text styles</a:t>
             </a:r>
           </a:p>
@@ -9921,7 +9913,7 @@
           <a:p>
             <a:pPr lvl="0"/>
             <a:r>
-              <a:rPr lang="en-US" smtClean="0"/>
+              <a:rPr lang="en-US"/>
               <a:t>Click to edit Master title style</a:t>
             </a:r>
           </a:p>
@@ -10002,7 +9994,7 @@
           <a:p>
             <a:pPr lvl="0"/>
             <a:r>
-              <a:rPr lang="en-US" smtClean="0"/>
+              <a:rPr lang="en-US"/>
               <a:t>Click to edit Master text styles</a:t>
             </a:r>
           </a:p>
@@ -10024,13 +10016,6 @@
     <p:sldLayoutId id="2147483661" r:id="rId10"/>
     <p:sldLayoutId id="2147483662" r:id="rId11"/>
   </p:sldLayoutIdLst>
-  <p:timing>
-    <p:tnLst>
-      <p:par>
-        <p:cTn xmlns:p14="http://schemas.microsoft.com/office/powerpoint/2010/main" id="1" dur="indefinite" restart="never" nodeType="tmRoot"/>
-      </p:par>
-    </p:tnLst>
-  </p:timing>
   <p:txStyles>
     <p:titleStyle>
       <a:lvl1pPr algn="l" rtl="0" eaLnBrk="0" fontAlgn="base" hangingPunct="0">
@@ -15177,35 +15162,35 @@
           <a:p>
             <a:pPr lvl="0"/>
             <a:r>
-              <a:rPr lang="en-US" smtClean="0"/>
+              <a:rPr lang="en-US"/>
               <a:t>Click to edit Master text styles</a:t>
             </a:r>
           </a:p>
           <a:p>
             <a:pPr lvl="1"/>
             <a:r>
-              <a:rPr lang="en-US" smtClean="0"/>
+              <a:rPr lang="en-US"/>
               <a:t>Second level</a:t>
             </a:r>
           </a:p>
           <a:p>
             <a:pPr lvl="2"/>
             <a:r>
-              <a:rPr lang="en-US" smtClean="0"/>
+              <a:rPr lang="en-US"/>
               <a:t>Third level</a:t>
             </a:r>
           </a:p>
           <a:p>
             <a:pPr lvl="3"/>
             <a:r>
-              <a:rPr lang="en-US" smtClean="0"/>
+              <a:rPr lang="en-US"/>
               <a:t>Fourth level</a:t>
             </a:r>
           </a:p>
           <a:p>
             <a:pPr lvl="4"/>
             <a:r>
-              <a:rPr lang="en-US" smtClean="0"/>
+              <a:rPr lang="en-US"/>
               <a:t>Fifth level</a:t>
             </a:r>
           </a:p>
@@ -15247,7 +15232,7 @@
           <a:p>
             <a:pPr lvl="0"/>
             <a:r>
-              <a:rPr lang="en-US" dirty="0" smtClean="0"/>
+              <a:rPr lang="en-US" dirty="0"/>
               <a:t>Click to edit Master title style</a:t>
             </a:r>
           </a:p>
@@ -15867,7 +15852,7 @@
   <p:timing>
     <p:tnLst>
       <p:par>
-        <p:cTn xmlns:p14="http://schemas.microsoft.com/office/powerpoint/2010/main" id="1" dur="indefinite" restart="never" nodeType="tmRoot">
+        <p:cTn id="1" dur="indefinite" restart="never" nodeType="tmRoot">
           <p:childTnLst>
             <p:seq concurrent="1" nextAc="seek">
               <p:cTn id="2" dur="indefinite" nodeType="mainSeq">
@@ -16132,7 +16117,7 @@
           <p:tmpl lvl="1">
             <p:tnLst>
               <p:par>
-                <p:cTn xmlns:p14="http://schemas.microsoft.com/office/powerpoint/2010/main" presetID="22" presetClass="entr" presetSubtype="8" fill="hold" nodeType="clickEffect">
+                <p:cTn presetID="22" presetClass="entr" presetSubtype="8" fill="hold" nodeType="clickEffect">
                   <p:stCondLst>
                     <p:cond delay="0"/>
                   </p:stCondLst>
@@ -16171,7 +16156,7 @@
           <p:tmpl lvl="2">
             <p:tnLst>
               <p:par>
-                <p:cTn xmlns:p14="http://schemas.microsoft.com/office/powerpoint/2010/main" presetID="22" presetClass="entr" presetSubtype="8" fill="hold" nodeType="withEffect">
+                <p:cTn presetID="22" presetClass="entr" presetSubtype="8" fill="hold" nodeType="withEffect">
                   <p:stCondLst>
                     <p:cond delay="0"/>
                   </p:stCondLst>
@@ -16210,7 +16195,7 @@
           <p:tmpl lvl="3">
             <p:tnLst>
               <p:par>
-                <p:cTn xmlns:p14="http://schemas.microsoft.com/office/powerpoint/2010/main" presetID="22" presetClass="entr" presetSubtype="8" fill="hold" nodeType="withEffect">
+                <p:cTn presetID="22" presetClass="entr" presetSubtype="8" fill="hold" nodeType="withEffect">
                   <p:stCondLst>
                     <p:cond delay="0"/>
                   </p:stCondLst>
@@ -16249,7 +16234,7 @@
           <p:tmpl lvl="4">
             <p:tnLst>
               <p:par>
-                <p:cTn xmlns:p14="http://schemas.microsoft.com/office/powerpoint/2010/main" presetID="22" presetClass="entr" presetSubtype="8" fill="hold" nodeType="withEffect">
+                <p:cTn presetID="22" presetClass="entr" presetSubtype="8" fill="hold" nodeType="withEffect">
                   <p:stCondLst>
                     <p:cond delay="0"/>
                   </p:stCondLst>
@@ -16288,7 +16273,7 @@
           <p:tmpl lvl="5">
             <p:tnLst>
               <p:par>
-                <p:cTn xmlns:p14="http://schemas.microsoft.com/office/powerpoint/2010/main" presetID="22" presetClass="entr" presetSubtype="8" fill="hold" nodeType="withEffect">
+                <p:cTn presetID="22" presetClass="entr" presetSubtype="8" fill="hold" nodeType="withEffect">
                   <p:stCondLst>
                     <p:cond delay="0"/>
                   </p:stCondLst>
@@ -16754,7 +16739,7 @@
           <a:lstStyle/>
           <a:p>
             <a:r>
-              <a:rPr lang="en-US" dirty="0" err="1" smtClean="0"/>
+              <a:rPr lang="en-US" dirty="0" err="1"/>
               <a:t>spath</a:t>
             </a:r>
             <a:endParaRPr lang="en-US" dirty="0"/>
@@ -16828,7 +16813,7 @@
                 <a:tabLst/>
               </a:pPr>
               <a:r>
-                <a:rPr kumimoji="0" lang="en-US" sz="1600" b="0" i="1" u="none" strike="noStrike" cap="none" normalizeH="0" baseline="0" dirty="0" smtClean="0">
+                <a:rPr kumimoji="0" lang="en-US" sz="1600" b="0" i="1" u="none" strike="noStrike" cap="none" normalizeH="0" baseline="0" dirty="0">
                   <a:ln>
                     <a:noFill/>
                   </a:ln>
@@ -16896,7 +16881,7 @@
                 <a:tabLst/>
               </a:pPr>
               <a:r>
-                <a:rPr kumimoji="0" lang="en-US" sz="1600" b="0" i="1" u="none" strike="noStrike" cap="none" normalizeH="0" baseline="0" dirty="0" smtClean="0">
+                <a:rPr kumimoji="0" lang="en-US" sz="1600" b="0" i="1" u="none" strike="noStrike" cap="none" normalizeH="0" baseline="0" dirty="0">
                   <a:ln>
                     <a:noFill/>
                   </a:ln>
@@ -16964,7 +16949,7 @@
                 <a:tabLst/>
               </a:pPr>
               <a:r>
-                <a:rPr kumimoji="0" lang="en-US" sz="1600" b="0" i="1" u="none" strike="noStrike" cap="none" normalizeH="0" baseline="0" dirty="0" smtClean="0">
+                <a:rPr kumimoji="0" lang="en-US" sz="1600" b="0" i="1" u="none" strike="noStrike" cap="none" normalizeH="0" baseline="0" dirty="0">
                   <a:ln>
                     <a:noFill/>
                   </a:ln>
@@ -17032,7 +17017,7 @@
                 <a:tabLst/>
               </a:pPr>
               <a:r>
-                <a:rPr kumimoji="0" lang="en-US" sz="1600" b="0" i="1" u="none" strike="noStrike" cap="none" normalizeH="0" baseline="0" dirty="0" smtClean="0">
+                <a:rPr kumimoji="0" lang="en-US" sz="1600" b="0" i="1" u="none" strike="noStrike" cap="none" normalizeH="0" baseline="0" dirty="0">
                   <a:ln>
                     <a:noFill/>
                   </a:ln>
@@ -17100,7 +17085,7 @@
                 <a:tabLst/>
               </a:pPr>
               <a:r>
-                <a:rPr kumimoji="0" lang="en-US" sz="1600" b="0" i="1" u="none" strike="noStrike" cap="none" normalizeH="0" baseline="0" dirty="0" smtClean="0">
+                <a:rPr kumimoji="0" lang="en-US" sz="1600" b="0" i="1" u="none" strike="noStrike" cap="none" normalizeH="0" baseline="0" dirty="0">
                   <a:ln>
                     <a:noFill/>
                   </a:ln>
@@ -17168,7 +17153,7 @@
                 <a:tabLst/>
               </a:pPr>
               <a:r>
-                <a:rPr kumimoji="0" lang="en-US" sz="1600" b="0" i="1" u="none" strike="noStrike" cap="none" normalizeH="0" baseline="0" dirty="0" smtClean="0">
+                <a:rPr kumimoji="0" lang="en-US" sz="1600" b="0" i="1" u="none" strike="noStrike" cap="none" normalizeH="0" baseline="0" dirty="0">
                   <a:ln>
                     <a:noFill/>
                   </a:ln>
@@ -17236,7 +17221,7 @@
                 <a:tabLst/>
               </a:pPr>
               <a:r>
-                <a:rPr kumimoji="0" lang="en-US" sz="1600" b="0" i="1" u="none" strike="noStrike" cap="none" normalizeH="0" baseline="0" dirty="0" smtClean="0">
+                <a:rPr kumimoji="0" lang="en-US" sz="1600" b="0" i="1" u="none" strike="noStrike" cap="none" normalizeH="0" baseline="0" dirty="0">
                   <a:ln>
                     <a:noFill/>
                   </a:ln>
@@ -17660,14 +17645,11 @@
             <a:lstStyle/>
             <a:p>
               <a:r>
-                <a:rPr lang="en-US" dirty="0" smtClean="0">
+                <a:rPr lang="en-US" dirty="0">
                   <a:latin typeface="+mn-lt"/>
                 </a:rPr>
                 <a:t>7</a:t>
               </a:r>
-              <a:endParaRPr lang="en-US" dirty="0">
-                <a:latin typeface="+mn-lt"/>
-              </a:endParaRPr>
             </a:p>
           </p:txBody>
         </p:sp>
@@ -17696,14 +17678,11 @@
             <a:lstStyle/>
             <a:p>
               <a:r>
-                <a:rPr lang="en-US" dirty="0" smtClean="0">
+                <a:rPr lang="en-US" dirty="0">
                   <a:latin typeface="+mn-lt"/>
                 </a:rPr>
                 <a:t>3</a:t>
               </a:r>
-              <a:endParaRPr lang="en-US" dirty="0">
-                <a:latin typeface="+mn-lt"/>
-              </a:endParaRPr>
             </a:p>
           </p:txBody>
         </p:sp>
@@ -17732,14 +17711,11 @@
             <a:lstStyle/>
             <a:p>
               <a:r>
-                <a:rPr lang="en-US" dirty="0" smtClean="0">
+                <a:rPr lang="en-US" dirty="0">
                   <a:latin typeface="+mn-lt"/>
                 </a:rPr>
                 <a:t>5</a:t>
               </a:r>
-              <a:endParaRPr lang="en-US" dirty="0">
-                <a:latin typeface="+mn-lt"/>
-              </a:endParaRPr>
             </a:p>
           </p:txBody>
         </p:sp>
@@ -17768,14 +17744,11 @@
             <a:lstStyle/>
             <a:p>
               <a:r>
-                <a:rPr lang="en-US" dirty="0" smtClean="0">
+                <a:rPr lang="en-US" dirty="0">
                   <a:latin typeface="+mn-lt"/>
                 </a:rPr>
                 <a:t>5</a:t>
               </a:r>
-              <a:endParaRPr lang="en-US" dirty="0">
-                <a:latin typeface="+mn-lt"/>
-              </a:endParaRPr>
             </a:p>
           </p:txBody>
         </p:sp>
@@ -17804,14 +17777,11 @@
             <a:lstStyle/>
             <a:p>
               <a:r>
-                <a:rPr lang="en-US" dirty="0" smtClean="0">
+                <a:rPr lang="en-US" dirty="0">
                   <a:latin typeface="+mn-lt"/>
                 </a:rPr>
                 <a:t>4</a:t>
               </a:r>
-              <a:endParaRPr lang="en-US" dirty="0">
-                <a:latin typeface="+mn-lt"/>
-              </a:endParaRPr>
             </a:p>
           </p:txBody>
         </p:sp>
@@ -17840,14 +17810,11 @@
             <a:lstStyle/>
             <a:p>
               <a:r>
-                <a:rPr lang="en-US" dirty="0" smtClean="0">
+                <a:rPr lang="en-US" dirty="0">
                   <a:latin typeface="+mn-lt"/>
                 </a:rPr>
                 <a:t>1</a:t>
               </a:r>
-              <a:endParaRPr lang="en-US" dirty="0">
-                <a:latin typeface="+mn-lt"/>
-              </a:endParaRPr>
             </a:p>
           </p:txBody>
         </p:sp>
@@ -17876,14 +17843,11 @@
             <a:lstStyle/>
             <a:p>
               <a:r>
-                <a:rPr lang="en-US" dirty="0" smtClean="0">
+                <a:rPr lang="en-US" dirty="0">
                   <a:latin typeface="+mn-lt"/>
                 </a:rPr>
                 <a:t>2</a:t>
               </a:r>
-              <a:endParaRPr lang="en-US" dirty="0">
-                <a:latin typeface="+mn-lt"/>
-              </a:endParaRPr>
             </a:p>
           </p:txBody>
         </p:sp>
@@ -17912,14 +17876,11 @@
             <a:lstStyle/>
             <a:p>
               <a:r>
-                <a:rPr lang="en-US" dirty="0" smtClean="0">
+                <a:rPr lang="en-US" dirty="0">
                   <a:latin typeface="+mn-lt"/>
                 </a:rPr>
                 <a:t>8</a:t>
               </a:r>
-              <a:endParaRPr lang="en-US" dirty="0">
-                <a:latin typeface="+mn-lt"/>
-              </a:endParaRPr>
             </a:p>
           </p:txBody>
         </p:sp>
@@ -17948,14 +17909,11 @@
             <a:lstStyle/>
             <a:p>
               <a:r>
-                <a:rPr lang="en-US" dirty="0" smtClean="0">
+                <a:rPr lang="en-US" dirty="0">
                   <a:latin typeface="+mn-lt"/>
                 </a:rPr>
                 <a:t>–4</a:t>
               </a:r>
-              <a:endParaRPr lang="en-US" dirty="0">
-                <a:latin typeface="+mn-lt"/>
-              </a:endParaRPr>
             </a:p>
           </p:txBody>
         </p:sp>
@@ -17984,14 +17942,11 @@
             <a:lstStyle/>
             <a:p>
               <a:r>
-                <a:rPr lang="en-US" dirty="0" smtClean="0">
+                <a:rPr lang="en-US" dirty="0">
                   <a:latin typeface="+mn-lt"/>
                 </a:rPr>
                 <a:t>3</a:t>
               </a:r>
-              <a:endParaRPr lang="en-US" dirty="0">
-                <a:latin typeface="+mn-lt"/>
-              </a:endParaRPr>
             </a:p>
           </p:txBody>
         </p:sp>
@@ -18020,14 +17975,11 @@
             <a:lstStyle/>
             <a:p>
               <a:r>
-                <a:rPr lang="en-US" dirty="0" smtClean="0">
+                <a:rPr lang="en-US" dirty="0">
                   <a:latin typeface="+mn-lt"/>
                 </a:rPr>
                 <a:t>4</a:t>
               </a:r>
-              <a:endParaRPr lang="en-US" dirty="0">
-                <a:latin typeface="+mn-lt"/>
-              </a:endParaRPr>
             </a:p>
           </p:txBody>
         </p:sp>
@@ -18056,14 +18008,11 @@
             <a:lstStyle/>
             <a:p>
               <a:r>
-                <a:rPr lang="en-US" dirty="0" smtClean="0">
+                <a:rPr lang="en-US" dirty="0">
                   <a:latin typeface="+mn-lt"/>
                 </a:rPr>
                 <a:t>2</a:t>
               </a:r>
-              <a:endParaRPr lang="en-US" dirty="0">
-                <a:latin typeface="+mn-lt"/>
-              </a:endParaRPr>
             </a:p>
           </p:txBody>
         </p:sp>
@@ -18073,11 +18022,11 @@
   <p:clrMapOvr>
     <a:masterClrMapping/>
   </p:clrMapOvr>
-  <p:transition xmlns:p14="http://schemas.microsoft.com/office/powerpoint/2010/main"/>
+  <p:transition/>
   <p:timing>
     <p:tnLst>
       <p:par>
-        <p:cTn xmlns:p14="http://schemas.microsoft.com/office/powerpoint/2010/main" id="1" dur="indefinite" restart="never" nodeType="tmRoot">
+        <p:cTn id="1" dur="indefinite" restart="never" nodeType="tmRoot">
           <p:childTnLst>
             <p:seq concurrent="1" nextAc="seek">
               <p:cTn id="2" dur="indefinite" nodeType="mainSeq">
@@ -18196,7 +18145,7 @@
           <a:lstStyle/>
           <a:p>
             <a:r>
-              <a:rPr lang="en-US" dirty="0" err="1" smtClean="0"/>
+              <a:rPr lang="en-US" dirty="0" err="1"/>
               <a:t>sptree</a:t>
             </a:r>
             <a:endParaRPr lang="en-US" dirty="0"/>
@@ -18270,7 +18219,7 @@
                 <a:tabLst/>
               </a:pPr>
               <a:r>
-                <a:rPr kumimoji="0" lang="en-US" sz="1600" b="0" i="1" u="none" strike="noStrike" cap="none" normalizeH="0" baseline="0" dirty="0" smtClean="0">
+                <a:rPr kumimoji="0" lang="en-US" sz="1600" b="0" i="1" u="none" strike="noStrike" cap="none" normalizeH="0" baseline="0" dirty="0">
                   <a:ln>
                     <a:noFill/>
                   </a:ln>
@@ -18338,7 +18287,7 @@
                 <a:tabLst/>
               </a:pPr>
               <a:r>
-                <a:rPr kumimoji="0" lang="en-US" sz="1600" b="0" i="1" u="none" strike="noStrike" cap="none" normalizeH="0" baseline="0" dirty="0" smtClean="0">
+                <a:rPr kumimoji="0" lang="en-US" sz="1600" b="0" i="1" u="none" strike="noStrike" cap="none" normalizeH="0" baseline="0" dirty="0">
                   <a:ln>
                     <a:noFill/>
                   </a:ln>
@@ -18406,7 +18355,7 @@
                 <a:tabLst/>
               </a:pPr>
               <a:r>
-                <a:rPr kumimoji="0" lang="en-US" sz="1600" b="0" i="1" u="none" strike="noStrike" cap="none" normalizeH="0" baseline="0" dirty="0" smtClean="0">
+                <a:rPr kumimoji="0" lang="en-US" sz="1600" b="0" i="1" u="none" strike="noStrike" cap="none" normalizeH="0" baseline="0" dirty="0">
                   <a:ln>
                     <a:noFill/>
                   </a:ln>
@@ -18474,7 +18423,7 @@
                 <a:tabLst/>
               </a:pPr>
               <a:r>
-                <a:rPr kumimoji="0" lang="en-US" sz="1600" b="0" i="1" u="none" strike="noStrike" cap="none" normalizeH="0" baseline="0" dirty="0" smtClean="0">
+                <a:rPr kumimoji="0" lang="en-US" sz="1600" b="0" i="1" u="none" strike="noStrike" cap="none" normalizeH="0" baseline="0" dirty="0">
                   <a:ln>
                     <a:noFill/>
                   </a:ln>
@@ -18542,7 +18491,7 @@
                 <a:tabLst/>
               </a:pPr>
               <a:r>
-                <a:rPr kumimoji="0" lang="en-US" sz="1600" b="0" i="1" u="none" strike="noStrike" cap="none" normalizeH="0" baseline="0" dirty="0" smtClean="0">
+                <a:rPr kumimoji="0" lang="en-US" sz="1600" b="0" i="1" u="none" strike="noStrike" cap="none" normalizeH="0" baseline="0" dirty="0">
                   <a:ln>
                     <a:noFill/>
                   </a:ln>
@@ -18610,7 +18559,7 @@
                 <a:tabLst/>
               </a:pPr>
               <a:r>
-                <a:rPr kumimoji="0" lang="en-US" sz="1600" b="0" i="1" u="none" strike="noStrike" cap="none" normalizeH="0" baseline="0" dirty="0" smtClean="0">
+                <a:rPr kumimoji="0" lang="en-US" sz="1600" b="0" i="1" u="none" strike="noStrike" cap="none" normalizeH="0" baseline="0" dirty="0">
                   <a:ln>
                     <a:noFill/>
                   </a:ln>
@@ -18678,7 +18627,7 @@
                 <a:tabLst/>
               </a:pPr>
               <a:r>
-                <a:rPr kumimoji="0" lang="en-US" sz="1600" b="0" i="1" u="none" strike="noStrike" cap="none" normalizeH="0" baseline="0" dirty="0" smtClean="0">
+                <a:rPr kumimoji="0" lang="en-US" sz="1600" b="0" i="1" u="none" strike="noStrike" cap="none" normalizeH="0" baseline="0" dirty="0">
                   <a:ln>
                     <a:noFill/>
                   </a:ln>
@@ -19102,14 +19051,11 @@
             <a:lstStyle/>
             <a:p>
               <a:r>
-                <a:rPr lang="en-US" dirty="0" smtClean="0">
+                <a:rPr lang="en-US" dirty="0">
                   <a:latin typeface="+mn-lt"/>
                 </a:rPr>
                 <a:t>7</a:t>
               </a:r>
-              <a:endParaRPr lang="en-US" dirty="0">
-                <a:latin typeface="+mn-lt"/>
-              </a:endParaRPr>
             </a:p>
           </p:txBody>
         </p:sp>
@@ -19138,14 +19084,11 @@
             <a:lstStyle/>
             <a:p>
               <a:r>
-                <a:rPr lang="en-US" dirty="0" smtClean="0">
+                <a:rPr lang="en-US" dirty="0">
                   <a:latin typeface="+mn-lt"/>
                 </a:rPr>
                 <a:t>3</a:t>
               </a:r>
-              <a:endParaRPr lang="en-US" dirty="0">
-                <a:latin typeface="+mn-lt"/>
-              </a:endParaRPr>
             </a:p>
           </p:txBody>
         </p:sp>
@@ -19174,14 +19117,11 @@
             <a:lstStyle/>
             <a:p>
               <a:r>
-                <a:rPr lang="en-US" dirty="0" smtClean="0">
+                <a:rPr lang="en-US" dirty="0">
                   <a:latin typeface="+mn-lt"/>
                 </a:rPr>
                 <a:t>5</a:t>
               </a:r>
-              <a:endParaRPr lang="en-US" dirty="0">
-                <a:latin typeface="+mn-lt"/>
-              </a:endParaRPr>
             </a:p>
           </p:txBody>
         </p:sp>
@@ -19210,14 +19150,11 @@
             <a:lstStyle/>
             <a:p>
               <a:r>
-                <a:rPr lang="en-US" dirty="0" smtClean="0">
+                <a:rPr lang="en-US" dirty="0">
                   <a:latin typeface="+mn-lt"/>
                 </a:rPr>
                 <a:t>5</a:t>
               </a:r>
-              <a:endParaRPr lang="en-US" dirty="0">
-                <a:latin typeface="+mn-lt"/>
-              </a:endParaRPr>
             </a:p>
           </p:txBody>
         </p:sp>
@@ -19246,14 +19183,11 @@
             <a:lstStyle/>
             <a:p>
               <a:r>
-                <a:rPr lang="en-US" dirty="0" smtClean="0">
+                <a:rPr lang="en-US" dirty="0">
                   <a:latin typeface="+mn-lt"/>
                 </a:rPr>
                 <a:t>4</a:t>
               </a:r>
-              <a:endParaRPr lang="en-US" dirty="0">
-                <a:latin typeface="+mn-lt"/>
-              </a:endParaRPr>
             </a:p>
           </p:txBody>
         </p:sp>
@@ -19282,14 +19216,11 @@
             <a:lstStyle/>
             <a:p>
               <a:r>
-                <a:rPr lang="en-US" dirty="0" smtClean="0">
+                <a:rPr lang="en-US" dirty="0">
                   <a:latin typeface="+mn-lt"/>
                 </a:rPr>
                 <a:t>1</a:t>
               </a:r>
-              <a:endParaRPr lang="en-US" dirty="0">
-                <a:latin typeface="+mn-lt"/>
-              </a:endParaRPr>
             </a:p>
           </p:txBody>
         </p:sp>
@@ -19318,14 +19249,11 @@
             <a:lstStyle/>
             <a:p>
               <a:r>
-                <a:rPr lang="en-US" dirty="0" smtClean="0">
+                <a:rPr lang="en-US" dirty="0">
                   <a:latin typeface="+mn-lt"/>
                 </a:rPr>
                 <a:t>2</a:t>
               </a:r>
-              <a:endParaRPr lang="en-US" dirty="0">
-                <a:latin typeface="+mn-lt"/>
-              </a:endParaRPr>
             </a:p>
           </p:txBody>
         </p:sp>
@@ -19354,14 +19282,11 @@
             <a:lstStyle/>
             <a:p>
               <a:r>
-                <a:rPr lang="en-US" dirty="0" smtClean="0">
+                <a:rPr lang="en-US" dirty="0">
                   <a:latin typeface="+mn-lt"/>
                 </a:rPr>
                 <a:t>8</a:t>
               </a:r>
-              <a:endParaRPr lang="en-US" dirty="0">
-                <a:latin typeface="+mn-lt"/>
-              </a:endParaRPr>
             </a:p>
           </p:txBody>
         </p:sp>
@@ -19390,14 +19315,11 @@
             <a:lstStyle/>
             <a:p>
               <a:r>
-                <a:rPr lang="en-US" dirty="0" smtClean="0">
+                <a:rPr lang="en-US" dirty="0">
                   <a:latin typeface="+mn-lt"/>
                 </a:rPr>
                 <a:t>–4</a:t>
               </a:r>
-              <a:endParaRPr lang="en-US" dirty="0">
-                <a:latin typeface="+mn-lt"/>
-              </a:endParaRPr>
             </a:p>
           </p:txBody>
         </p:sp>
@@ -19426,14 +19348,11 @@
             <a:lstStyle/>
             <a:p>
               <a:r>
-                <a:rPr lang="en-US" dirty="0" smtClean="0">
+                <a:rPr lang="en-US" dirty="0">
                   <a:latin typeface="+mn-lt"/>
                 </a:rPr>
                 <a:t>3</a:t>
               </a:r>
-              <a:endParaRPr lang="en-US" dirty="0">
-                <a:latin typeface="+mn-lt"/>
-              </a:endParaRPr>
             </a:p>
           </p:txBody>
         </p:sp>
@@ -19462,14 +19381,11 @@
             <a:lstStyle/>
             <a:p>
               <a:r>
-                <a:rPr lang="en-US" dirty="0" smtClean="0">
+                <a:rPr lang="en-US" dirty="0">
                   <a:latin typeface="+mn-lt"/>
                 </a:rPr>
                 <a:t>4</a:t>
               </a:r>
-              <a:endParaRPr lang="en-US" dirty="0">
-                <a:latin typeface="+mn-lt"/>
-              </a:endParaRPr>
             </a:p>
           </p:txBody>
         </p:sp>
@@ -19498,14 +19414,11 @@
             <a:lstStyle/>
             <a:p>
               <a:r>
-                <a:rPr lang="en-US" dirty="0" smtClean="0">
+                <a:rPr lang="en-US" dirty="0">
                   <a:latin typeface="+mn-lt"/>
                 </a:rPr>
                 <a:t>2</a:t>
               </a:r>
-              <a:endParaRPr lang="en-US" dirty="0">
-                <a:latin typeface="+mn-lt"/>
-              </a:endParaRPr>
             </a:p>
           </p:txBody>
         </p:sp>
@@ -19520,11 +19433,11 @@
   <p:clrMapOvr>
     <a:masterClrMapping/>
   </p:clrMapOvr>
-  <p:transition xmlns:p14="http://schemas.microsoft.com/office/powerpoint/2010/main"/>
+  <p:transition/>
   <p:timing>
     <p:tnLst>
       <p:par>
-        <p:cTn xmlns:p14="http://schemas.microsoft.com/office/powerpoint/2010/main" id="1" dur="indefinite" restart="never" nodeType="tmRoot">
+        <p:cTn id="1" dur="indefinite" restart="never" nodeType="tmRoot">
           <p:childTnLst>
             <p:seq concurrent="1" nextAc="seek">
               <p:cTn id="2" dur="indefinite" nodeType="mainSeq">
@@ -19640,7 +19553,7 @@
           <a:lstStyle/>
           <a:p>
             <a:r>
-              <a:rPr lang="en-US" dirty="0" err="1" smtClean="0"/>
+              <a:rPr lang="en-US" dirty="0" err="1"/>
               <a:t>simplePath</a:t>
             </a:r>
             <a:endParaRPr lang="en-US" dirty="0"/>
@@ -19728,7 +19641,7 @@
                   <a:tabLst/>
                 </a:pPr>
                 <a:r>
-                  <a:rPr kumimoji="0" lang="en-US" sz="1600" b="0" i="1" u="none" strike="noStrike" cap="none" normalizeH="0" baseline="0" dirty="0" smtClean="0">
+                  <a:rPr kumimoji="0" lang="en-US" sz="1600" b="0" i="1" u="none" strike="noStrike" cap="none" normalizeH="0" baseline="0" dirty="0">
                     <a:ln>
                       <a:noFill/>
                     </a:ln>
@@ -19796,12 +19709,12 @@
                   <a:tabLst/>
                 </a:pPr>
                 <a:r>
-                  <a:rPr lang="en-US" i="1" dirty="0" smtClean="0">
+                  <a:rPr lang="en-US" i="1" dirty="0">
                     <a:latin typeface="+mn-lt"/>
                   </a:rPr>
                   <a:t>a</a:t>
                 </a:r>
-                <a:endParaRPr kumimoji="0" lang="en-US" sz="1600" b="0" i="1" u="none" strike="noStrike" cap="none" normalizeH="0" baseline="0" dirty="0" smtClean="0">
+                <a:endParaRPr kumimoji="0" lang="en-US" sz="1600" b="0" i="1" u="none" strike="noStrike" cap="none" normalizeH="0" baseline="0" dirty="0">
                   <a:ln>
                     <a:noFill/>
                   </a:ln>
@@ -19867,7 +19780,7 @@
                   <a:tabLst/>
                 </a:pPr>
                 <a:r>
-                  <a:rPr kumimoji="0" lang="en-US" sz="1600" b="0" i="1" u="none" strike="noStrike" cap="none" normalizeH="0" baseline="0" dirty="0" smtClean="0">
+                  <a:rPr kumimoji="0" lang="en-US" sz="1600" b="0" i="1" u="none" strike="noStrike" cap="none" normalizeH="0" baseline="0" dirty="0">
                     <a:ln>
                       <a:noFill/>
                     </a:ln>
@@ -19907,14 +19820,11 @@
               <a:lstStyle/>
               <a:p>
                 <a:r>
-                  <a:rPr lang="en-US" dirty="0" smtClean="0">
+                  <a:rPr lang="en-US" dirty="0">
                     <a:latin typeface="+mn-lt"/>
                   </a:rPr>
                   <a:t>3</a:t>
                 </a:r>
-                <a:endParaRPr lang="en-US" dirty="0">
-                  <a:latin typeface="+mn-lt"/>
-                </a:endParaRPr>
               </a:p>
             </p:txBody>
           </p:sp>
@@ -19971,7 +19881,7 @@
                   <a:tabLst/>
                 </a:pPr>
                 <a:r>
-                  <a:rPr kumimoji="0" lang="en-US" sz="1600" b="0" i="1" u="none" strike="noStrike" cap="none" normalizeH="0" baseline="0" dirty="0" smtClean="0">
+                  <a:rPr kumimoji="0" lang="en-US" sz="1600" b="0" i="1" u="none" strike="noStrike" cap="none" normalizeH="0" baseline="0" dirty="0">
                     <a:ln>
                       <a:noFill/>
                     </a:ln>
@@ -20039,7 +19949,7 @@
                   <a:tabLst/>
                 </a:pPr>
                 <a:r>
-                  <a:rPr kumimoji="0" lang="en-US" sz="1600" b="0" i="1" u="none" strike="noStrike" cap="none" normalizeH="0" baseline="0" dirty="0" smtClean="0">
+                  <a:rPr kumimoji="0" lang="en-US" sz="1600" b="0" i="1" u="none" strike="noStrike" cap="none" normalizeH="0" baseline="0" dirty="0">
                     <a:ln>
                       <a:noFill/>
                     </a:ln>
@@ -20239,14 +20149,11 @@
               <a:lstStyle/>
               <a:p>
                 <a:r>
-                  <a:rPr lang="en-US" dirty="0" smtClean="0">
+                  <a:rPr lang="en-US" dirty="0">
                     <a:latin typeface="+mn-lt"/>
                   </a:rPr>
                   <a:t>–4</a:t>
                 </a:r>
-                <a:endParaRPr lang="en-US" dirty="0">
-                  <a:latin typeface="+mn-lt"/>
-                </a:endParaRPr>
               </a:p>
             </p:txBody>
           </p:sp>
@@ -20275,14 +20182,11 @@
               <a:lstStyle/>
               <a:p>
                 <a:r>
-                  <a:rPr lang="en-US" dirty="0" smtClean="0">
+                  <a:rPr lang="en-US" dirty="0">
                     <a:latin typeface="+mn-lt"/>
                   </a:rPr>
                   <a:t>2</a:t>
                 </a:r>
-                <a:endParaRPr lang="en-US" dirty="0">
-                  <a:latin typeface="+mn-lt"/>
-                </a:endParaRPr>
               </a:p>
             </p:txBody>
           </p:sp>
@@ -20311,14 +20215,11 @@
               <a:lstStyle/>
               <a:p>
                 <a:r>
-                  <a:rPr lang="en-US" dirty="0" smtClean="0">
+                  <a:rPr lang="en-US" dirty="0">
                     <a:latin typeface="+mn-lt"/>
                   </a:rPr>
                   <a:t>1</a:t>
                 </a:r>
-                <a:endParaRPr lang="en-US" dirty="0">
-                  <a:latin typeface="+mn-lt"/>
-                </a:endParaRPr>
               </a:p>
             </p:txBody>
           </p:sp>
@@ -20347,14 +20248,11 @@
               <a:lstStyle/>
               <a:p>
                 <a:r>
-                  <a:rPr lang="en-US" dirty="0" smtClean="0">
+                  <a:rPr lang="en-US" dirty="0">
                     <a:latin typeface="+mn-lt"/>
                   </a:rPr>
                   <a:t>2</a:t>
                 </a:r>
-                <a:endParaRPr lang="en-US" dirty="0">
-                  <a:latin typeface="+mn-lt"/>
-                </a:endParaRPr>
               </a:p>
             </p:txBody>
           </p:sp>
@@ -20384,14 +20282,11 @@
             <a:lstStyle/>
             <a:p>
               <a:r>
-                <a:rPr lang="en-US" dirty="0" smtClean="0">
+                <a:rPr lang="en-US" dirty="0">
                   <a:latin typeface="+mn-lt"/>
                 </a:rPr>
                 <a:t>  –3</a:t>
               </a:r>
-              <a:endParaRPr lang="en-US" dirty="0">
-                <a:latin typeface="+mn-lt"/>
-              </a:endParaRPr>
             </a:p>
           </p:txBody>
         </p:sp>
@@ -20404,11 +20299,11 @@
   <p:clrMapOvr>
     <a:masterClrMapping/>
   </p:clrMapOvr>
-  <p:transition xmlns:p14="http://schemas.microsoft.com/office/powerpoint/2010/main" advTm="222000"/>
+  <p:transition advTm="222000"/>
   <p:timing>
     <p:tnLst>
       <p:par>
-        <p:cTn xmlns:p14="http://schemas.microsoft.com/office/powerpoint/2010/main" id="1" dur="indefinite" restart="never" nodeType="tmRoot">
+        <p:cTn id="1" dur="indefinite" restart="never" nodeType="tmRoot">
           <p:childTnLst>
             <p:seq concurrent="1" nextAc="seek">
               <p:cTn id="2" dur="indefinite" nodeType="mainSeq">
@@ -20631,7 +20526,7 @@
                 <a:tabLst/>
               </a:pPr>
               <a:r>
-                <a:rPr kumimoji="0" lang="en-US" sz="1600" b="0" i="1" u="none" strike="noStrike" cap="none" normalizeH="0" baseline="0" dirty="0" smtClean="0">
+                <a:rPr kumimoji="0" lang="en-US" sz="1600" b="0" i="1" u="none" strike="noStrike" cap="none" normalizeH="0" baseline="0" dirty="0">
                   <a:ln>
                     <a:noFill/>
                   </a:ln>
@@ -20699,7 +20594,7 @@
                 <a:tabLst/>
               </a:pPr>
               <a:r>
-                <a:rPr kumimoji="0" lang="en-US" sz="1600" b="0" i="1" u="none" strike="noStrike" cap="none" normalizeH="0" baseline="0" dirty="0" smtClean="0">
+                <a:rPr kumimoji="0" lang="en-US" sz="1600" b="0" i="1" u="none" strike="noStrike" cap="none" normalizeH="0" baseline="0" dirty="0">
                   <a:ln>
                     <a:noFill/>
                   </a:ln>
@@ -20767,7 +20662,7 @@
                 <a:tabLst/>
               </a:pPr>
               <a:r>
-                <a:rPr kumimoji="0" lang="en-US" sz="1600" b="0" i="1" u="none" strike="noStrike" cap="none" normalizeH="0" baseline="0" dirty="0" smtClean="0">
+                <a:rPr kumimoji="0" lang="en-US" sz="1600" b="0" i="1" u="none" strike="noStrike" cap="none" normalizeH="0" baseline="0" dirty="0">
                   <a:ln>
                     <a:noFill/>
                   </a:ln>
@@ -20834,7 +20729,7 @@
                 <a:buNone/>
                 <a:tabLst/>
               </a:pPr>
-              <a:endParaRPr kumimoji="0" lang="en-US" sz="1600" b="0" i="1" u="none" strike="noStrike" cap="none" normalizeH="0" baseline="0" dirty="0" smtClean="0">
+              <a:endParaRPr kumimoji="0" lang="en-US" sz="1600" b="0" i="1" u="none" strike="noStrike" cap="none" normalizeH="0" baseline="0" dirty="0">
                 <a:ln>
                   <a:noFill/>
                 </a:ln>
@@ -21019,7 +20914,7 @@
                 <a:buNone/>
                 <a:tabLst/>
               </a:pPr>
-              <a:endParaRPr kumimoji="0" lang="en-US" sz="1600" b="0" i="0" u="none" strike="noStrike" cap="none" normalizeH="0" baseline="0" smtClean="0">
+              <a:endParaRPr kumimoji="0" lang="en-US" sz="1600" b="0" i="0" u="none" strike="noStrike" cap="none" normalizeH="0" baseline="0">
                 <a:ln>
                   <a:noFill/>
                 </a:ln>
@@ -21130,7 +21025,7 @@
                 <a:buNone/>
                 <a:tabLst/>
               </a:pPr>
-              <a:endParaRPr kumimoji="0" lang="en-US" sz="1600" b="0" i="0" u="none" strike="noStrike" cap="none" normalizeH="0" baseline="0" smtClean="0">
+              <a:endParaRPr kumimoji="0" lang="en-US" sz="1600" b="0" i="0" u="none" strike="noStrike" cap="none" normalizeH="0" baseline="0">
                 <a:ln>
                   <a:noFill/>
                 </a:ln>
@@ -21165,7 +21060,7 @@
           <a:lstStyle/>
           <a:p>
             <a:r>
-              <a:rPr lang="en-US" dirty="0" err="1" smtClean="0"/>
+              <a:rPr lang="en-US" dirty="0" err="1"/>
               <a:t>sptProp</a:t>
             </a:r>
             <a:endParaRPr lang="en-US" dirty="0"/>
@@ -21180,11 +21075,11 @@
   <p:clrMapOvr>
     <a:masterClrMapping/>
   </p:clrMapOvr>
-  <p:transition xmlns:p14="http://schemas.microsoft.com/office/powerpoint/2010/main" advTm="265000"/>
+  <p:transition advTm="265000"/>
   <p:timing>
     <p:tnLst>
       <p:par>
-        <p:cTn xmlns:p14="http://schemas.microsoft.com/office/powerpoint/2010/main" id="1" dur="indefinite" restart="never" nodeType="tmRoot">
+        <p:cTn id="1" dur="indefinite" restart="never" nodeType="tmRoot">
           <p:childTnLst>
             <p:seq concurrent="1" nextAc="seek">
               <p:cTn id="2" dur="indefinite" nodeType="mainSeq">
@@ -21407,7 +21302,7 @@
                 <a:tabLst/>
               </a:pPr>
               <a:r>
-                <a:rPr kumimoji="0" lang="en-US" sz="1600" b="0" i="1" u="none" strike="noStrike" cap="none" normalizeH="0" baseline="0" dirty="0" smtClean="0">
+                <a:rPr kumimoji="0" lang="en-US" sz="1600" b="0" i="1" u="none" strike="noStrike" cap="none" normalizeH="0" baseline="0" dirty="0">
                   <a:ln>
                     <a:noFill/>
                   </a:ln>
@@ -21475,7 +21370,7 @@
                 <a:tabLst/>
               </a:pPr>
               <a:r>
-                <a:rPr kumimoji="0" lang="en-US" sz="1600" b="0" i="1" u="none" strike="noStrike" cap="none" normalizeH="0" baseline="0" dirty="0" smtClean="0">
+                <a:rPr kumimoji="0" lang="en-US" sz="1600" b="0" i="1" u="none" strike="noStrike" cap="none" normalizeH="0" baseline="0" dirty="0">
                   <a:ln>
                     <a:noFill/>
                   </a:ln>
@@ -21543,7 +21438,7 @@
                 <a:tabLst/>
               </a:pPr>
               <a:r>
-                <a:rPr kumimoji="0" lang="en-US" sz="1600" b="0" i="1" u="none" strike="noStrike" cap="none" normalizeH="0" baseline="0" dirty="0" smtClean="0">
+                <a:rPr kumimoji="0" lang="en-US" sz="1600" b="0" i="1" u="none" strike="noStrike" cap="none" normalizeH="0" baseline="0" dirty="0">
                   <a:ln>
                     <a:noFill/>
                   </a:ln>
@@ -21748,7 +21643,7 @@
                 <a:buNone/>
                 <a:tabLst/>
               </a:pPr>
-              <a:endParaRPr kumimoji="0" lang="en-US" sz="1600" b="0" i="0" u="none" strike="noStrike" cap="none" normalizeH="0" baseline="0" smtClean="0">
+              <a:endParaRPr kumimoji="0" lang="en-US" sz="1600" b="0" i="0" u="none" strike="noStrike" cap="none" normalizeH="0" baseline="0">
                 <a:ln>
                   <a:noFill/>
                 </a:ln>
@@ -21811,7 +21706,7 @@
                 <a:buNone/>
                 <a:tabLst/>
               </a:pPr>
-              <a:endParaRPr kumimoji="0" lang="en-US" sz="1600" b="0" i="0" u="none" strike="noStrike" cap="none" normalizeH="0" baseline="0" smtClean="0">
+              <a:endParaRPr kumimoji="0" lang="en-US" sz="1600" b="0" i="0" u="none" strike="noStrike" cap="none" normalizeH="0" baseline="0">
                 <a:ln>
                   <a:noFill/>
                 </a:ln>
@@ -21874,7 +21769,7 @@
                 <a:buNone/>
                 <a:tabLst/>
               </a:pPr>
-              <a:endParaRPr kumimoji="0" lang="en-US" sz="1600" b="0" i="0" u="none" strike="noStrike" cap="none" normalizeH="0" baseline="0" smtClean="0">
+              <a:endParaRPr kumimoji="0" lang="en-US" sz="1600" b="0" i="0" u="none" strike="noStrike" cap="none" normalizeH="0" baseline="0">
                 <a:ln>
                   <a:noFill/>
                 </a:ln>
@@ -21910,14 +21805,11 @@
             <a:lstStyle/>
             <a:p>
               <a:r>
-                <a:rPr lang="en-US" i="1" dirty="0" smtClean="0">
+                <a:rPr lang="en-US" i="1" dirty="0">
                   <a:latin typeface="+mn-lt"/>
                 </a:rPr>
                 <a:t>q</a:t>
               </a:r>
-              <a:endParaRPr lang="en-US" i="1" dirty="0">
-                <a:latin typeface="+mn-lt"/>
-              </a:endParaRPr>
             </a:p>
           </p:txBody>
         </p:sp>
@@ -21944,14 +21836,11 @@
             <a:lstStyle/>
             <a:p>
               <a:r>
-                <a:rPr lang="en-US" i="1" dirty="0" smtClean="0">
+                <a:rPr lang="en-US" i="1" dirty="0">
                   <a:latin typeface="+mn-lt"/>
                 </a:rPr>
                 <a:t>p</a:t>
               </a:r>
-              <a:endParaRPr lang="en-US" i="1" dirty="0">
-                <a:latin typeface="+mn-lt"/>
-              </a:endParaRPr>
             </a:p>
           </p:txBody>
         </p:sp>
@@ -21977,7 +21866,7 @@
           <a:lstStyle/>
           <a:p>
             <a:r>
-              <a:rPr lang="en-US" dirty="0" err="1" smtClean="0"/>
+              <a:rPr lang="en-US" dirty="0" err="1"/>
               <a:t>sptProof</a:t>
             </a:r>
             <a:endParaRPr lang="en-US" dirty="0"/>
@@ -21997,11 +21886,11 @@
   <p:clrMapOvr>
     <a:masterClrMapping/>
   </p:clrMapOvr>
-  <p:transition xmlns:p14="http://schemas.microsoft.com/office/powerpoint/2010/main" advTm="265000"/>
+  <p:transition advTm="265000"/>
   <p:timing>
     <p:tnLst>
       <p:par>
-        <p:cTn xmlns:p14="http://schemas.microsoft.com/office/powerpoint/2010/main" id="1" dur="indefinite" restart="never" nodeType="tmRoot">
+        <p:cTn id="1" dur="indefinite" restart="never" nodeType="tmRoot">
           <p:childTnLst>
             <p:seq concurrent="1" nextAc="seek">
               <p:cTn id="2" dur="indefinite" nodeType="mainSeq">
@@ -22104,764 +21993,6 @@
           <a:chExt cx="0" cy="0"/>
         </a:xfrm>
       </p:grpSpPr>
-      <p:grpSp>
-        <p:nvGrpSpPr>
-          <p:cNvPr id="2" name="Group 58"/>
-          <p:cNvGrpSpPr>
-            <a:grpSpLocks/>
-          </p:cNvGrpSpPr>
-          <p:nvPr/>
-        </p:nvGrpSpPr>
-        <p:grpSpPr bwMode="auto">
-          <a:xfrm>
-            <a:off x="3762375" y="4172028"/>
-            <a:ext cx="1016000" cy="2487613"/>
-            <a:chOff x="2192" y="2190"/>
-            <a:chExt cx="571" cy="1401"/>
-          </a:xfrm>
-        </p:grpSpPr>
-        <p:sp>
-          <p:nvSpPr>
-            <p:cNvPr id="341017" name="Oval 25"/>
-            <p:cNvSpPr>
-              <a:spLocks noChangeArrowheads="1"/>
-            </p:cNvSpPr>
-            <p:nvPr/>
-          </p:nvSpPr>
-          <p:spPr bwMode="auto">
-            <a:xfrm>
-              <a:off x="2358" y="2250"/>
-              <a:ext cx="96" cy="96"/>
-            </a:xfrm>
-            <a:prstGeom prst="ellipse">
-              <a:avLst/>
-            </a:prstGeom>
-            <a:solidFill>
-              <a:schemeClr val="accent1"/>
-            </a:solidFill>
-            <a:ln w="12700">
-              <a:solidFill>
-                <a:schemeClr val="tx1"/>
-              </a:solidFill>
-              <a:round/>
-              <a:headEnd type="none" w="sm" len="sm"/>
-              <a:tailEnd type="none" w="sm" len="sm"/>
-            </a:ln>
-            <a:effectLst/>
-          </p:spPr>
-          <p:txBody>
-            <a:bodyPr wrap="none" anchor="ctr"/>
-            <a:lstStyle/>
-            <a:p>
-              <a:endParaRPr lang="en-US">
-                <a:latin typeface="+mn-lt"/>
-              </a:endParaRPr>
-            </a:p>
-          </p:txBody>
-        </p:sp>
-        <p:sp>
-          <p:nvSpPr>
-            <p:cNvPr id="341018" name="Line 26"/>
-            <p:cNvSpPr>
-              <a:spLocks noChangeShapeType="1"/>
-            </p:cNvSpPr>
-            <p:nvPr/>
-          </p:nvSpPr>
-          <p:spPr bwMode="auto">
-            <a:xfrm>
-              <a:off x="2406" y="2346"/>
-              <a:ext cx="0" cy="528"/>
-            </a:xfrm>
-            <a:prstGeom prst="line">
-              <a:avLst/>
-            </a:prstGeom>
-            <a:noFill/>
-            <a:ln w="12700">
-              <a:solidFill>
-                <a:schemeClr val="tx1"/>
-              </a:solidFill>
-              <a:round/>
-              <a:headEnd type="none" w="sm" len="sm"/>
-              <a:tailEnd type="triangle" w="med" len="med"/>
-            </a:ln>
-            <a:effectLst/>
-          </p:spPr>
-          <p:txBody>
-            <a:bodyPr wrap="none" anchor="ctr"/>
-            <a:lstStyle/>
-            <a:p>
-              <a:endParaRPr lang="en-US">
-                <a:latin typeface="+mn-lt"/>
-              </a:endParaRPr>
-            </a:p>
-          </p:txBody>
-        </p:sp>
-        <p:sp>
-          <p:nvSpPr>
-            <p:cNvPr id="341019" name="Oval 27"/>
-            <p:cNvSpPr>
-              <a:spLocks noChangeArrowheads="1"/>
-            </p:cNvSpPr>
-            <p:nvPr/>
-          </p:nvSpPr>
-          <p:spPr bwMode="auto">
-            <a:xfrm>
-              <a:off x="2667" y="2562"/>
-              <a:ext cx="96" cy="96"/>
-            </a:xfrm>
-            <a:prstGeom prst="ellipse">
-              <a:avLst/>
-            </a:prstGeom>
-            <a:solidFill>
-              <a:schemeClr val="accent1"/>
-            </a:solidFill>
-            <a:ln w="12700">
-              <a:solidFill>
-                <a:schemeClr val="tx1"/>
-              </a:solidFill>
-              <a:round/>
-              <a:headEnd type="none" w="sm" len="sm"/>
-              <a:tailEnd type="none" w="sm" len="sm"/>
-            </a:ln>
-            <a:effectLst/>
-          </p:spPr>
-          <p:txBody>
-            <a:bodyPr wrap="none" anchor="ctr"/>
-            <a:lstStyle/>
-            <a:p>
-              <a:endParaRPr lang="en-US">
-                <a:latin typeface="+mn-lt"/>
-              </a:endParaRPr>
-            </a:p>
-          </p:txBody>
-        </p:sp>
-        <p:sp>
-          <p:nvSpPr>
-            <p:cNvPr id="341020" name="Oval 28"/>
-            <p:cNvSpPr>
-              <a:spLocks noChangeArrowheads="1"/>
-            </p:cNvSpPr>
-            <p:nvPr/>
-          </p:nvSpPr>
-          <p:spPr bwMode="auto">
-            <a:xfrm>
-              <a:off x="2358" y="2874"/>
-              <a:ext cx="96" cy="96"/>
-            </a:xfrm>
-            <a:prstGeom prst="ellipse">
-              <a:avLst/>
-            </a:prstGeom>
-            <a:solidFill>
-              <a:schemeClr val="accent1"/>
-            </a:solidFill>
-            <a:ln w="12700">
-              <a:solidFill>
-                <a:schemeClr val="tx1"/>
-              </a:solidFill>
-              <a:round/>
-              <a:headEnd type="none" w="sm" len="sm"/>
-              <a:tailEnd type="none" w="sm" len="sm"/>
-            </a:ln>
-            <a:effectLst/>
-          </p:spPr>
-          <p:txBody>
-            <a:bodyPr wrap="none" anchor="ctr"/>
-            <a:lstStyle/>
-            <a:p>
-              <a:endParaRPr lang="en-US">
-                <a:latin typeface="+mn-lt"/>
-              </a:endParaRPr>
-            </a:p>
-          </p:txBody>
-        </p:sp>
-        <p:sp>
-          <p:nvSpPr>
-            <p:cNvPr id="341021" name="Line 29"/>
-            <p:cNvSpPr>
-              <a:spLocks noChangeShapeType="1"/>
-            </p:cNvSpPr>
-            <p:nvPr/>
-          </p:nvSpPr>
-          <p:spPr bwMode="auto">
-            <a:xfrm>
-              <a:off x="2445" y="2331"/>
-              <a:ext cx="240" cy="240"/>
-            </a:xfrm>
-            <a:prstGeom prst="line">
-              <a:avLst/>
-            </a:prstGeom>
-            <a:noFill/>
-            <a:ln w="12700">
-              <a:solidFill>
-                <a:schemeClr val="tx1"/>
-              </a:solidFill>
-              <a:round/>
-              <a:headEnd type="none" w="sm" len="sm"/>
-              <a:tailEnd type="triangle" w="med" len="med"/>
-            </a:ln>
-            <a:effectLst/>
-          </p:spPr>
-          <p:txBody>
-            <a:bodyPr wrap="none" anchor="ctr"/>
-            <a:lstStyle/>
-            <a:p>
-              <a:endParaRPr lang="en-US">
-                <a:latin typeface="+mn-lt"/>
-              </a:endParaRPr>
-            </a:p>
-          </p:txBody>
-        </p:sp>
-        <p:sp>
-          <p:nvSpPr>
-            <p:cNvPr id="341022" name="Line 30"/>
-            <p:cNvSpPr>
-              <a:spLocks noChangeShapeType="1"/>
-            </p:cNvSpPr>
-            <p:nvPr/>
-          </p:nvSpPr>
-          <p:spPr bwMode="auto">
-            <a:xfrm flipH="1">
-              <a:off x="2442" y="2652"/>
-              <a:ext cx="240" cy="240"/>
-            </a:xfrm>
-            <a:prstGeom prst="line">
-              <a:avLst/>
-            </a:prstGeom>
-            <a:noFill/>
-            <a:ln w="12700">
-              <a:solidFill>
-                <a:schemeClr val="tx1"/>
-              </a:solidFill>
-              <a:round/>
-              <a:headEnd type="none" w="sm" len="sm"/>
-              <a:tailEnd type="triangle" w="med" len="med"/>
-            </a:ln>
-            <a:effectLst/>
-          </p:spPr>
-          <p:txBody>
-            <a:bodyPr wrap="none" anchor="ctr"/>
-            <a:lstStyle/>
-            <a:p>
-              <a:endParaRPr lang="en-US">
-                <a:latin typeface="+mn-lt"/>
-              </a:endParaRPr>
-            </a:p>
-          </p:txBody>
-        </p:sp>
-        <p:sp>
-          <p:nvSpPr>
-            <p:cNvPr id="341023" name="Text Box 31"/>
-            <p:cNvSpPr txBox="1">
-              <a:spLocks noChangeArrowheads="1"/>
-            </p:cNvSpPr>
-            <p:nvPr/>
-          </p:nvSpPr>
-          <p:spPr bwMode="auto">
-            <a:xfrm>
-              <a:off x="2322" y="2496"/>
-              <a:ext cx="73" cy="139"/>
-            </a:xfrm>
-            <a:prstGeom prst="rect">
-              <a:avLst/>
-            </a:prstGeom>
-            <a:noFill/>
-            <a:ln w="12700">
-              <a:noFill/>
-              <a:miter lim="800000"/>
-              <a:headEnd type="none" w="sm" len="sm"/>
-              <a:tailEnd type="none" w="sm" len="sm"/>
-            </a:ln>
-            <a:effectLst/>
-          </p:spPr>
-          <p:txBody>
-            <a:bodyPr wrap="none" lIns="0" tIns="0" rIns="0" bIns="0">
-              <a:spAutoFit/>
-            </a:bodyPr>
-            <a:lstStyle/>
-            <a:p>
-              <a:pPr algn="l">
-                <a:spcBef>
-                  <a:spcPct val="50000"/>
-                </a:spcBef>
-              </a:pPr>
-              <a:r>
-                <a:rPr lang="en-US">
-                  <a:latin typeface="+mn-lt"/>
-                </a:rPr>
-                <a:t>2</a:t>
-              </a:r>
-            </a:p>
-          </p:txBody>
-        </p:sp>
-        <p:sp>
-          <p:nvSpPr>
-            <p:cNvPr id="341024" name="Text Box 32"/>
-            <p:cNvSpPr txBox="1">
-              <a:spLocks noChangeArrowheads="1"/>
-            </p:cNvSpPr>
-            <p:nvPr/>
-          </p:nvSpPr>
-          <p:spPr bwMode="auto">
-            <a:xfrm>
-              <a:off x="2549" y="2289"/>
-              <a:ext cx="73" cy="139"/>
-            </a:xfrm>
-            <a:prstGeom prst="rect">
-              <a:avLst/>
-            </a:prstGeom>
-            <a:noFill/>
-            <a:ln w="12700">
-              <a:noFill/>
-              <a:miter lim="800000"/>
-              <a:headEnd type="none" w="sm" len="sm"/>
-              <a:tailEnd type="none" w="sm" len="sm"/>
-            </a:ln>
-            <a:effectLst/>
-          </p:spPr>
-          <p:txBody>
-            <a:bodyPr wrap="none" lIns="0" tIns="0" rIns="0" bIns="0">
-              <a:spAutoFit/>
-            </a:bodyPr>
-            <a:lstStyle/>
-            <a:p>
-              <a:pPr algn="l">
-                <a:spcBef>
-                  <a:spcPct val="50000"/>
-                </a:spcBef>
-              </a:pPr>
-              <a:r>
-                <a:rPr lang="en-US">
-                  <a:latin typeface="+mn-lt"/>
-                </a:rPr>
-                <a:t>2</a:t>
-              </a:r>
-            </a:p>
-          </p:txBody>
-        </p:sp>
-        <p:sp>
-          <p:nvSpPr>
-            <p:cNvPr id="341025" name="Text Box 33"/>
-            <p:cNvSpPr txBox="1">
-              <a:spLocks noChangeArrowheads="1"/>
-            </p:cNvSpPr>
-            <p:nvPr/>
-          </p:nvSpPr>
-          <p:spPr bwMode="auto">
-            <a:xfrm>
-              <a:off x="2564" y="2736"/>
-              <a:ext cx="73" cy="139"/>
-            </a:xfrm>
-            <a:prstGeom prst="rect">
-              <a:avLst/>
-            </a:prstGeom>
-            <a:noFill/>
-            <a:ln w="12700">
-              <a:noFill/>
-              <a:miter lim="800000"/>
-              <a:headEnd type="none" w="sm" len="sm"/>
-              <a:tailEnd type="none" w="sm" len="sm"/>
-            </a:ln>
-            <a:effectLst/>
-          </p:spPr>
-          <p:txBody>
-            <a:bodyPr wrap="none" lIns="0" tIns="0" rIns="0" bIns="0">
-              <a:spAutoFit/>
-            </a:bodyPr>
-            <a:lstStyle/>
-            <a:p>
-              <a:pPr algn="l">
-                <a:spcBef>
-                  <a:spcPct val="50000"/>
-                </a:spcBef>
-              </a:pPr>
-              <a:r>
-                <a:rPr lang="en-US">
-                  <a:latin typeface="+mn-lt"/>
-                </a:rPr>
-                <a:t>2</a:t>
-              </a:r>
-            </a:p>
-          </p:txBody>
-        </p:sp>
-        <p:sp>
-          <p:nvSpPr>
-            <p:cNvPr id="341026" name="Line 34"/>
-            <p:cNvSpPr>
-              <a:spLocks noChangeShapeType="1"/>
-            </p:cNvSpPr>
-            <p:nvPr/>
-          </p:nvSpPr>
-          <p:spPr bwMode="auto">
-            <a:xfrm>
-              <a:off x="2406" y="2967"/>
-              <a:ext cx="0" cy="528"/>
-            </a:xfrm>
-            <a:prstGeom prst="line">
-              <a:avLst/>
-            </a:prstGeom>
-            <a:noFill/>
-            <a:ln w="12700">
-              <a:solidFill>
-                <a:schemeClr val="tx1"/>
-              </a:solidFill>
-              <a:round/>
-              <a:headEnd type="none" w="sm" len="sm"/>
-              <a:tailEnd type="triangle" w="med" len="med"/>
-            </a:ln>
-            <a:effectLst/>
-          </p:spPr>
-          <p:txBody>
-            <a:bodyPr wrap="none" anchor="ctr"/>
-            <a:lstStyle/>
-            <a:p>
-              <a:endParaRPr lang="en-US">
-                <a:latin typeface="+mn-lt"/>
-              </a:endParaRPr>
-            </a:p>
-          </p:txBody>
-        </p:sp>
-        <p:sp>
-          <p:nvSpPr>
-            <p:cNvPr id="341027" name="Oval 35"/>
-            <p:cNvSpPr>
-              <a:spLocks noChangeArrowheads="1"/>
-            </p:cNvSpPr>
-            <p:nvPr/>
-          </p:nvSpPr>
-          <p:spPr bwMode="auto">
-            <a:xfrm>
-              <a:off x="2667" y="3183"/>
-              <a:ext cx="96" cy="96"/>
-            </a:xfrm>
-            <a:prstGeom prst="ellipse">
-              <a:avLst/>
-            </a:prstGeom>
-            <a:solidFill>
-              <a:schemeClr val="accent1"/>
-            </a:solidFill>
-            <a:ln w="12700">
-              <a:solidFill>
-                <a:schemeClr val="tx1"/>
-              </a:solidFill>
-              <a:round/>
-              <a:headEnd type="none" w="sm" len="sm"/>
-              <a:tailEnd type="none" w="sm" len="sm"/>
-            </a:ln>
-            <a:effectLst/>
-          </p:spPr>
-          <p:txBody>
-            <a:bodyPr wrap="none" anchor="ctr"/>
-            <a:lstStyle/>
-            <a:p>
-              <a:endParaRPr lang="en-US">
-                <a:latin typeface="+mn-lt"/>
-              </a:endParaRPr>
-            </a:p>
-          </p:txBody>
-        </p:sp>
-        <p:sp>
-          <p:nvSpPr>
-            <p:cNvPr id="341028" name="Oval 36"/>
-            <p:cNvSpPr>
-              <a:spLocks noChangeArrowheads="1"/>
-            </p:cNvSpPr>
-            <p:nvPr/>
-          </p:nvSpPr>
-          <p:spPr bwMode="auto">
-            <a:xfrm>
-              <a:off x="2358" y="3495"/>
-              <a:ext cx="96" cy="96"/>
-            </a:xfrm>
-            <a:prstGeom prst="ellipse">
-              <a:avLst/>
-            </a:prstGeom>
-            <a:solidFill>
-              <a:schemeClr val="accent1"/>
-            </a:solidFill>
-            <a:ln w="12700">
-              <a:solidFill>
-                <a:schemeClr val="tx1"/>
-              </a:solidFill>
-              <a:round/>
-              <a:headEnd type="none" w="sm" len="sm"/>
-              <a:tailEnd type="none" w="sm" len="sm"/>
-            </a:ln>
-            <a:effectLst/>
-          </p:spPr>
-          <p:txBody>
-            <a:bodyPr wrap="none" anchor="ctr"/>
-            <a:lstStyle/>
-            <a:p>
-              <a:endParaRPr lang="en-US">
-                <a:latin typeface="+mn-lt"/>
-              </a:endParaRPr>
-            </a:p>
-          </p:txBody>
-        </p:sp>
-        <p:sp>
-          <p:nvSpPr>
-            <p:cNvPr id="341029" name="Line 37"/>
-            <p:cNvSpPr>
-              <a:spLocks noChangeShapeType="1"/>
-            </p:cNvSpPr>
-            <p:nvPr/>
-          </p:nvSpPr>
-          <p:spPr bwMode="auto">
-            <a:xfrm>
-              <a:off x="2445" y="2952"/>
-              <a:ext cx="240" cy="240"/>
-            </a:xfrm>
-            <a:prstGeom prst="line">
-              <a:avLst/>
-            </a:prstGeom>
-            <a:noFill/>
-            <a:ln w="12700">
-              <a:solidFill>
-                <a:schemeClr val="tx1"/>
-              </a:solidFill>
-              <a:round/>
-              <a:headEnd type="none" w="sm" len="sm"/>
-              <a:tailEnd type="triangle" w="med" len="med"/>
-            </a:ln>
-            <a:effectLst/>
-          </p:spPr>
-          <p:txBody>
-            <a:bodyPr wrap="none" anchor="ctr"/>
-            <a:lstStyle/>
-            <a:p>
-              <a:endParaRPr lang="en-US">
-                <a:latin typeface="+mn-lt"/>
-              </a:endParaRPr>
-            </a:p>
-          </p:txBody>
-        </p:sp>
-        <p:sp>
-          <p:nvSpPr>
-            <p:cNvPr id="341030" name="Line 38"/>
-            <p:cNvSpPr>
-              <a:spLocks noChangeShapeType="1"/>
-            </p:cNvSpPr>
-            <p:nvPr/>
-          </p:nvSpPr>
-          <p:spPr bwMode="auto">
-            <a:xfrm flipH="1">
-              <a:off x="2442" y="3273"/>
-              <a:ext cx="240" cy="240"/>
-            </a:xfrm>
-            <a:prstGeom prst="line">
-              <a:avLst/>
-            </a:prstGeom>
-            <a:noFill/>
-            <a:ln w="12700">
-              <a:solidFill>
-                <a:schemeClr val="tx1"/>
-              </a:solidFill>
-              <a:round/>
-              <a:headEnd type="none" w="sm" len="sm"/>
-              <a:tailEnd type="triangle" w="med" len="med"/>
-            </a:ln>
-            <a:effectLst/>
-          </p:spPr>
-          <p:txBody>
-            <a:bodyPr wrap="none" anchor="ctr"/>
-            <a:lstStyle/>
-            <a:p>
-              <a:endParaRPr lang="en-US">
-                <a:latin typeface="+mn-lt"/>
-              </a:endParaRPr>
-            </a:p>
-          </p:txBody>
-        </p:sp>
-        <p:sp>
-          <p:nvSpPr>
-            <p:cNvPr id="341031" name="Text Box 39"/>
-            <p:cNvSpPr txBox="1">
-              <a:spLocks noChangeArrowheads="1"/>
-            </p:cNvSpPr>
-            <p:nvPr/>
-          </p:nvSpPr>
-          <p:spPr bwMode="auto">
-            <a:xfrm>
-              <a:off x="2322" y="3117"/>
-              <a:ext cx="73" cy="139"/>
-            </a:xfrm>
-            <a:prstGeom prst="rect">
-              <a:avLst/>
-            </a:prstGeom>
-            <a:noFill/>
-            <a:ln w="12700">
-              <a:noFill/>
-              <a:miter lim="800000"/>
-              <a:headEnd type="none" w="sm" len="sm"/>
-              <a:tailEnd type="none" w="sm" len="sm"/>
-            </a:ln>
-            <a:effectLst/>
-          </p:spPr>
-          <p:txBody>
-            <a:bodyPr wrap="none" lIns="0" tIns="0" rIns="0" bIns="0">
-              <a:spAutoFit/>
-            </a:bodyPr>
-            <a:lstStyle/>
-            <a:p>
-              <a:pPr algn="l">
-                <a:spcBef>
-                  <a:spcPct val="50000"/>
-                </a:spcBef>
-              </a:pPr>
-              <a:r>
-                <a:rPr lang="en-US">
-                  <a:latin typeface="+mn-lt"/>
-                </a:rPr>
-                <a:t>1</a:t>
-              </a:r>
-            </a:p>
-          </p:txBody>
-        </p:sp>
-        <p:sp>
-          <p:nvSpPr>
-            <p:cNvPr id="341032" name="Text Box 40"/>
-            <p:cNvSpPr txBox="1">
-              <a:spLocks noChangeArrowheads="1"/>
-            </p:cNvSpPr>
-            <p:nvPr/>
-          </p:nvSpPr>
-          <p:spPr bwMode="auto">
-            <a:xfrm>
-              <a:off x="2555" y="2910"/>
-              <a:ext cx="73" cy="139"/>
-            </a:xfrm>
-            <a:prstGeom prst="rect">
-              <a:avLst/>
-            </a:prstGeom>
-            <a:noFill/>
-            <a:ln w="12700">
-              <a:noFill/>
-              <a:miter lim="800000"/>
-              <a:headEnd type="none" w="sm" len="sm"/>
-              <a:tailEnd type="none" w="sm" len="sm"/>
-            </a:ln>
-            <a:effectLst/>
-          </p:spPr>
-          <p:txBody>
-            <a:bodyPr wrap="none" lIns="0" tIns="0" rIns="0" bIns="0">
-              <a:spAutoFit/>
-            </a:bodyPr>
-            <a:lstStyle/>
-            <a:p>
-              <a:pPr algn="l">
-                <a:spcBef>
-                  <a:spcPct val="50000"/>
-                </a:spcBef>
-              </a:pPr>
-              <a:r>
-                <a:rPr lang="en-US">
-                  <a:latin typeface="+mn-lt"/>
-                </a:rPr>
-                <a:t>1</a:t>
-              </a:r>
-            </a:p>
-          </p:txBody>
-        </p:sp>
-        <p:sp>
-          <p:nvSpPr>
-            <p:cNvPr id="341033" name="Text Box 41"/>
-            <p:cNvSpPr txBox="1">
-              <a:spLocks noChangeArrowheads="1"/>
-            </p:cNvSpPr>
-            <p:nvPr/>
-          </p:nvSpPr>
-          <p:spPr bwMode="auto">
-            <a:xfrm>
-              <a:off x="2570" y="3357"/>
-              <a:ext cx="73" cy="139"/>
-            </a:xfrm>
-            <a:prstGeom prst="rect">
-              <a:avLst/>
-            </a:prstGeom>
-            <a:noFill/>
-            <a:ln w="12700">
-              <a:noFill/>
-              <a:miter lim="800000"/>
-              <a:headEnd type="none" w="sm" len="sm"/>
-              <a:tailEnd type="none" w="sm" len="sm"/>
-            </a:ln>
-            <a:effectLst/>
-          </p:spPr>
-          <p:txBody>
-            <a:bodyPr wrap="none" lIns="0" tIns="0" rIns="0" bIns="0">
-              <a:spAutoFit/>
-            </a:bodyPr>
-            <a:lstStyle/>
-            <a:p>
-              <a:pPr algn="l">
-                <a:spcBef>
-                  <a:spcPct val="50000"/>
-                </a:spcBef>
-              </a:pPr>
-              <a:r>
-                <a:rPr lang="en-US">
-                  <a:latin typeface="+mn-lt"/>
-                </a:rPr>
-                <a:t>1</a:t>
-              </a:r>
-            </a:p>
-          </p:txBody>
-        </p:sp>
-        <p:sp>
-          <p:nvSpPr>
-            <p:cNvPr id="341045" name="Text Box 53"/>
-            <p:cNvSpPr txBox="1">
-              <a:spLocks noChangeArrowheads="1"/>
-            </p:cNvSpPr>
-            <p:nvPr/>
-          </p:nvSpPr>
-          <p:spPr bwMode="auto">
-            <a:xfrm>
-              <a:off x="2192" y="2190"/>
-              <a:ext cx="138" cy="139"/>
-            </a:xfrm>
-            <a:prstGeom prst="rect">
-              <a:avLst/>
-            </a:prstGeom>
-            <a:noFill/>
-            <a:ln w="12700">
-              <a:noFill/>
-              <a:miter lim="800000"/>
-              <a:headEnd type="none" w="sm" len="sm"/>
-              <a:tailEnd type="none" w="sm" len="sm"/>
-            </a:ln>
-            <a:effectLst/>
-          </p:spPr>
-          <p:txBody>
-            <a:bodyPr wrap="none" lIns="0" tIns="0" rIns="0" bIns="0">
-              <a:spAutoFit/>
-            </a:bodyPr>
-            <a:lstStyle/>
-            <a:p>
-              <a:pPr algn="l">
-                <a:spcBef>
-                  <a:spcPct val="50000"/>
-                </a:spcBef>
-              </a:pPr>
-              <a:r>
-                <a:rPr lang="en-US" i="1">
-                  <a:latin typeface="+mn-lt"/>
-                </a:rPr>
-                <a:t>G</a:t>
-              </a:r>
-              <a:r>
-                <a:rPr lang="en-US" baseline="-25000">
-                  <a:latin typeface="+mn-lt"/>
-                </a:rPr>
-                <a:t>2</a:t>
-              </a:r>
-              <a:endParaRPr lang="en-US">
-                <a:latin typeface="+mn-lt"/>
-              </a:endParaRPr>
-            </a:p>
-          </p:txBody>
-        </p:sp>
-      </p:grpSp>
       <p:grpSp>
         <p:nvGrpSpPr>
           <p:cNvPr id="3" name="Group 55"/>
@@ -23986,16 +23117,1096 @@
           </p:txBody>
         </p:sp>
       </p:grpSp>
+      <p:grpSp>
+        <p:nvGrpSpPr>
+          <p:cNvPr id="5" name="Group 4">
+            <a:extLst>
+              <a:ext uri="{FF2B5EF4-FFF2-40B4-BE49-F238E27FC236}">
+                <a16:creationId xmlns:a16="http://schemas.microsoft.com/office/drawing/2014/main" id="{F4D31CD7-0D54-8F48-BF2A-2C004C8D918C}"/>
+              </a:ext>
+            </a:extLst>
+          </p:cNvPr>
+          <p:cNvGrpSpPr/>
+          <p:nvPr/>
+        </p:nvGrpSpPr>
+        <p:grpSpPr>
+          <a:xfrm>
+            <a:off x="1057479" y="1628517"/>
+            <a:ext cx="3489050" cy="906265"/>
+            <a:chOff x="1057479" y="1628517"/>
+            <a:chExt cx="3489050" cy="906265"/>
+          </a:xfrm>
+        </p:grpSpPr>
+        <p:sp>
+          <p:nvSpPr>
+            <p:cNvPr id="341017" name="Oval 25"/>
+            <p:cNvSpPr>
+              <a:spLocks noChangeArrowheads="1"/>
+            </p:cNvSpPr>
+            <p:nvPr/>
+          </p:nvSpPr>
+          <p:spPr bwMode="auto">
+            <a:xfrm rot="16200000">
+              <a:off x="2165273" y="2181631"/>
+              <a:ext cx="170816" cy="170457"/>
+            </a:xfrm>
+            <a:prstGeom prst="ellipse">
+              <a:avLst/>
+            </a:prstGeom>
+            <a:solidFill>
+              <a:schemeClr val="accent1"/>
+            </a:solidFill>
+            <a:ln w="12700">
+              <a:solidFill>
+                <a:schemeClr val="tx1"/>
+              </a:solidFill>
+              <a:round/>
+              <a:headEnd type="none" w="sm" len="sm"/>
+              <a:tailEnd type="none" w="sm" len="sm"/>
+            </a:ln>
+            <a:effectLst/>
+          </p:spPr>
+          <p:txBody>
+            <a:bodyPr wrap="none" anchor="ctr"/>
+            <a:lstStyle/>
+            <a:p>
+              <a:endParaRPr lang="en-US">
+                <a:latin typeface="+mn-lt"/>
+              </a:endParaRPr>
+            </a:p>
+          </p:txBody>
+        </p:sp>
+        <p:sp>
+          <p:nvSpPr>
+            <p:cNvPr id="341018" name="Line 26"/>
+            <p:cNvSpPr>
+              <a:spLocks noChangeShapeType="1"/>
+            </p:cNvSpPr>
+            <p:nvPr/>
+          </p:nvSpPr>
+          <p:spPr bwMode="auto">
+            <a:xfrm rot="16200000">
+              <a:off x="2804668" y="1798102"/>
+              <a:ext cx="0" cy="937516"/>
+            </a:xfrm>
+            <a:prstGeom prst="line">
+              <a:avLst/>
+            </a:prstGeom>
+            <a:noFill/>
+            <a:ln w="12700">
+              <a:solidFill>
+                <a:schemeClr val="tx1"/>
+              </a:solidFill>
+              <a:round/>
+              <a:headEnd type="none" w="sm" len="sm"/>
+              <a:tailEnd type="triangle" w="med" len="med"/>
+            </a:ln>
+            <a:effectLst/>
+          </p:spPr>
+          <p:txBody>
+            <a:bodyPr wrap="none" anchor="ctr"/>
+            <a:lstStyle/>
+            <a:p>
+              <a:endParaRPr lang="en-US">
+                <a:latin typeface="+mn-lt"/>
+              </a:endParaRPr>
+            </a:p>
+          </p:txBody>
+        </p:sp>
+        <p:sp>
+          <p:nvSpPr>
+            <p:cNvPr id="341019" name="Oval 27"/>
+            <p:cNvSpPr>
+              <a:spLocks noChangeArrowheads="1"/>
+            </p:cNvSpPr>
+            <p:nvPr/>
+          </p:nvSpPr>
+          <p:spPr bwMode="auto">
+            <a:xfrm rot="16200000">
+              <a:off x="2719260" y="1631817"/>
+              <a:ext cx="170816" cy="170457"/>
+            </a:xfrm>
+            <a:prstGeom prst="ellipse">
+              <a:avLst/>
+            </a:prstGeom>
+            <a:solidFill>
+              <a:schemeClr val="accent1"/>
+            </a:solidFill>
+            <a:ln w="12700">
+              <a:solidFill>
+                <a:schemeClr val="tx1"/>
+              </a:solidFill>
+              <a:round/>
+              <a:headEnd type="none" w="sm" len="sm"/>
+              <a:tailEnd type="none" w="sm" len="sm"/>
+            </a:ln>
+            <a:effectLst/>
+          </p:spPr>
+          <p:txBody>
+            <a:bodyPr wrap="none" anchor="ctr"/>
+            <a:lstStyle/>
+            <a:p>
+              <a:endParaRPr lang="en-US">
+                <a:latin typeface="+mn-lt"/>
+              </a:endParaRPr>
+            </a:p>
+          </p:txBody>
+        </p:sp>
+        <p:sp>
+          <p:nvSpPr>
+            <p:cNvPr id="341020" name="Oval 28"/>
+            <p:cNvSpPr>
+              <a:spLocks noChangeArrowheads="1"/>
+            </p:cNvSpPr>
+            <p:nvPr/>
+          </p:nvSpPr>
+          <p:spPr bwMode="auto">
+            <a:xfrm rot="16200000">
+              <a:off x="3273246" y="2181631"/>
+              <a:ext cx="170816" cy="170457"/>
+            </a:xfrm>
+            <a:prstGeom prst="ellipse">
+              <a:avLst/>
+            </a:prstGeom>
+            <a:solidFill>
+              <a:schemeClr val="accent1"/>
+            </a:solidFill>
+            <a:ln w="12700">
+              <a:solidFill>
+                <a:schemeClr val="tx1"/>
+              </a:solidFill>
+              <a:round/>
+              <a:headEnd type="none" w="sm" len="sm"/>
+              <a:tailEnd type="none" w="sm" len="sm"/>
+            </a:ln>
+            <a:effectLst/>
+          </p:spPr>
+          <p:txBody>
+            <a:bodyPr wrap="none" anchor="ctr"/>
+            <a:lstStyle/>
+            <a:p>
+              <a:endParaRPr lang="en-US">
+                <a:latin typeface="+mn-lt"/>
+              </a:endParaRPr>
+            </a:p>
+          </p:txBody>
+        </p:sp>
+        <p:sp>
+          <p:nvSpPr>
+            <p:cNvPr id="341021" name="Line 29"/>
+            <p:cNvSpPr>
+              <a:spLocks noChangeShapeType="1"/>
+            </p:cNvSpPr>
+            <p:nvPr/>
+          </p:nvSpPr>
+          <p:spPr bwMode="auto">
+            <a:xfrm rot="16200000">
+              <a:off x="2308827" y="1770874"/>
+              <a:ext cx="427040" cy="426144"/>
+            </a:xfrm>
+            <a:prstGeom prst="line">
+              <a:avLst/>
+            </a:prstGeom>
+            <a:noFill/>
+            <a:ln w="12700">
+              <a:solidFill>
+                <a:schemeClr val="tx1"/>
+              </a:solidFill>
+              <a:round/>
+              <a:headEnd type="none" w="sm" len="sm"/>
+              <a:tailEnd type="triangle" w="med" len="med"/>
+            </a:ln>
+            <a:effectLst/>
+          </p:spPr>
+          <p:txBody>
+            <a:bodyPr wrap="none" anchor="ctr"/>
+            <a:lstStyle/>
+            <a:p>
+              <a:endParaRPr lang="en-US">
+                <a:latin typeface="+mn-lt"/>
+              </a:endParaRPr>
+            </a:p>
+          </p:txBody>
+        </p:sp>
+        <p:sp>
+          <p:nvSpPr>
+            <p:cNvPr id="341022" name="Line 30"/>
+            <p:cNvSpPr>
+              <a:spLocks noChangeShapeType="1"/>
+            </p:cNvSpPr>
+            <p:nvPr/>
+          </p:nvSpPr>
+          <p:spPr bwMode="auto">
+            <a:xfrm rot="16200000" flipH="1">
+              <a:off x="2878794" y="1776212"/>
+              <a:ext cx="427040" cy="426144"/>
+            </a:xfrm>
+            <a:prstGeom prst="line">
+              <a:avLst/>
+            </a:prstGeom>
+            <a:noFill/>
+            <a:ln w="12700">
+              <a:solidFill>
+                <a:schemeClr val="tx1"/>
+              </a:solidFill>
+              <a:round/>
+              <a:headEnd type="none" w="sm" len="sm"/>
+              <a:tailEnd type="triangle" w="med" len="med"/>
+            </a:ln>
+            <a:effectLst/>
+          </p:spPr>
+          <p:txBody>
+            <a:bodyPr wrap="none" anchor="ctr"/>
+            <a:lstStyle/>
+            <a:p>
+              <a:endParaRPr lang="en-US">
+                <a:latin typeface="+mn-lt"/>
+              </a:endParaRPr>
+            </a:p>
+          </p:txBody>
+        </p:sp>
+        <p:sp>
+          <p:nvSpPr>
+            <p:cNvPr id="341023" name="Text Box 31"/>
+            <p:cNvSpPr txBox="1">
+              <a:spLocks noChangeArrowheads="1"/>
+            </p:cNvSpPr>
+            <p:nvPr/>
+          </p:nvSpPr>
+          <p:spPr bwMode="auto">
+            <a:xfrm>
+              <a:off x="2660708" y="2287974"/>
+              <a:ext cx="129891" cy="246808"/>
+            </a:xfrm>
+            <a:prstGeom prst="rect">
+              <a:avLst/>
+            </a:prstGeom>
+            <a:noFill/>
+            <a:ln w="12700">
+              <a:noFill/>
+              <a:miter lim="800000"/>
+              <a:headEnd type="none" w="sm" len="sm"/>
+              <a:tailEnd type="none" w="sm" len="sm"/>
+            </a:ln>
+            <a:effectLst/>
+          </p:spPr>
+          <p:txBody>
+            <a:bodyPr wrap="none" lIns="0" tIns="0" rIns="0" bIns="0">
+              <a:spAutoFit/>
+            </a:bodyPr>
+            <a:lstStyle/>
+            <a:p>
+              <a:pPr algn="l">
+                <a:spcBef>
+                  <a:spcPct val="50000"/>
+                </a:spcBef>
+              </a:pPr>
+              <a:r>
+                <a:rPr lang="en-US" dirty="0">
+                  <a:latin typeface="+mn-lt"/>
+                </a:rPr>
+                <a:t>3</a:t>
+              </a:r>
+            </a:p>
+          </p:txBody>
+        </p:sp>
+        <p:sp>
+          <p:nvSpPr>
+            <p:cNvPr id="341024" name="Text Box 32"/>
+            <p:cNvSpPr txBox="1">
+              <a:spLocks noChangeArrowheads="1"/>
+            </p:cNvSpPr>
+            <p:nvPr/>
+          </p:nvSpPr>
+          <p:spPr bwMode="auto">
+            <a:xfrm>
+              <a:off x="2293159" y="1763905"/>
+              <a:ext cx="129891" cy="246808"/>
+            </a:xfrm>
+            <a:prstGeom prst="rect">
+              <a:avLst/>
+            </a:prstGeom>
+            <a:noFill/>
+            <a:ln w="12700">
+              <a:noFill/>
+              <a:miter lim="800000"/>
+              <a:headEnd type="none" w="sm" len="sm"/>
+              <a:tailEnd type="none" w="sm" len="sm"/>
+            </a:ln>
+            <a:effectLst/>
+          </p:spPr>
+          <p:txBody>
+            <a:bodyPr wrap="none" lIns="0" tIns="0" rIns="0" bIns="0">
+              <a:spAutoFit/>
+            </a:bodyPr>
+            <a:lstStyle/>
+            <a:p>
+              <a:pPr algn="l">
+                <a:spcBef>
+                  <a:spcPct val="50000"/>
+                </a:spcBef>
+              </a:pPr>
+              <a:r>
+                <a:rPr lang="en-US" dirty="0">
+                  <a:latin typeface="+mn-lt"/>
+                </a:rPr>
+                <a:t>2</a:t>
+              </a:r>
+            </a:p>
+          </p:txBody>
+        </p:sp>
+        <p:sp>
+          <p:nvSpPr>
+            <p:cNvPr id="341025" name="Text Box 33"/>
+            <p:cNvSpPr txBox="1">
+              <a:spLocks noChangeArrowheads="1"/>
+            </p:cNvSpPr>
+            <p:nvPr/>
+          </p:nvSpPr>
+          <p:spPr bwMode="auto">
+            <a:xfrm>
+              <a:off x="3122947" y="1763905"/>
+              <a:ext cx="129891" cy="246808"/>
+            </a:xfrm>
+            <a:prstGeom prst="rect">
+              <a:avLst/>
+            </a:prstGeom>
+            <a:noFill/>
+            <a:ln w="12700">
+              <a:noFill/>
+              <a:miter lim="800000"/>
+              <a:headEnd type="none" w="sm" len="sm"/>
+              <a:tailEnd type="none" w="sm" len="sm"/>
+            </a:ln>
+            <a:effectLst/>
+          </p:spPr>
+          <p:txBody>
+            <a:bodyPr wrap="none" lIns="0" tIns="0" rIns="0" bIns="0">
+              <a:spAutoFit/>
+            </a:bodyPr>
+            <a:lstStyle/>
+            <a:p>
+              <a:pPr algn="l">
+                <a:spcBef>
+                  <a:spcPct val="50000"/>
+                </a:spcBef>
+              </a:pPr>
+              <a:r>
+                <a:rPr lang="en-US" dirty="0">
+                  <a:latin typeface="+mn-lt"/>
+                </a:rPr>
+                <a:t>2</a:t>
+              </a:r>
+            </a:p>
+          </p:txBody>
+        </p:sp>
+        <p:sp>
+          <p:nvSpPr>
+            <p:cNvPr id="341026" name="Line 34"/>
+            <p:cNvSpPr>
+              <a:spLocks noChangeShapeType="1"/>
+            </p:cNvSpPr>
+            <p:nvPr/>
+          </p:nvSpPr>
+          <p:spPr bwMode="auto">
+            <a:xfrm rot="16200000">
+              <a:off x="3907314" y="1798102"/>
+              <a:ext cx="0" cy="937516"/>
+            </a:xfrm>
+            <a:prstGeom prst="line">
+              <a:avLst/>
+            </a:prstGeom>
+            <a:noFill/>
+            <a:ln w="12700">
+              <a:solidFill>
+                <a:schemeClr val="tx1"/>
+              </a:solidFill>
+              <a:round/>
+              <a:headEnd type="none" w="sm" len="sm"/>
+              <a:tailEnd type="triangle" w="med" len="med"/>
+            </a:ln>
+            <a:effectLst/>
+          </p:spPr>
+          <p:txBody>
+            <a:bodyPr wrap="none" anchor="ctr"/>
+            <a:lstStyle/>
+            <a:p>
+              <a:endParaRPr lang="en-US">
+                <a:latin typeface="+mn-lt"/>
+              </a:endParaRPr>
+            </a:p>
+          </p:txBody>
+        </p:sp>
+        <p:sp>
+          <p:nvSpPr>
+            <p:cNvPr id="341027" name="Oval 35"/>
+            <p:cNvSpPr>
+              <a:spLocks noChangeArrowheads="1"/>
+            </p:cNvSpPr>
+            <p:nvPr/>
+          </p:nvSpPr>
+          <p:spPr bwMode="auto">
+            <a:xfrm rot="16200000">
+              <a:off x="3821906" y="1631817"/>
+              <a:ext cx="170816" cy="170457"/>
+            </a:xfrm>
+            <a:prstGeom prst="ellipse">
+              <a:avLst/>
+            </a:prstGeom>
+            <a:solidFill>
+              <a:schemeClr val="accent1"/>
+            </a:solidFill>
+            <a:ln w="12700">
+              <a:solidFill>
+                <a:schemeClr val="tx1"/>
+              </a:solidFill>
+              <a:round/>
+              <a:headEnd type="none" w="sm" len="sm"/>
+              <a:tailEnd type="none" w="sm" len="sm"/>
+            </a:ln>
+            <a:effectLst/>
+          </p:spPr>
+          <p:txBody>
+            <a:bodyPr wrap="none" anchor="ctr"/>
+            <a:lstStyle/>
+            <a:p>
+              <a:endParaRPr lang="en-US">
+                <a:latin typeface="+mn-lt"/>
+              </a:endParaRPr>
+            </a:p>
+          </p:txBody>
+        </p:sp>
+        <p:sp>
+          <p:nvSpPr>
+            <p:cNvPr id="341028" name="Oval 36"/>
+            <p:cNvSpPr>
+              <a:spLocks noChangeArrowheads="1"/>
+            </p:cNvSpPr>
+            <p:nvPr/>
+          </p:nvSpPr>
+          <p:spPr bwMode="auto">
+            <a:xfrm rot="16200000">
+              <a:off x="4375893" y="2181631"/>
+              <a:ext cx="170816" cy="170457"/>
+            </a:xfrm>
+            <a:prstGeom prst="ellipse">
+              <a:avLst/>
+            </a:prstGeom>
+            <a:solidFill>
+              <a:schemeClr val="accent1"/>
+            </a:solidFill>
+            <a:ln w="12700">
+              <a:solidFill>
+                <a:schemeClr val="tx1"/>
+              </a:solidFill>
+              <a:round/>
+              <a:headEnd type="none" w="sm" len="sm"/>
+              <a:tailEnd type="none" w="sm" len="sm"/>
+            </a:ln>
+            <a:effectLst/>
+          </p:spPr>
+          <p:txBody>
+            <a:bodyPr wrap="none" anchor="ctr"/>
+            <a:lstStyle/>
+            <a:p>
+              <a:endParaRPr lang="en-US">
+                <a:latin typeface="+mn-lt"/>
+              </a:endParaRPr>
+            </a:p>
+          </p:txBody>
+        </p:sp>
+        <p:sp>
+          <p:nvSpPr>
+            <p:cNvPr id="341029" name="Line 37"/>
+            <p:cNvSpPr>
+              <a:spLocks noChangeShapeType="1"/>
+            </p:cNvSpPr>
+            <p:nvPr/>
+          </p:nvSpPr>
+          <p:spPr bwMode="auto">
+            <a:xfrm rot="16200000">
+              <a:off x="3411474" y="1770874"/>
+              <a:ext cx="427040" cy="426144"/>
+            </a:xfrm>
+            <a:prstGeom prst="line">
+              <a:avLst/>
+            </a:prstGeom>
+            <a:noFill/>
+            <a:ln w="12700">
+              <a:solidFill>
+                <a:schemeClr val="tx1"/>
+              </a:solidFill>
+              <a:round/>
+              <a:headEnd type="none" w="sm" len="sm"/>
+              <a:tailEnd type="triangle" w="med" len="med"/>
+            </a:ln>
+            <a:effectLst/>
+          </p:spPr>
+          <p:txBody>
+            <a:bodyPr wrap="none" anchor="ctr"/>
+            <a:lstStyle/>
+            <a:p>
+              <a:endParaRPr lang="en-US">
+                <a:latin typeface="+mn-lt"/>
+              </a:endParaRPr>
+            </a:p>
+          </p:txBody>
+        </p:sp>
+        <p:sp>
+          <p:nvSpPr>
+            <p:cNvPr id="341030" name="Line 38"/>
+            <p:cNvSpPr>
+              <a:spLocks noChangeShapeType="1"/>
+            </p:cNvSpPr>
+            <p:nvPr/>
+          </p:nvSpPr>
+          <p:spPr bwMode="auto">
+            <a:xfrm rot="16200000" flipH="1">
+              <a:off x="3981441" y="1776212"/>
+              <a:ext cx="427040" cy="426144"/>
+            </a:xfrm>
+            <a:prstGeom prst="line">
+              <a:avLst/>
+            </a:prstGeom>
+            <a:noFill/>
+            <a:ln w="12700">
+              <a:solidFill>
+                <a:schemeClr val="tx1"/>
+              </a:solidFill>
+              <a:round/>
+              <a:headEnd type="none" w="sm" len="sm"/>
+              <a:tailEnd type="triangle" w="med" len="med"/>
+            </a:ln>
+            <a:effectLst/>
+          </p:spPr>
+          <p:txBody>
+            <a:bodyPr wrap="none" anchor="ctr"/>
+            <a:lstStyle/>
+            <a:p>
+              <a:endParaRPr lang="en-US">
+                <a:latin typeface="+mn-lt"/>
+              </a:endParaRPr>
+            </a:p>
+          </p:txBody>
+        </p:sp>
+        <p:sp>
+          <p:nvSpPr>
+            <p:cNvPr id="341031" name="Text Box 39"/>
+            <p:cNvSpPr txBox="1">
+              <a:spLocks noChangeArrowheads="1"/>
+            </p:cNvSpPr>
+            <p:nvPr/>
+          </p:nvSpPr>
+          <p:spPr bwMode="auto">
+            <a:xfrm>
+              <a:off x="3763354" y="2287974"/>
+              <a:ext cx="335028" cy="246221"/>
+            </a:xfrm>
+            <a:prstGeom prst="rect">
+              <a:avLst/>
+            </a:prstGeom>
+            <a:noFill/>
+            <a:ln w="12700">
+              <a:noFill/>
+              <a:miter lim="800000"/>
+              <a:headEnd type="none" w="sm" len="sm"/>
+              <a:tailEnd type="none" w="sm" len="sm"/>
+            </a:ln>
+            <a:effectLst/>
+          </p:spPr>
+          <p:txBody>
+            <a:bodyPr wrap="none" lIns="0" tIns="0" rIns="0" bIns="0">
+              <a:spAutoFit/>
+            </a:bodyPr>
+            <a:lstStyle/>
+            <a:p>
+              <a:pPr algn="l">
+                <a:spcBef>
+                  <a:spcPct val="50000"/>
+                </a:spcBef>
+              </a:pPr>
+              <a:r>
+                <a:rPr lang="en-US" dirty="0">
+                  <a:latin typeface="+mn-lt"/>
+                </a:rPr>
+                <a:t>1.5</a:t>
+              </a:r>
+            </a:p>
+          </p:txBody>
+        </p:sp>
+        <p:sp>
+          <p:nvSpPr>
+            <p:cNvPr id="341032" name="Text Box 40"/>
+            <p:cNvSpPr txBox="1">
+              <a:spLocks noChangeArrowheads="1"/>
+            </p:cNvSpPr>
+            <p:nvPr/>
+          </p:nvSpPr>
+          <p:spPr bwMode="auto">
+            <a:xfrm>
+              <a:off x="3443934" y="1763905"/>
+              <a:ext cx="129891" cy="246808"/>
+            </a:xfrm>
+            <a:prstGeom prst="rect">
+              <a:avLst/>
+            </a:prstGeom>
+            <a:noFill/>
+            <a:ln w="12700">
+              <a:noFill/>
+              <a:miter lim="800000"/>
+              <a:headEnd type="none" w="sm" len="sm"/>
+              <a:tailEnd type="none" w="sm" len="sm"/>
+            </a:ln>
+            <a:effectLst/>
+          </p:spPr>
+          <p:txBody>
+            <a:bodyPr wrap="none" lIns="0" tIns="0" rIns="0" bIns="0">
+              <a:spAutoFit/>
+            </a:bodyPr>
+            <a:lstStyle/>
+            <a:p>
+              <a:pPr algn="l">
+                <a:spcBef>
+                  <a:spcPct val="50000"/>
+                </a:spcBef>
+              </a:pPr>
+              <a:r>
+                <a:rPr lang="en-US" dirty="0">
+                  <a:latin typeface="+mn-lt"/>
+                </a:rPr>
+                <a:t>1</a:t>
+              </a:r>
+            </a:p>
+          </p:txBody>
+        </p:sp>
+        <p:sp>
+          <p:nvSpPr>
+            <p:cNvPr id="341033" name="Text Box 41"/>
+            <p:cNvSpPr txBox="1">
+              <a:spLocks noChangeArrowheads="1"/>
+            </p:cNvSpPr>
+            <p:nvPr/>
+          </p:nvSpPr>
+          <p:spPr bwMode="auto">
+            <a:xfrm>
+              <a:off x="4225594" y="1763905"/>
+              <a:ext cx="129891" cy="246808"/>
+            </a:xfrm>
+            <a:prstGeom prst="rect">
+              <a:avLst/>
+            </a:prstGeom>
+            <a:noFill/>
+            <a:ln w="12700">
+              <a:noFill/>
+              <a:miter lim="800000"/>
+              <a:headEnd type="none" w="sm" len="sm"/>
+              <a:tailEnd type="none" w="sm" len="sm"/>
+            </a:ln>
+            <a:effectLst/>
+          </p:spPr>
+          <p:txBody>
+            <a:bodyPr wrap="none" lIns="0" tIns="0" rIns="0" bIns="0">
+              <a:spAutoFit/>
+            </a:bodyPr>
+            <a:lstStyle/>
+            <a:p>
+              <a:pPr algn="l">
+                <a:spcBef>
+                  <a:spcPct val="50000"/>
+                </a:spcBef>
+              </a:pPr>
+              <a:r>
+                <a:rPr lang="en-US">
+                  <a:latin typeface="+mn-lt"/>
+                </a:rPr>
+                <a:t>1</a:t>
+              </a:r>
+            </a:p>
+          </p:txBody>
+        </p:sp>
+        <p:sp>
+          <p:nvSpPr>
+            <p:cNvPr id="45" name="Oval 25">
+              <a:extLst>
+                <a:ext uri="{FF2B5EF4-FFF2-40B4-BE49-F238E27FC236}">
+                  <a16:creationId xmlns:a16="http://schemas.microsoft.com/office/drawing/2014/main" id="{A3CC3EEE-F18B-584E-BF05-55DF336ED959}"/>
+                </a:ext>
+              </a:extLst>
+            </p:cNvPr>
+            <p:cNvSpPr>
+              <a:spLocks noChangeArrowheads="1"/>
+            </p:cNvSpPr>
+            <p:nvPr/>
+          </p:nvSpPr>
+          <p:spPr bwMode="auto">
+            <a:xfrm rot="16200000">
+              <a:off x="1057300" y="2178510"/>
+              <a:ext cx="170816" cy="170457"/>
+            </a:xfrm>
+            <a:prstGeom prst="ellipse">
+              <a:avLst/>
+            </a:prstGeom>
+            <a:solidFill>
+              <a:schemeClr val="accent1"/>
+            </a:solidFill>
+            <a:ln w="12700">
+              <a:solidFill>
+                <a:schemeClr val="tx1"/>
+              </a:solidFill>
+              <a:round/>
+              <a:headEnd type="none" w="sm" len="sm"/>
+              <a:tailEnd type="none" w="sm" len="sm"/>
+            </a:ln>
+            <a:effectLst/>
+          </p:spPr>
+          <p:txBody>
+            <a:bodyPr wrap="none" anchor="ctr"/>
+            <a:lstStyle/>
+            <a:p>
+              <a:endParaRPr lang="en-US">
+                <a:latin typeface="+mn-lt"/>
+              </a:endParaRPr>
+            </a:p>
+          </p:txBody>
+        </p:sp>
+        <p:sp>
+          <p:nvSpPr>
+            <p:cNvPr id="46" name="Line 26">
+              <a:extLst>
+                <a:ext uri="{FF2B5EF4-FFF2-40B4-BE49-F238E27FC236}">
+                  <a16:creationId xmlns:a16="http://schemas.microsoft.com/office/drawing/2014/main" id="{4267D31D-A34E-1940-B3EE-6AB760B2CB2B}"/>
+                </a:ext>
+              </a:extLst>
+            </p:cNvPr>
+            <p:cNvSpPr>
+              <a:spLocks noChangeShapeType="1"/>
+            </p:cNvSpPr>
+            <p:nvPr/>
+          </p:nvSpPr>
+          <p:spPr bwMode="auto">
+            <a:xfrm rot="16200000">
+              <a:off x="1696695" y="1794981"/>
+              <a:ext cx="0" cy="937516"/>
+            </a:xfrm>
+            <a:prstGeom prst="line">
+              <a:avLst/>
+            </a:prstGeom>
+            <a:noFill/>
+            <a:ln w="12700">
+              <a:solidFill>
+                <a:schemeClr val="tx1"/>
+              </a:solidFill>
+              <a:round/>
+              <a:headEnd type="none" w="sm" len="sm"/>
+              <a:tailEnd type="triangle" w="med" len="med"/>
+            </a:ln>
+            <a:effectLst/>
+          </p:spPr>
+          <p:txBody>
+            <a:bodyPr wrap="none" anchor="ctr"/>
+            <a:lstStyle/>
+            <a:p>
+              <a:endParaRPr lang="en-US">
+                <a:latin typeface="+mn-lt"/>
+              </a:endParaRPr>
+            </a:p>
+          </p:txBody>
+        </p:sp>
+        <p:sp>
+          <p:nvSpPr>
+            <p:cNvPr id="47" name="Oval 27">
+              <a:extLst>
+                <a:ext uri="{FF2B5EF4-FFF2-40B4-BE49-F238E27FC236}">
+                  <a16:creationId xmlns:a16="http://schemas.microsoft.com/office/drawing/2014/main" id="{26EA7EA8-D1B7-B941-87D5-BAE6DC365704}"/>
+                </a:ext>
+              </a:extLst>
+            </p:cNvPr>
+            <p:cNvSpPr>
+              <a:spLocks noChangeArrowheads="1"/>
+            </p:cNvSpPr>
+            <p:nvPr/>
+          </p:nvSpPr>
+          <p:spPr bwMode="auto">
+            <a:xfrm rot="16200000">
+              <a:off x="1611287" y="1628696"/>
+              <a:ext cx="170816" cy="170457"/>
+            </a:xfrm>
+            <a:prstGeom prst="ellipse">
+              <a:avLst/>
+            </a:prstGeom>
+            <a:solidFill>
+              <a:schemeClr val="accent1"/>
+            </a:solidFill>
+            <a:ln w="12700">
+              <a:solidFill>
+                <a:schemeClr val="tx1"/>
+              </a:solidFill>
+              <a:round/>
+              <a:headEnd type="none" w="sm" len="sm"/>
+              <a:tailEnd type="none" w="sm" len="sm"/>
+            </a:ln>
+            <a:effectLst/>
+          </p:spPr>
+          <p:txBody>
+            <a:bodyPr wrap="none" anchor="ctr"/>
+            <a:lstStyle/>
+            <a:p>
+              <a:endParaRPr lang="en-US">
+                <a:latin typeface="+mn-lt"/>
+              </a:endParaRPr>
+            </a:p>
+          </p:txBody>
+        </p:sp>
+        <p:sp>
+          <p:nvSpPr>
+            <p:cNvPr id="48" name="Line 29">
+              <a:extLst>
+                <a:ext uri="{FF2B5EF4-FFF2-40B4-BE49-F238E27FC236}">
+                  <a16:creationId xmlns:a16="http://schemas.microsoft.com/office/drawing/2014/main" id="{9855E969-E488-664A-9796-3F4AE086F8BC}"/>
+                </a:ext>
+              </a:extLst>
+            </p:cNvPr>
+            <p:cNvSpPr>
+              <a:spLocks noChangeShapeType="1"/>
+            </p:cNvSpPr>
+            <p:nvPr/>
+          </p:nvSpPr>
+          <p:spPr bwMode="auto">
+            <a:xfrm rot="16200000">
+              <a:off x="1200854" y="1767753"/>
+              <a:ext cx="427040" cy="426144"/>
+            </a:xfrm>
+            <a:prstGeom prst="line">
+              <a:avLst/>
+            </a:prstGeom>
+            <a:noFill/>
+            <a:ln w="12700">
+              <a:solidFill>
+                <a:schemeClr val="tx1"/>
+              </a:solidFill>
+              <a:round/>
+              <a:headEnd type="none" w="sm" len="sm"/>
+              <a:tailEnd type="triangle" w="med" len="med"/>
+            </a:ln>
+            <a:effectLst/>
+          </p:spPr>
+          <p:txBody>
+            <a:bodyPr wrap="none" anchor="ctr"/>
+            <a:lstStyle/>
+            <a:p>
+              <a:endParaRPr lang="en-US">
+                <a:latin typeface="+mn-lt"/>
+              </a:endParaRPr>
+            </a:p>
+          </p:txBody>
+        </p:sp>
+        <p:sp>
+          <p:nvSpPr>
+            <p:cNvPr id="49" name="Line 30">
+              <a:extLst>
+                <a:ext uri="{FF2B5EF4-FFF2-40B4-BE49-F238E27FC236}">
+                  <a16:creationId xmlns:a16="http://schemas.microsoft.com/office/drawing/2014/main" id="{ED029640-5C2C-D846-BFBA-0ABF38984149}"/>
+                </a:ext>
+              </a:extLst>
+            </p:cNvPr>
+            <p:cNvSpPr>
+              <a:spLocks noChangeShapeType="1"/>
+            </p:cNvSpPr>
+            <p:nvPr/>
+          </p:nvSpPr>
+          <p:spPr bwMode="auto">
+            <a:xfrm rot="16200000" flipH="1">
+              <a:off x="1770821" y="1773091"/>
+              <a:ext cx="427040" cy="426144"/>
+            </a:xfrm>
+            <a:prstGeom prst="line">
+              <a:avLst/>
+            </a:prstGeom>
+            <a:noFill/>
+            <a:ln w="12700">
+              <a:solidFill>
+                <a:schemeClr val="tx1"/>
+              </a:solidFill>
+              <a:round/>
+              <a:headEnd type="none" w="sm" len="sm"/>
+              <a:tailEnd type="triangle" w="med" len="med"/>
+            </a:ln>
+            <a:effectLst/>
+          </p:spPr>
+          <p:txBody>
+            <a:bodyPr wrap="none" anchor="ctr"/>
+            <a:lstStyle/>
+            <a:p>
+              <a:endParaRPr lang="en-US">
+                <a:latin typeface="+mn-lt"/>
+              </a:endParaRPr>
+            </a:p>
+          </p:txBody>
+        </p:sp>
+        <p:sp>
+          <p:nvSpPr>
+            <p:cNvPr id="50" name="Text Box 31">
+              <a:extLst>
+                <a:ext uri="{FF2B5EF4-FFF2-40B4-BE49-F238E27FC236}">
+                  <a16:creationId xmlns:a16="http://schemas.microsoft.com/office/drawing/2014/main" id="{EE422825-A310-B646-9010-26D81CFD7149}"/>
+                </a:ext>
+              </a:extLst>
+            </p:cNvPr>
+            <p:cNvSpPr txBox="1">
+              <a:spLocks noChangeArrowheads="1"/>
+            </p:cNvSpPr>
+            <p:nvPr/>
+          </p:nvSpPr>
+          <p:spPr bwMode="auto">
+            <a:xfrm>
+              <a:off x="1552735" y="2284853"/>
+              <a:ext cx="129891" cy="246808"/>
+            </a:xfrm>
+            <a:prstGeom prst="rect">
+              <a:avLst/>
+            </a:prstGeom>
+            <a:noFill/>
+            <a:ln w="12700">
+              <a:noFill/>
+              <a:miter lim="800000"/>
+              <a:headEnd type="none" w="sm" len="sm"/>
+              <a:tailEnd type="none" w="sm" len="sm"/>
+            </a:ln>
+            <a:effectLst/>
+          </p:spPr>
+          <p:txBody>
+            <a:bodyPr wrap="none" lIns="0" tIns="0" rIns="0" bIns="0">
+              <a:spAutoFit/>
+            </a:bodyPr>
+            <a:lstStyle/>
+            <a:p>
+              <a:pPr algn="l">
+                <a:spcBef>
+                  <a:spcPct val="50000"/>
+                </a:spcBef>
+              </a:pPr>
+              <a:r>
+                <a:rPr lang="en-US" dirty="0">
+                  <a:latin typeface="+mn-lt"/>
+                </a:rPr>
+                <a:t>6</a:t>
+              </a:r>
+            </a:p>
+          </p:txBody>
+        </p:sp>
+        <p:sp>
+          <p:nvSpPr>
+            <p:cNvPr id="51" name="Text Box 32">
+              <a:extLst>
+                <a:ext uri="{FF2B5EF4-FFF2-40B4-BE49-F238E27FC236}">
+                  <a16:creationId xmlns:a16="http://schemas.microsoft.com/office/drawing/2014/main" id="{FED971B0-DB99-D444-967C-F685D79D452E}"/>
+                </a:ext>
+              </a:extLst>
+            </p:cNvPr>
+            <p:cNvSpPr txBox="1">
+              <a:spLocks noChangeArrowheads="1"/>
+            </p:cNvSpPr>
+            <p:nvPr/>
+          </p:nvSpPr>
+          <p:spPr bwMode="auto">
+            <a:xfrm>
+              <a:off x="1185186" y="1760784"/>
+              <a:ext cx="129891" cy="246808"/>
+            </a:xfrm>
+            <a:prstGeom prst="rect">
+              <a:avLst/>
+            </a:prstGeom>
+            <a:noFill/>
+            <a:ln w="12700">
+              <a:noFill/>
+              <a:miter lim="800000"/>
+              <a:headEnd type="none" w="sm" len="sm"/>
+              <a:tailEnd type="none" w="sm" len="sm"/>
+            </a:ln>
+            <a:effectLst/>
+          </p:spPr>
+          <p:txBody>
+            <a:bodyPr wrap="none" lIns="0" tIns="0" rIns="0" bIns="0">
+              <a:spAutoFit/>
+            </a:bodyPr>
+            <a:lstStyle/>
+            <a:p>
+              <a:pPr algn="l">
+                <a:spcBef>
+                  <a:spcPct val="50000"/>
+                </a:spcBef>
+              </a:pPr>
+              <a:r>
+                <a:rPr lang="en-US" dirty="0">
+                  <a:latin typeface="+mn-lt"/>
+                </a:rPr>
+                <a:t>4</a:t>
+              </a:r>
+            </a:p>
+          </p:txBody>
+        </p:sp>
+        <p:sp>
+          <p:nvSpPr>
+            <p:cNvPr id="52" name="Text Box 33">
+              <a:extLst>
+                <a:ext uri="{FF2B5EF4-FFF2-40B4-BE49-F238E27FC236}">
+                  <a16:creationId xmlns:a16="http://schemas.microsoft.com/office/drawing/2014/main" id="{050507EC-55E1-0D43-A923-59489E3C9B51}"/>
+                </a:ext>
+              </a:extLst>
+            </p:cNvPr>
+            <p:cNvSpPr txBox="1">
+              <a:spLocks noChangeArrowheads="1"/>
+            </p:cNvSpPr>
+            <p:nvPr/>
+          </p:nvSpPr>
+          <p:spPr bwMode="auto">
+            <a:xfrm>
+              <a:off x="2014974" y="1760784"/>
+              <a:ext cx="129891" cy="246808"/>
+            </a:xfrm>
+            <a:prstGeom prst="rect">
+              <a:avLst/>
+            </a:prstGeom>
+            <a:noFill/>
+            <a:ln w="12700">
+              <a:noFill/>
+              <a:miter lim="800000"/>
+              <a:headEnd type="none" w="sm" len="sm"/>
+              <a:tailEnd type="none" w="sm" len="sm"/>
+            </a:ln>
+            <a:effectLst/>
+          </p:spPr>
+          <p:txBody>
+            <a:bodyPr wrap="none" lIns="0" tIns="0" rIns="0" bIns="0">
+              <a:spAutoFit/>
+            </a:bodyPr>
+            <a:lstStyle/>
+            <a:p>
+              <a:pPr algn="l">
+                <a:spcBef>
+                  <a:spcPct val="50000"/>
+                </a:spcBef>
+              </a:pPr>
+              <a:r>
+                <a:rPr lang="en-US" dirty="0">
+                  <a:latin typeface="+mn-lt"/>
+                </a:rPr>
+                <a:t>4</a:t>
+              </a:r>
+            </a:p>
+          </p:txBody>
+        </p:sp>
+      </p:grpSp>
     </p:spTree>
   </p:cSld>
   <p:clrMapOvr>
     <a:masterClrMapping/>
   </p:clrMapOvr>
-  <p:transition xmlns:p14="http://schemas.microsoft.com/office/powerpoint/2010/main"/>
+  <p:transition/>
   <p:timing>
     <p:tnLst>
       <p:par>
-        <p:cTn xmlns:p14="http://schemas.microsoft.com/office/powerpoint/2010/main" id="1" dur="indefinite" restart="never" nodeType="tmRoot">
+        <p:cTn id="1" dur="indefinite" restart="never" nodeType="tmRoot">
           <p:childTnLst>
             <p:seq concurrent="1" nextAc="seek">
               <p:cTn id="2" dur="indefinite" nodeType="mainSeq">
@@ -24053,74 +24264,30 @@
                             </p:childTnLst>
                           </p:cTn>
                         </p:par>
+                      </p:childTnLst>
+                    </p:cTn>
+                  </p:par>
+                  <p:par>
+                    <p:cTn id="8" fill="hold">
+                      <p:stCondLst>
+                        <p:cond delay="indefinite"/>
+                      </p:stCondLst>
+                      <p:childTnLst>
                         <p:par>
-                          <p:cTn id="8" fill="hold">
+                          <p:cTn id="9" fill="hold">
                             <p:stCondLst>
-                              <p:cond delay="500"/>
+                              <p:cond delay="0"/>
                             </p:stCondLst>
                             <p:childTnLst>
                               <p:par>
-                                <p:cTn id="9" presetID="9" presetClass="entr" presetSubtype="0" fill="hold" nodeType="afterEffect">
+                                <p:cTn id="10" presetID="9" presetClass="entr" presetSubtype="0" fill="hold" nodeType="clickEffect">
                                   <p:stCondLst>
                                     <p:cond delay="0"/>
                                   </p:stCondLst>
                                   <p:childTnLst>
                                     <p:set>
                                       <p:cBhvr>
-                                        <p:cTn id="10" dur="1" fill="hold">
-                                          <p:stCondLst>
-                                            <p:cond delay="0"/>
-                                          </p:stCondLst>
-                                        </p:cTn>
-                                        <p:tgtEl>
-                                          <p:spTgt spid="2"/>
-                                        </p:tgtEl>
-                                        <p:attrNameLst>
-                                          <p:attrName>style.visibility</p:attrName>
-                                        </p:attrNameLst>
-                                      </p:cBhvr>
-                                      <p:to>
-                                        <p:strVal val="visible"/>
-                                      </p:to>
-                                    </p:set>
-                                    <p:animEffect transition="in" filter="dissolve">
-                                      <p:cBhvr>
-                                        <p:cTn id="11" dur="500"/>
-                                        <p:tgtEl>
-                                          <p:spTgt spid="2"/>
-                                        </p:tgtEl>
-                                      </p:cBhvr>
-                                    </p:animEffect>
-                                  </p:childTnLst>
-                                </p:cTn>
-                              </p:par>
-                            </p:childTnLst>
-                          </p:cTn>
-                        </p:par>
-                      </p:childTnLst>
-                    </p:cTn>
-                  </p:par>
-                  <p:par>
-                    <p:cTn id="12" fill="hold">
-                      <p:stCondLst>
-                        <p:cond delay="indefinite"/>
-                      </p:stCondLst>
-                      <p:childTnLst>
-                        <p:par>
-                          <p:cTn id="13" fill="hold">
-                            <p:stCondLst>
-                              <p:cond delay="0"/>
-                            </p:stCondLst>
-                            <p:childTnLst>
-                              <p:par>
-                                <p:cTn id="14" presetID="9" presetClass="entr" presetSubtype="0" fill="hold" nodeType="clickEffect">
-                                  <p:stCondLst>
-                                    <p:cond delay="0"/>
-                                  </p:stCondLst>
-                                  <p:childTnLst>
-                                    <p:set>
-                                      <p:cBhvr>
-                                        <p:cTn id="15" dur="1" fill="hold">
+                                        <p:cTn id="11" dur="1" fill="hold">
                                           <p:stCondLst>
                                             <p:cond delay="0"/>
                                           </p:stCondLst>
@@ -24138,7 +24305,7 @@
                                     </p:set>
                                     <p:animEffect transition="in" filter="dissolve">
                                       <p:cBhvr>
-                                        <p:cTn id="16" dur="500"/>
+                                        <p:cTn id="12" dur="500"/>
                                         <p:tgtEl>
                                           <p:spTgt spid="4"/>
                                         </p:tgtEl>
@@ -24211,14 +24378,13 @@
           <a:lstStyle/>
           <a:p>
             <a:r>
-              <a:rPr lang="en-US" dirty="0" smtClean="0"/>
+              <a:rPr lang="en-US" dirty="0"/>
               <a:t>Worst-Case for </a:t>
             </a:r>
             <a:r>
-              <a:rPr lang="en-US" smtClean="0"/>
+              <a:rPr lang="en-US"/>
               <a:t>Dijkstra</a:t>
             </a:r>
-            <a:endParaRPr lang="en-US"/>
           </a:p>
         </p:txBody>
       </p:sp>
@@ -24289,7 +24455,7 @@
                 <a:tabLst/>
               </a:pPr>
               <a:r>
-                <a:rPr kumimoji="0" lang="en-US" sz="1600" b="0" i="1" u="none" strike="noStrike" cap="none" normalizeH="0" baseline="0" dirty="0" smtClean="0">
+                <a:rPr kumimoji="0" lang="en-US" sz="1600" b="0" i="1" u="none" strike="noStrike" cap="none" normalizeH="0" baseline="0" dirty="0">
                   <a:ln>
                     <a:noFill/>
                   </a:ln>
@@ -24357,7 +24523,7 @@
                 <a:tabLst/>
               </a:pPr>
               <a:r>
-                <a:rPr kumimoji="0" lang="en-US" sz="1600" b="0" i="1" u="none" strike="noStrike" cap="none" normalizeH="0" baseline="0" dirty="0" smtClean="0">
+                <a:rPr kumimoji="0" lang="en-US" sz="1600" b="0" i="1" u="none" strike="noStrike" cap="none" normalizeH="0" baseline="0" dirty="0">
                   <a:ln>
                     <a:noFill/>
                   </a:ln>
@@ -24425,7 +24591,7 @@
                 <a:tabLst/>
               </a:pPr>
               <a:r>
-                <a:rPr kumimoji="0" lang="en-US" sz="1600" b="0" i="1" u="none" strike="noStrike" cap="none" normalizeH="0" baseline="0" dirty="0" smtClean="0">
+                <a:rPr kumimoji="0" lang="en-US" sz="1600" b="0" i="1" u="none" strike="noStrike" cap="none" normalizeH="0" baseline="0" dirty="0">
                   <a:ln>
                     <a:noFill/>
                   </a:ln>
@@ -24493,7 +24659,7 @@
                 <a:tabLst/>
               </a:pPr>
               <a:r>
-                <a:rPr kumimoji="0" lang="en-US" sz="1600" b="0" i="1" u="none" strike="noStrike" cap="none" normalizeH="0" baseline="0" dirty="0" smtClean="0">
+                <a:rPr kumimoji="0" lang="en-US" sz="1600" b="0" i="1" u="none" strike="noStrike" cap="none" normalizeH="0" baseline="0" dirty="0">
                   <a:ln>
                     <a:noFill/>
                   </a:ln>
@@ -24561,7 +24727,7 @@
                 <a:tabLst/>
               </a:pPr>
               <a:r>
-                <a:rPr kumimoji="0" lang="en-US" sz="1600" b="0" i="1" u="none" strike="noStrike" cap="none" normalizeH="0" baseline="0" dirty="0" smtClean="0">
+                <a:rPr kumimoji="0" lang="en-US" sz="1600" b="0" i="1" u="none" strike="noStrike" cap="none" normalizeH="0" baseline="0" dirty="0">
                   <a:ln>
                     <a:noFill/>
                   </a:ln>
@@ -24629,7 +24795,7 @@
                 <a:tabLst/>
               </a:pPr>
               <a:r>
-                <a:rPr kumimoji="0" lang="en-US" sz="1600" b="0" i="1" u="none" strike="noStrike" cap="none" normalizeH="0" baseline="0" dirty="0" smtClean="0">
+                <a:rPr kumimoji="0" lang="en-US" sz="1600" b="0" i="1" u="none" strike="noStrike" cap="none" normalizeH="0" baseline="0" dirty="0">
                   <a:ln>
                     <a:noFill/>
                   </a:ln>
@@ -24797,14 +24963,11 @@
             <a:lstStyle/>
             <a:p>
               <a:r>
-                <a:rPr lang="en-US" dirty="0" smtClean="0">
+                <a:rPr lang="en-US" dirty="0">
                   <a:latin typeface="+mn-lt"/>
                 </a:rPr>
                 <a:t>1</a:t>
               </a:r>
-              <a:endParaRPr lang="en-US" dirty="0">
-                <a:latin typeface="+mn-lt"/>
-              </a:endParaRPr>
             </a:p>
           </p:txBody>
         </p:sp>
@@ -24833,14 +24996,11 @@
             <a:lstStyle/>
             <a:p>
               <a:r>
-                <a:rPr lang="en-US" dirty="0" smtClean="0">
+                <a:rPr lang="en-US" dirty="0">
                   <a:latin typeface="+mn-lt"/>
                 </a:rPr>
                 <a:t>1</a:t>
               </a:r>
-              <a:endParaRPr lang="en-US" dirty="0">
-                <a:latin typeface="+mn-lt"/>
-              </a:endParaRPr>
             </a:p>
           </p:txBody>
         </p:sp>
@@ -24869,14 +25029,11 @@
             <a:lstStyle/>
             <a:p>
               <a:r>
-                <a:rPr lang="en-US" dirty="0" smtClean="0">
+                <a:rPr lang="en-US" dirty="0">
                   <a:latin typeface="+mn-lt"/>
                 </a:rPr>
                 <a:t>1</a:t>
               </a:r>
-              <a:endParaRPr lang="en-US" dirty="0">
-                <a:latin typeface="+mn-lt"/>
-              </a:endParaRPr>
             </a:p>
           </p:txBody>
         </p:sp>
@@ -24905,14 +25062,11 @@
             <a:lstStyle/>
             <a:p>
               <a:r>
-                <a:rPr lang="en-US" dirty="0" smtClean="0">
+                <a:rPr lang="en-US" dirty="0">
                   <a:latin typeface="+mn-lt"/>
                 </a:rPr>
                 <a:t>1</a:t>
               </a:r>
-              <a:endParaRPr lang="en-US" dirty="0">
-                <a:latin typeface="+mn-lt"/>
-              </a:endParaRPr>
             </a:p>
           </p:txBody>
         </p:sp>
@@ -25313,14 +25467,11 @@
             <a:lstStyle/>
             <a:p>
               <a:r>
-                <a:rPr lang="en-US" dirty="0" smtClean="0">
+                <a:rPr lang="en-US" dirty="0">
                   <a:latin typeface="+mn-lt"/>
                 </a:rPr>
                 <a:t>1</a:t>
               </a:r>
-              <a:endParaRPr lang="en-US" dirty="0">
-                <a:latin typeface="+mn-lt"/>
-              </a:endParaRPr>
             </a:p>
           </p:txBody>
         </p:sp>
@@ -25349,14 +25500,11 @@
             <a:lstStyle/>
             <a:p>
               <a:r>
-                <a:rPr lang="en-US" dirty="0" smtClean="0">
+                <a:rPr lang="en-US" dirty="0">
                   <a:latin typeface="+mn-lt"/>
                 </a:rPr>
                 <a:t>3</a:t>
               </a:r>
-              <a:endParaRPr lang="en-US" dirty="0">
-                <a:latin typeface="+mn-lt"/>
-              </a:endParaRPr>
             </a:p>
           </p:txBody>
         </p:sp>
@@ -25385,14 +25533,11 @@
             <a:lstStyle/>
             <a:p>
               <a:r>
-                <a:rPr lang="en-US" dirty="0" smtClean="0">
+                <a:rPr lang="en-US" dirty="0">
                   <a:latin typeface="+mn-lt"/>
                 </a:rPr>
                 <a:t>3</a:t>
               </a:r>
-              <a:endParaRPr lang="en-US" dirty="0">
-                <a:latin typeface="+mn-lt"/>
-              </a:endParaRPr>
             </a:p>
           </p:txBody>
         </p:sp>
@@ -25421,14 +25566,11 @@
             <a:lstStyle/>
             <a:p>
               <a:r>
-                <a:rPr lang="en-US" dirty="0" smtClean="0">
+                <a:rPr lang="en-US" dirty="0">
                   <a:latin typeface="+mn-lt"/>
                 </a:rPr>
                 <a:t>3</a:t>
               </a:r>
-              <a:endParaRPr lang="en-US" dirty="0">
-                <a:latin typeface="+mn-lt"/>
-              </a:endParaRPr>
             </a:p>
           </p:txBody>
         </p:sp>
@@ -25457,14 +25599,11 @@
             <a:lstStyle/>
             <a:p>
               <a:r>
-                <a:rPr lang="en-US" dirty="0" smtClean="0">
+                <a:rPr lang="en-US" dirty="0">
                   <a:latin typeface="+mn-lt"/>
                 </a:rPr>
                 <a:t>3</a:t>
               </a:r>
-              <a:endParaRPr lang="en-US" dirty="0">
-                <a:latin typeface="+mn-lt"/>
-              </a:endParaRPr>
             </a:p>
           </p:txBody>
         </p:sp>
@@ -25493,14 +25632,11 @@
             <a:lstStyle/>
             <a:p>
               <a:r>
-                <a:rPr lang="en-US" dirty="0" smtClean="0">
+                <a:rPr lang="en-US" dirty="0">
                   <a:latin typeface="+mn-lt"/>
                 </a:rPr>
                 <a:t>5</a:t>
               </a:r>
-              <a:endParaRPr lang="en-US" dirty="0">
-                <a:latin typeface="+mn-lt"/>
-              </a:endParaRPr>
             </a:p>
           </p:txBody>
         </p:sp>
@@ -25529,14 +25665,11 @@
             <a:lstStyle/>
             <a:p>
               <a:r>
-                <a:rPr lang="en-US" dirty="0" smtClean="0">
+                <a:rPr lang="en-US" dirty="0">
                   <a:latin typeface="+mn-lt"/>
                 </a:rPr>
                 <a:t>5</a:t>
               </a:r>
-              <a:endParaRPr lang="en-US" dirty="0">
-                <a:latin typeface="+mn-lt"/>
-              </a:endParaRPr>
             </a:p>
           </p:txBody>
         </p:sp>
@@ -25565,14 +25698,11 @@
             <a:lstStyle/>
             <a:p>
               <a:r>
-                <a:rPr lang="en-US" dirty="0" smtClean="0">
+                <a:rPr lang="en-US" dirty="0">
                   <a:latin typeface="+mn-lt"/>
                 </a:rPr>
                 <a:t>5</a:t>
               </a:r>
-              <a:endParaRPr lang="en-US" dirty="0">
-                <a:latin typeface="+mn-lt"/>
-              </a:endParaRPr>
             </a:p>
           </p:txBody>
         </p:sp>
@@ -25601,14 +25731,11 @@
             <a:lstStyle/>
             <a:p>
               <a:r>
-                <a:rPr lang="en-US" dirty="0" smtClean="0">
+                <a:rPr lang="en-US" dirty="0">
                   <a:latin typeface="+mn-lt"/>
                 </a:rPr>
                 <a:t>9</a:t>
               </a:r>
-              <a:endParaRPr lang="en-US" dirty="0">
-                <a:latin typeface="+mn-lt"/>
-              </a:endParaRPr>
             </a:p>
           </p:txBody>
         </p:sp>
@@ -25637,14 +25764,11 @@
             <a:lstStyle/>
             <a:p>
               <a:r>
-                <a:rPr lang="en-US" dirty="0" smtClean="0">
+                <a:rPr lang="en-US" dirty="0">
                   <a:latin typeface="+mn-lt"/>
                 </a:rPr>
                 <a:t>7</a:t>
               </a:r>
-              <a:endParaRPr lang="en-US" dirty="0">
-                <a:latin typeface="+mn-lt"/>
-              </a:endParaRPr>
             </a:p>
           </p:txBody>
         </p:sp>
@@ -25673,14 +25797,11 @@
             <a:lstStyle/>
             <a:p>
               <a:r>
-                <a:rPr lang="en-US" dirty="0" smtClean="0">
+                <a:rPr lang="en-US" dirty="0">
                   <a:latin typeface="+mn-lt"/>
                 </a:rPr>
                 <a:t>7</a:t>
               </a:r>
-              <a:endParaRPr lang="en-US" dirty="0">
-                <a:latin typeface="+mn-lt"/>
-              </a:endParaRPr>
             </a:p>
           </p:txBody>
         </p:sp>
@@ -25693,7 +25814,7 @@
   <p:timing>
     <p:tnLst>
       <p:par>
-        <p:cTn xmlns:p14="http://schemas.microsoft.com/office/powerpoint/2010/main" id="1" dur="indefinite" restart="never" nodeType="tmRoot">
+        <p:cTn id="1" dur="indefinite" restart="never" nodeType="tmRoot">
           <p:childTnLst>
             <p:seq concurrent="1" nextAc="seek">
               <p:cTn id="2" dur="indefinite" nodeType="mainSeq">

</xml_diff>

<commit_message>
updates to min cost flow chapter
</commit_message>
<xml_diff>
--- a/graphAlgorithms/shortPaths.pptx
+++ b/graphAlgorithms/shortPaths.pptx
@@ -24475,1424 +24475,6 @@
       </p:sp>
       <p:grpSp>
         <p:nvGrpSpPr>
-          <p:cNvPr id="162" name="Group 161"/>
-          <p:cNvGrpSpPr/>
-          <p:nvPr/>
-        </p:nvGrpSpPr>
-        <p:grpSpPr>
-          <a:xfrm>
-            <a:off x="480705" y="1147309"/>
-            <a:ext cx="4302125" cy="1795621"/>
-            <a:chOff x="1584325" y="1917700"/>
-            <a:chExt cx="4302125" cy="1795621"/>
-          </a:xfrm>
-        </p:grpSpPr>
-        <p:sp>
-          <p:nvSpPr>
-            <p:cNvPr id="5" name="Oval 4"/>
-            <p:cNvSpPr/>
-            <p:nvPr/>
-          </p:nvSpPr>
-          <p:spPr bwMode="auto">
-            <a:xfrm>
-              <a:off x="1584325" y="2611438"/>
-              <a:ext cx="295275" cy="295275"/>
-            </a:xfrm>
-            <a:prstGeom prst="ellipse">
-              <a:avLst/>
-            </a:prstGeom>
-            <a:solidFill>
-              <a:srgbClr val="CCFFFF"/>
-            </a:solidFill>
-            <a:ln w="12700" cap="flat" cmpd="sng" algn="ctr">
-              <a:solidFill>
-                <a:schemeClr val="tx1"/>
-              </a:solidFill>
-              <a:prstDash val="solid"/>
-              <a:round/>
-              <a:headEnd type="none" w="sm" len="sm"/>
-              <a:tailEnd type="none" w="sm" len="sm"/>
-            </a:ln>
-            <a:effectLst/>
-          </p:spPr>
-          <p:txBody>
-            <a:bodyPr vert="horz" wrap="none" lIns="0" tIns="0" rIns="0" bIns="0" numCol="1" rtlCol="0" anchor="ctr" anchorCtr="1" compatLnSpc="1">
-              <a:prstTxWarp prst="textNoShape">
-                <a:avLst/>
-              </a:prstTxWarp>
-            </a:bodyPr>
-            <a:lstStyle/>
-            <a:p>
-              <a:pPr marL="0" marR="0" indent="0" algn="l" defTabSz="914400" rtl="0" eaLnBrk="0" fontAlgn="base" latinLnBrk="0" hangingPunct="0">
-                <a:lnSpc>
-                  <a:spcPct val="100000"/>
-                </a:lnSpc>
-                <a:spcBef>
-                  <a:spcPct val="0"/>
-                </a:spcBef>
-                <a:spcAft>
-                  <a:spcPct val="0"/>
-                </a:spcAft>
-                <a:buClrTx/>
-                <a:buSzTx/>
-                <a:buFontTx/>
-                <a:buNone/>
-                <a:tabLst/>
-              </a:pPr>
-              <a:r>
-                <a:rPr kumimoji="0" lang="en-US" sz="1600" b="0" i="1" u="none" strike="noStrike" cap="none" normalizeH="0" baseline="0" dirty="0">
-                  <a:ln>
-                    <a:noFill/>
-                  </a:ln>
-                  <a:solidFill>
-                    <a:schemeClr val="tx2"/>
-                  </a:solidFill>
-                  <a:effectLst/>
-                  <a:latin typeface="+mn-lt"/>
-                </a:rPr>
-                <a:t>a</a:t>
-              </a:r>
-            </a:p>
-          </p:txBody>
-        </p:sp>
-        <p:sp>
-          <p:nvSpPr>
-            <p:cNvPr id="6" name="Oval 5"/>
-            <p:cNvSpPr/>
-            <p:nvPr/>
-          </p:nvSpPr>
-          <p:spPr bwMode="auto">
-            <a:xfrm>
-              <a:off x="2385695" y="2611438"/>
-              <a:ext cx="295275" cy="295275"/>
-            </a:xfrm>
-            <a:prstGeom prst="ellipse">
-              <a:avLst/>
-            </a:prstGeom>
-            <a:solidFill>
-              <a:srgbClr val="CCFFFF"/>
-            </a:solidFill>
-            <a:ln w="12700" cap="flat" cmpd="sng" algn="ctr">
-              <a:solidFill>
-                <a:schemeClr val="tx1"/>
-              </a:solidFill>
-              <a:prstDash val="solid"/>
-              <a:round/>
-              <a:headEnd type="none" w="sm" len="sm"/>
-              <a:tailEnd type="none" w="sm" len="sm"/>
-            </a:ln>
-            <a:effectLst/>
-          </p:spPr>
-          <p:txBody>
-            <a:bodyPr vert="horz" wrap="none" lIns="0" tIns="0" rIns="0" bIns="0" numCol="1" rtlCol="0" anchor="ctr" anchorCtr="1" compatLnSpc="1">
-              <a:prstTxWarp prst="textNoShape">
-                <a:avLst/>
-              </a:prstTxWarp>
-            </a:bodyPr>
-            <a:lstStyle/>
-            <a:p>
-              <a:pPr marL="0" marR="0" indent="0" algn="l" defTabSz="914400" rtl="0" eaLnBrk="0" fontAlgn="base" latinLnBrk="0" hangingPunct="0">
-                <a:lnSpc>
-                  <a:spcPct val="100000"/>
-                </a:lnSpc>
-                <a:spcBef>
-                  <a:spcPct val="0"/>
-                </a:spcBef>
-                <a:spcAft>
-                  <a:spcPct val="0"/>
-                </a:spcAft>
-                <a:buClrTx/>
-                <a:buSzTx/>
-                <a:buFontTx/>
-                <a:buNone/>
-                <a:tabLst/>
-              </a:pPr>
-              <a:r>
-                <a:rPr kumimoji="0" lang="en-US" sz="1600" b="0" i="1" u="none" strike="noStrike" cap="none" normalizeH="0" baseline="0" dirty="0">
-                  <a:ln>
-                    <a:noFill/>
-                  </a:ln>
-                  <a:solidFill>
-                    <a:schemeClr val="tx2"/>
-                  </a:solidFill>
-                  <a:effectLst/>
-                  <a:latin typeface="+mn-lt"/>
-                </a:rPr>
-                <a:t>b</a:t>
-              </a:r>
-            </a:p>
-          </p:txBody>
-        </p:sp>
-        <p:sp>
-          <p:nvSpPr>
-            <p:cNvPr id="7" name="Oval 6"/>
-            <p:cNvSpPr/>
-            <p:nvPr/>
-          </p:nvSpPr>
-          <p:spPr bwMode="auto">
-            <a:xfrm>
-              <a:off x="3187065" y="2611438"/>
-              <a:ext cx="295275" cy="295275"/>
-            </a:xfrm>
-            <a:prstGeom prst="ellipse">
-              <a:avLst/>
-            </a:prstGeom>
-            <a:solidFill>
-              <a:srgbClr val="CCFFFF"/>
-            </a:solidFill>
-            <a:ln w="12700" cap="flat" cmpd="sng" algn="ctr">
-              <a:solidFill>
-                <a:schemeClr val="tx1"/>
-              </a:solidFill>
-              <a:prstDash val="solid"/>
-              <a:round/>
-              <a:headEnd type="none" w="sm" len="sm"/>
-              <a:tailEnd type="none" w="sm" len="sm"/>
-            </a:ln>
-            <a:effectLst/>
-          </p:spPr>
-          <p:txBody>
-            <a:bodyPr vert="horz" wrap="none" lIns="0" tIns="0" rIns="0" bIns="0" numCol="1" rtlCol="0" anchor="ctr" anchorCtr="1" compatLnSpc="1">
-              <a:prstTxWarp prst="textNoShape">
-                <a:avLst/>
-              </a:prstTxWarp>
-            </a:bodyPr>
-            <a:lstStyle/>
-            <a:p>
-              <a:pPr marL="0" marR="0" indent="0" algn="l" defTabSz="914400" rtl="0" eaLnBrk="0" fontAlgn="base" latinLnBrk="0" hangingPunct="0">
-                <a:lnSpc>
-                  <a:spcPct val="100000"/>
-                </a:lnSpc>
-                <a:spcBef>
-                  <a:spcPct val="0"/>
-                </a:spcBef>
-                <a:spcAft>
-                  <a:spcPct val="0"/>
-                </a:spcAft>
-                <a:buClrTx/>
-                <a:buSzTx/>
-                <a:buFontTx/>
-                <a:buNone/>
-                <a:tabLst/>
-              </a:pPr>
-              <a:r>
-                <a:rPr kumimoji="0" lang="en-US" sz="1600" b="0" i="1" u="none" strike="noStrike" cap="none" normalizeH="0" baseline="0" dirty="0">
-                  <a:ln>
-                    <a:noFill/>
-                  </a:ln>
-                  <a:solidFill>
-                    <a:schemeClr val="tx2"/>
-                  </a:solidFill>
-                  <a:effectLst/>
-                  <a:latin typeface="+mn-lt"/>
-                </a:rPr>
-                <a:t>c</a:t>
-              </a:r>
-            </a:p>
-          </p:txBody>
-        </p:sp>
-        <p:sp>
-          <p:nvSpPr>
-            <p:cNvPr id="8" name="Oval 7"/>
-            <p:cNvSpPr/>
-            <p:nvPr/>
-          </p:nvSpPr>
-          <p:spPr bwMode="auto">
-            <a:xfrm>
-              <a:off x="4789805" y="2611438"/>
-              <a:ext cx="295275" cy="295275"/>
-            </a:xfrm>
-            <a:prstGeom prst="ellipse">
-              <a:avLst/>
-            </a:prstGeom>
-            <a:solidFill>
-              <a:srgbClr val="CCFFFF"/>
-            </a:solidFill>
-            <a:ln w="12700" cap="flat" cmpd="sng" algn="ctr">
-              <a:solidFill>
-                <a:schemeClr val="tx1"/>
-              </a:solidFill>
-              <a:prstDash val="solid"/>
-              <a:round/>
-              <a:headEnd type="none" w="sm" len="sm"/>
-              <a:tailEnd type="none" w="sm" len="sm"/>
-            </a:ln>
-            <a:effectLst/>
-          </p:spPr>
-          <p:txBody>
-            <a:bodyPr vert="horz" wrap="none" lIns="0" tIns="0" rIns="0" bIns="0" numCol="1" rtlCol="0" anchor="ctr" anchorCtr="1" compatLnSpc="1">
-              <a:prstTxWarp prst="textNoShape">
-                <a:avLst/>
-              </a:prstTxWarp>
-            </a:bodyPr>
-            <a:lstStyle/>
-            <a:p>
-              <a:pPr marL="0" marR="0" indent="0" algn="l" defTabSz="914400" rtl="0" eaLnBrk="0" fontAlgn="base" latinLnBrk="0" hangingPunct="0">
-                <a:lnSpc>
-                  <a:spcPct val="100000"/>
-                </a:lnSpc>
-                <a:spcBef>
-                  <a:spcPct val="0"/>
-                </a:spcBef>
-                <a:spcAft>
-                  <a:spcPct val="0"/>
-                </a:spcAft>
-                <a:buClrTx/>
-                <a:buSzTx/>
-                <a:buFontTx/>
-                <a:buNone/>
-                <a:tabLst/>
-              </a:pPr>
-              <a:r>
-                <a:rPr kumimoji="0" lang="en-US" sz="1600" b="0" i="1" u="none" strike="noStrike" cap="none" normalizeH="0" baseline="0" dirty="0">
-                  <a:ln>
-                    <a:noFill/>
-                  </a:ln>
-                  <a:solidFill>
-                    <a:schemeClr val="tx2"/>
-                  </a:solidFill>
-                  <a:effectLst/>
-                  <a:latin typeface="+mn-lt"/>
-                </a:rPr>
-                <a:t>e</a:t>
-              </a:r>
-            </a:p>
-          </p:txBody>
-        </p:sp>
-        <p:sp>
-          <p:nvSpPr>
-            <p:cNvPr id="9" name="Oval 8"/>
-            <p:cNvSpPr/>
-            <p:nvPr/>
-          </p:nvSpPr>
-          <p:spPr bwMode="auto">
-            <a:xfrm>
-              <a:off x="3988435" y="2611438"/>
-              <a:ext cx="295275" cy="295275"/>
-            </a:xfrm>
-            <a:prstGeom prst="ellipse">
-              <a:avLst/>
-            </a:prstGeom>
-            <a:solidFill>
-              <a:srgbClr val="CCFFFF"/>
-            </a:solidFill>
-            <a:ln w="12700" cap="flat" cmpd="sng" algn="ctr">
-              <a:solidFill>
-                <a:schemeClr val="tx1"/>
-              </a:solidFill>
-              <a:prstDash val="solid"/>
-              <a:round/>
-              <a:headEnd type="none" w="sm" len="sm"/>
-              <a:tailEnd type="none" w="sm" len="sm"/>
-            </a:ln>
-            <a:effectLst/>
-          </p:spPr>
-          <p:txBody>
-            <a:bodyPr vert="horz" wrap="none" lIns="0" tIns="0" rIns="0" bIns="0" numCol="1" rtlCol="0" anchor="ctr" anchorCtr="1" compatLnSpc="1">
-              <a:prstTxWarp prst="textNoShape">
-                <a:avLst/>
-              </a:prstTxWarp>
-            </a:bodyPr>
-            <a:lstStyle/>
-            <a:p>
-              <a:pPr marL="0" marR="0" indent="0" algn="l" defTabSz="914400" rtl="0" eaLnBrk="0" fontAlgn="base" latinLnBrk="0" hangingPunct="0">
-                <a:lnSpc>
-                  <a:spcPct val="100000"/>
-                </a:lnSpc>
-                <a:spcBef>
-                  <a:spcPct val="0"/>
-                </a:spcBef>
-                <a:spcAft>
-                  <a:spcPct val="0"/>
-                </a:spcAft>
-                <a:buClrTx/>
-                <a:buSzTx/>
-                <a:buFontTx/>
-                <a:buNone/>
-                <a:tabLst/>
-              </a:pPr>
-              <a:r>
-                <a:rPr kumimoji="0" lang="en-US" sz="1600" b="0" i="1" u="none" strike="noStrike" cap="none" normalizeH="0" baseline="0" dirty="0">
-                  <a:ln>
-                    <a:noFill/>
-                  </a:ln>
-                  <a:solidFill>
-                    <a:schemeClr val="tx2"/>
-                  </a:solidFill>
-                  <a:effectLst/>
-                  <a:latin typeface="+mn-lt"/>
-                </a:rPr>
-                <a:t>d</a:t>
-              </a:r>
-            </a:p>
-          </p:txBody>
-        </p:sp>
-        <p:sp>
-          <p:nvSpPr>
-            <p:cNvPr id="11" name="Oval 10"/>
-            <p:cNvSpPr/>
-            <p:nvPr/>
-          </p:nvSpPr>
-          <p:spPr bwMode="auto">
-            <a:xfrm>
-              <a:off x="5591175" y="2611438"/>
-              <a:ext cx="295275" cy="295275"/>
-            </a:xfrm>
-            <a:prstGeom prst="ellipse">
-              <a:avLst/>
-            </a:prstGeom>
-            <a:solidFill>
-              <a:srgbClr val="CCFFFF"/>
-            </a:solidFill>
-            <a:ln w="12700" cap="flat" cmpd="sng" algn="ctr">
-              <a:solidFill>
-                <a:schemeClr val="tx1"/>
-              </a:solidFill>
-              <a:prstDash val="solid"/>
-              <a:round/>
-              <a:headEnd type="none" w="sm" len="sm"/>
-              <a:tailEnd type="none" w="sm" len="sm"/>
-            </a:ln>
-            <a:effectLst/>
-          </p:spPr>
-          <p:txBody>
-            <a:bodyPr vert="horz" wrap="none" lIns="0" tIns="0" rIns="0" bIns="0" numCol="1" rtlCol="0" anchor="ctr" anchorCtr="1" compatLnSpc="1">
-              <a:prstTxWarp prst="textNoShape">
-                <a:avLst/>
-              </a:prstTxWarp>
-            </a:bodyPr>
-            <a:lstStyle/>
-            <a:p>
-              <a:pPr marL="0" marR="0" indent="0" algn="l" defTabSz="914400" rtl="0" eaLnBrk="0" fontAlgn="base" latinLnBrk="0" hangingPunct="0">
-                <a:lnSpc>
-                  <a:spcPct val="100000"/>
-                </a:lnSpc>
-                <a:spcBef>
-                  <a:spcPct val="0"/>
-                </a:spcBef>
-                <a:spcAft>
-                  <a:spcPct val="0"/>
-                </a:spcAft>
-                <a:buClrTx/>
-                <a:buSzTx/>
-                <a:buFontTx/>
-                <a:buNone/>
-                <a:tabLst/>
-              </a:pPr>
-              <a:r>
-                <a:rPr kumimoji="0" lang="en-US" sz="1600" b="0" i="1" u="none" strike="noStrike" cap="none" normalizeH="0" baseline="0" dirty="0">
-                  <a:ln>
-                    <a:noFill/>
-                  </a:ln>
-                  <a:solidFill>
-                    <a:schemeClr val="tx2"/>
-                  </a:solidFill>
-                  <a:effectLst/>
-                  <a:latin typeface="+mn-lt"/>
-                </a:rPr>
-                <a:t>f</a:t>
-              </a:r>
-            </a:p>
-          </p:txBody>
-        </p:sp>
-        <p:cxnSp>
-          <p:nvCxnSpPr>
-            <p:cNvPr id="38" name="Straight Arrow Connector 37"/>
-            <p:cNvCxnSpPr>
-              <a:stCxn id="5" idx="6"/>
-              <a:endCxn id="6" idx="2"/>
-            </p:cNvCxnSpPr>
-            <p:nvPr/>
-          </p:nvCxnSpPr>
-          <p:spPr bwMode="auto">
-            <a:xfrm>
-              <a:off x="1879600" y="2759076"/>
-              <a:ext cx="506095" cy="1588"/>
-            </a:xfrm>
-            <a:prstGeom prst="straightConnector1">
-              <a:avLst/>
-            </a:prstGeom>
-            <a:solidFill>
-              <a:schemeClr val="accent1"/>
-            </a:solidFill>
-            <a:ln w="12700" cap="flat" cmpd="sng" algn="ctr">
-              <a:solidFill>
-                <a:schemeClr val="tx1"/>
-              </a:solidFill>
-              <a:prstDash val="solid"/>
-              <a:round/>
-              <a:headEnd type="none" w="med" len="med"/>
-              <a:tailEnd type="triangle" w="med" len="med"/>
-            </a:ln>
-            <a:effectLst/>
-          </p:spPr>
-        </p:cxnSp>
-        <p:cxnSp>
-          <p:nvCxnSpPr>
-            <p:cNvPr id="40" name="Straight Arrow Connector 39"/>
-            <p:cNvCxnSpPr>
-              <a:stCxn id="6" idx="6"/>
-              <a:endCxn id="7" idx="2"/>
-            </p:cNvCxnSpPr>
-            <p:nvPr/>
-          </p:nvCxnSpPr>
-          <p:spPr bwMode="auto">
-            <a:xfrm>
-              <a:off x="2680970" y="2759076"/>
-              <a:ext cx="506095" cy="1588"/>
-            </a:xfrm>
-            <a:prstGeom prst="straightConnector1">
-              <a:avLst/>
-            </a:prstGeom>
-            <a:solidFill>
-              <a:schemeClr val="accent1"/>
-            </a:solidFill>
-            <a:ln w="12700" cap="flat" cmpd="sng" algn="ctr">
-              <a:solidFill>
-                <a:schemeClr val="tx1"/>
-              </a:solidFill>
-              <a:prstDash val="solid"/>
-              <a:round/>
-              <a:headEnd type="none" w="med" len="med"/>
-              <a:tailEnd type="triangle" w="med" len="med"/>
-            </a:ln>
-            <a:effectLst/>
-          </p:spPr>
-        </p:cxnSp>
-        <p:cxnSp>
-          <p:nvCxnSpPr>
-            <p:cNvPr id="42" name="Straight Arrow Connector 41"/>
-            <p:cNvCxnSpPr>
-              <a:stCxn id="7" idx="6"/>
-              <a:endCxn id="9" idx="2"/>
-            </p:cNvCxnSpPr>
-            <p:nvPr/>
-          </p:nvCxnSpPr>
-          <p:spPr bwMode="auto">
-            <a:xfrm>
-              <a:off x="3482340" y="2759076"/>
-              <a:ext cx="506095" cy="1588"/>
-            </a:xfrm>
-            <a:prstGeom prst="straightConnector1">
-              <a:avLst/>
-            </a:prstGeom>
-            <a:solidFill>
-              <a:schemeClr val="accent1"/>
-            </a:solidFill>
-            <a:ln w="12700" cap="flat" cmpd="sng" algn="ctr">
-              <a:solidFill>
-                <a:schemeClr val="tx1"/>
-              </a:solidFill>
-              <a:prstDash val="solid"/>
-              <a:round/>
-              <a:headEnd type="none" w="med" len="med"/>
-              <a:tailEnd type="triangle" w="med" len="med"/>
-            </a:ln>
-            <a:effectLst/>
-          </p:spPr>
-        </p:cxnSp>
-        <p:cxnSp>
-          <p:nvCxnSpPr>
-            <p:cNvPr id="48" name="Straight Arrow Connector 47"/>
-            <p:cNvCxnSpPr>
-              <a:stCxn id="8" idx="6"/>
-              <a:endCxn id="11" idx="2"/>
-            </p:cNvCxnSpPr>
-            <p:nvPr/>
-          </p:nvCxnSpPr>
-          <p:spPr bwMode="auto">
-            <a:xfrm>
-              <a:off x="5085080" y="2759076"/>
-              <a:ext cx="506095" cy="1588"/>
-            </a:xfrm>
-            <a:prstGeom prst="straightConnector1">
-              <a:avLst/>
-            </a:prstGeom>
-            <a:solidFill>
-              <a:schemeClr val="accent1"/>
-            </a:solidFill>
-            <a:ln w="12700" cap="flat" cmpd="sng" algn="ctr">
-              <a:solidFill>
-                <a:schemeClr val="tx1"/>
-              </a:solidFill>
-              <a:prstDash val="solid"/>
-              <a:round/>
-              <a:headEnd type="none" w="med" len="med"/>
-              <a:tailEnd type="triangle" w="med" len="med"/>
-            </a:ln>
-            <a:effectLst/>
-          </p:spPr>
-        </p:cxnSp>
-        <p:sp>
-          <p:nvSpPr>
-            <p:cNvPr id="29" name="TextBox 28"/>
-            <p:cNvSpPr txBox="1"/>
-            <p:nvPr/>
-          </p:nvSpPr>
-          <p:spPr>
-            <a:xfrm>
-              <a:off x="2032000" y="2632075"/>
-              <a:ext cx="129844" cy="246221"/>
-            </a:xfrm>
-            <a:prstGeom prst="rect">
-              <a:avLst/>
-            </a:prstGeom>
-            <a:solidFill>
-              <a:schemeClr val="bg1"/>
-            </a:solidFill>
-          </p:spPr>
-          <p:txBody>
-            <a:bodyPr wrap="none" lIns="0" tIns="0" rIns="0" bIns="0" rtlCol="0" anchor="ctr" anchorCtr="1">
-              <a:spAutoFit/>
-            </a:bodyPr>
-            <a:lstStyle/>
-            <a:p>
-              <a:r>
-                <a:rPr lang="en-US" dirty="0">
-                  <a:latin typeface="+mn-lt"/>
-                </a:rPr>
-                <a:t>1</a:t>
-              </a:r>
-            </a:p>
-          </p:txBody>
-        </p:sp>
-        <p:sp>
-          <p:nvSpPr>
-            <p:cNvPr id="89" name="TextBox 88"/>
-            <p:cNvSpPr txBox="1"/>
-            <p:nvPr/>
-          </p:nvSpPr>
-          <p:spPr>
-            <a:xfrm>
-              <a:off x="3613150" y="2625725"/>
-              <a:ext cx="129844" cy="246221"/>
-            </a:xfrm>
-            <a:prstGeom prst="rect">
-              <a:avLst/>
-            </a:prstGeom>
-            <a:solidFill>
-              <a:schemeClr val="bg1"/>
-            </a:solidFill>
-          </p:spPr>
-          <p:txBody>
-            <a:bodyPr wrap="none" lIns="0" tIns="0" rIns="0" bIns="0" rtlCol="0" anchor="ctr" anchorCtr="1">
-              <a:spAutoFit/>
-            </a:bodyPr>
-            <a:lstStyle/>
-            <a:p>
-              <a:r>
-                <a:rPr lang="en-US" dirty="0">
-                  <a:latin typeface="+mn-lt"/>
-                </a:rPr>
-                <a:t>1</a:t>
-              </a:r>
-            </a:p>
-          </p:txBody>
-        </p:sp>
-        <p:sp>
-          <p:nvSpPr>
-            <p:cNvPr id="90" name="TextBox 89"/>
-            <p:cNvSpPr txBox="1"/>
-            <p:nvPr/>
-          </p:nvSpPr>
-          <p:spPr>
-            <a:xfrm>
-              <a:off x="2825750" y="2638425"/>
-              <a:ext cx="129844" cy="246221"/>
-            </a:xfrm>
-            <a:prstGeom prst="rect">
-              <a:avLst/>
-            </a:prstGeom>
-            <a:solidFill>
-              <a:schemeClr val="bg1"/>
-            </a:solidFill>
-          </p:spPr>
-          <p:txBody>
-            <a:bodyPr wrap="none" lIns="0" tIns="0" rIns="0" bIns="0" rtlCol="0" anchor="ctr" anchorCtr="1">
-              <a:spAutoFit/>
-            </a:bodyPr>
-            <a:lstStyle/>
-            <a:p>
-              <a:r>
-                <a:rPr lang="en-US" dirty="0">
-                  <a:latin typeface="+mn-lt"/>
-                </a:rPr>
-                <a:t>1</a:t>
-              </a:r>
-            </a:p>
-          </p:txBody>
-        </p:sp>
-        <p:sp>
-          <p:nvSpPr>
-            <p:cNvPr id="91" name="TextBox 90"/>
-            <p:cNvSpPr txBox="1"/>
-            <p:nvPr/>
-          </p:nvSpPr>
-          <p:spPr>
-            <a:xfrm>
-              <a:off x="5238750" y="2632075"/>
-              <a:ext cx="129844" cy="246221"/>
-            </a:xfrm>
-            <a:prstGeom prst="rect">
-              <a:avLst/>
-            </a:prstGeom>
-            <a:solidFill>
-              <a:schemeClr val="bg1"/>
-            </a:solidFill>
-          </p:spPr>
-          <p:txBody>
-            <a:bodyPr wrap="none" lIns="0" tIns="0" rIns="0" bIns="0" rtlCol="0" anchor="ctr" anchorCtr="1">
-              <a:spAutoFit/>
-            </a:bodyPr>
-            <a:lstStyle/>
-            <a:p>
-              <a:r>
-                <a:rPr lang="en-US" dirty="0">
-                  <a:latin typeface="+mn-lt"/>
-                </a:rPr>
-                <a:t>1</a:t>
-              </a:r>
-            </a:p>
-          </p:txBody>
-        </p:sp>
-        <p:cxnSp>
-          <p:nvCxnSpPr>
-            <p:cNvPr id="113" name="Straight Arrow Connector 112"/>
-            <p:cNvCxnSpPr>
-              <a:stCxn id="9" idx="6"/>
-              <a:endCxn id="8" idx="2"/>
-            </p:cNvCxnSpPr>
-            <p:nvPr/>
-          </p:nvCxnSpPr>
-          <p:spPr bwMode="auto">
-            <a:xfrm>
-              <a:off x="4283710" y="2759076"/>
-              <a:ext cx="506095" cy="1588"/>
-            </a:xfrm>
-            <a:prstGeom prst="straightConnector1">
-              <a:avLst/>
-            </a:prstGeom>
-            <a:solidFill>
-              <a:schemeClr val="accent1"/>
-            </a:solidFill>
-            <a:ln w="12700" cap="flat" cmpd="sng" algn="ctr">
-              <a:solidFill>
-                <a:schemeClr val="tx1"/>
-              </a:solidFill>
-              <a:prstDash val="solid"/>
-              <a:round/>
-              <a:headEnd type="none" w="med" len="med"/>
-              <a:tailEnd type="triangle" w="med" len="med"/>
-            </a:ln>
-            <a:effectLst/>
-          </p:spPr>
-        </p:cxnSp>
-        <p:cxnSp>
-          <p:nvCxnSpPr>
-            <p:cNvPr id="115" name="Curved Connector 114"/>
-            <p:cNvCxnSpPr>
-              <a:stCxn id="6" idx="7"/>
-              <a:endCxn id="9" idx="1"/>
-            </p:cNvCxnSpPr>
-            <p:nvPr/>
-          </p:nvCxnSpPr>
-          <p:spPr bwMode="auto">
-            <a:xfrm rot="5400000" flipH="1" flipV="1">
-              <a:off x="3334702" y="1957706"/>
-              <a:ext cx="1588" cy="1393949"/>
-            </a:xfrm>
-            <a:prstGeom prst="curvedConnector3">
-              <a:avLst>
-                <a:gd name="adj1" fmla="val 17118514"/>
-              </a:avLst>
-            </a:prstGeom>
-            <a:solidFill>
-              <a:schemeClr val="accent1"/>
-            </a:solidFill>
-            <a:ln w="12700" cap="flat" cmpd="sng" algn="ctr">
-              <a:solidFill>
-                <a:schemeClr val="tx1"/>
-              </a:solidFill>
-              <a:prstDash val="solid"/>
-              <a:round/>
-              <a:headEnd type="none" w="med" len="med"/>
-              <a:tailEnd type="triangle" w="med" len="med"/>
-            </a:ln>
-            <a:effectLst/>
-          </p:spPr>
-        </p:cxnSp>
-        <p:cxnSp>
-          <p:nvCxnSpPr>
-            <p:cNvPr id="117" name="Curved Connector 116"/>
-            <p:cNvCxnSpPr>
-              <a:stCxn id="5" idx="7"/>
-              <a:endCxn id="7" idx="1"/>
-            </p:cNvCxnSpPr>
-            <p:nvPr/>
-          </p:nvCxnSpPr>
-          <p:spPr bwMode="auto">
-            <a:xfrm rot="5400000" flipH="1" flipV="1">
-              <a:off x="2533332" y="1957706"/>
-              <a:ext cx="1588" cy="1393949"/>
-            </a:xfrm>
-            <a:prstGeom prst="curvedConnector3">
-              <a:avLst>
-                <a:gd name="adj1" fmla="val 17118514"/>
-              </a:avLst>
-            </a:prstGeom>
-            <a:solidFill>
-              <a:schemeClr val="accent1"/>
-            </a:solidFill>
-            <a:ln w="12700" cap="flat" cmpd="sng" algn="ctr">
-              <a:solidFill>
-                <a:schemeClr val="tx1"/>
-              </a:solidFill>
-              <a:prstDash val="solid"/>
-              <a:round/>
-              <a:headEnd type="none" w="med" len="med"/>
-              <a:tailEnd type="triangle" w="med" len="med"/>
-            </a:ln>
-            <a:effectLst/>
-          </p:spPr>
-        </p:cxnSp>
-        <p:cxnSp>
-          <p:nvCxnSpPr>
-            <p:cNvPr id="125" name="Curved Connector 124"/>
-            <p:cNvCxnSpPr>
-              <a:stCxn id="7" idx="7"/>
-              <a:endCxn id="8" idx="1"/>
-            </p:cNvCxnSpPr>
-            <p:nvPr/>
-          </p:nvCxnSpPr>
-          <p:spPr bwMode="auto">
-            <a:xfrm rot="5400000" flipH="1" flipV="1">
-              <a:off x="4136072" y="1957706"/>
-              <a:ext cx="1588" cy="1393949"/>
-            </a:xfrm>
-            <a:prstGeom prst="curvedConnector3">
-              <a:avLst>
-                <a:gd name="adj1" fmla="val 17118514"/>
-              </a:avLst>
-            </a:prstGeom>
-            <a:solidFill>
-              <a:schemeClr val="accent1"/>
-            </a:solidFill>
-            <a:ln w="12700" cap="flat" cmpd="sng" algn="ctr">
-              <a:solidFill>
-                <a:schemeClr val="tx1"/>
-              </a:solidFill>
-              <a:prstDash val="solid"/>
-              <a:round/>
-              <a:headEnd type="none" w="med" len="med"/>
-              <a:tailEnd type="triangle" w="med" len="med"/>
-            </a:ln>
-            <a:effectLst/>
-          </p:spPr>
-        </p:cxnSp>
-        <p:cxnSp>
-          <p:nvCxnSpPr>
-            <p:cNvPr id="128" name="Curved Connector 127"/>
-            <p:cNvCxnSpPr>
-              <a:stCxn id="9" idx="7"/>
-              <a:endCxn id="11" idx="1"/>
-            </p:cNvCxnSpPr>
-            <p:nvPr/>
-          </p:nvCxnSpPr>
-          <p:spPr bwMode="auto">
-            <a:xfrm rot="5400000" flipH="1" flipV="1">
-              <a:off x="4937442" y="1957706"/>
-              <a:ext cx="1588" cy="1393949"/>
-            </a:xfrm>
-            <a:prstGeom prst="curvedConnector3">
-              <a:avLst>
-                <a:gd name="adj1" fmla="val 17118514"/>
-              </a:avLst>
-            </a:prstGeom>
-            <a:solidFill>
-              <a:schemeClr val="accent1"/>
-            </a:solidFill>
-            <a:ln w="12700" cap="flat" cmpd="sng" algn="ctr">
-              <a:solidFill>
-                <a:schemeClr val="tx1"/>
-              </a:solidFill>
-              <a:prstDash val="solid"/>
-              <a:round/>
-              <a:headEnd type="none" w="med" len="med"/>
-              <a:tailEnd type="triangle" w="med" len="med"/>
-            </a:ln>
-            <a:effectLst/>
-          </p:spPr>
-        </p:cxnSp>
-        <p:cxnSp>
-          <p:nvCxnSpPr>
-            <p:cNvPr id="131" name="Curved Connector 130"/>
-            <p:cNvCxnSpPr>
-              <a:stCxn id="6" idx="0"/>
-              <a:endCxn id="8" idx="0"/>
-            </p:cNvCxnSpPr>
-            <p:nvPr/>
-          </p:nvCxnSpPr>
-          <p:spPr bwMode="auto">
-            <a:xfrm rot="5400000" flipH="1" flipV="1">
-              <a:off x="3735388" y="1409383"/>
-              <a:ext cx="1588" cy="2404110"/>
-            </a:xfrm>
-            <a:prstGeom prst="curvedConnector3">
-              <a:avLst>
-                <a:gd name="adj1" fmla="val 34389180"/>
-              </a:avLst>
-            </a:prstGeom>
-            <a:solidFill>
-              <a:schemeClr val="accent1"/>
-            </a:solidFill>
-            <a:ln w="12700" cap="flat" cmpd="sng" algn="ctr">
-              <a:solidFill>
-                <a:schemeClr val="tx1"/>
-              </a:solidFill>
-              <a:prstDash val="solid"/>
-              <a:round/>
-              <a:headEnd type="none" w="med" len="med"/>
-              <a:tailEnd type="triangle" w="med" len="med"/>
-            </a:ln>
-            <a:effectLst/>
-          </p:spPr>
-        </p:cxnSp>
-        <p:cxnSp>
-          <p:nvCxnSpPr>
-            <p:cNvPr id="135" name="Curved Connector 134"/>
-            <p:cNvCxnSpPr>
-              <a:stCxn id="5" idx="0"/>
-              <a:endCxn id="9" idx="0"/>
-            </p:cNvCxnSpPr>
-            <p:nvPr/>
-          </p:nvCxnSpPr>
-          <p:spPr bwMode="auto">
-            <a:xfrm rot="5400000" flipH="1" flipV="1">
-              <a:off x="2934018" y="1409383"/>
-              <a:ext cx="1588" cy="2404110"/>
-            </a:xfrm>
-            <a:prstGeom prst="curvedConnector3">
-              <a:avLst>
-                <a:gd name="adj1" fmla="val 33189557"/>
-              </a:avLst>
-            </a:prstGeom>
-            <a:solidFill>
-              <a:schemeClr val="accent1"/>
-            </a:solidFill>
-            <a:ln w="12700" cap="flat" cmpd="sng" algn="ctr">
-              <a:solidFill>
-                <a:schemeClr val="tx1"/>
-              </a:solidFill>
-              <a:prstDash val="solid"/>
-              <a:round/>
-              <a:headEnd type="none" w="med" len="med"/>
-              <a:tailEnd type="triangle" w="med" len="med"/>
-            </a:ln>
-            <a:effectLst/>
-          </p:spPr>
-        </p:cxnSp>
-        <p:cxnSp>
-          <p:nvCxnSpPr>
-            <p:cNvPr id="139" name="Curved Connector 138"/>
-            <p:cNvCxnSpPr>
-              <a:stCxn id="7" idx="0"/>
-              <a:endCxn id="11" idx="0"/>
-            </p:cNvCxnSpPr>
-            <p:nvPr/>
-          </p:nvCxnSpPr>
-          <p:spPr bwMode="auto">
-            <a:xfrm rot="5400000" flipH="1" flipV="1">
-              <a:off x="4536758" y="1409383"/>
-              <a:ext cx="1588" cy="2404110"/>
-            </a:xfrm>
-            <a:prstGeom prst="curvedConnector3">
-              <a:avLst>
-                <a:gd name="adj1" fmla="val 34389180"/>
-              </a:avLst>
-            </a:prstGeom>
-            <a:solidFill>
-              <a:schemeClr val="accent1"/>
-            </a:solidFill>
-            <a:ln w="12700" cap="flat" cmpd="sng" algn="ctr">
-              <a:solidFill>
-                <a:schemeClr val="tx1"/>
-              </a:solidFill>
-              <a:prstDash val="solid"/>
-              <a:round/>
-              <a:headEnd type="none" w="med" len="med"/>
-              <a:tailEnd type="triangle" w="med" len="med"/>
-            </a:ln>
-            <a:effectLst/>
-          </p:spPr>
-        </p:cxnSp>
-        <p:cxnSp>
-          <p:nvCxnSpPr>
-            <p:cNvPr id="143" name="Curved Connector 142"/>
-            <p:cNvCxnSpPr>
-              <a:stCxn id="5" idx="5"/>
-              <a:endCxn id="8" idx="3"/>
-            </p:cNvCxnSpPr>
-            <p:nvPr/>
-          </p:nvCxnSpPr>
-          <p:spPr bwMode="auto">
-            <a:xfrm rot="16200000" flipH="1">
-              <a:off x="3334702" y="1365126"/>
-              <a:ext cx="1588" cy="2996689"/>
-            </a:xfrm>
-            <a:prstGeom prst="curvedConnector3">
-              <a:avLst>
-                <a:gd name="adj1" fmla="val 25116003"/>
-              </a:avLst>
-            </a:prstGeom>
-            <a:solidFill>
-              <a:schemeClr val="accent1"/>
-            </a:solidFill>
-            <a:ln w="12700" cap="flat" cmpd="sng" algn="ctr">
-              <a:solidFill>
-                <a:schemeClr val="tx1"/>
-              </a:solidFill>
-              <a:prstDash val="solid"/>
-              <a:round/>
-              <a:headEnd type="none" w="med" len="med"/>
-              <a:tailEnd type="triangle" w="med" len="med"/>
-            </a:ln>
-            <a:effectLst/>
-          </p:spPr>
-        </p:cxnSp>
-        <p:cxnSp>
-          <p:nvCxnSpPr>
-            <p:cNvPr id="147" name="Curved Connector 146"/>
-            <p:cNvCxnSpPr>
-              <a:stCxn id="6" idx="5"/>
-              <a:endCxn id="11" idx="3"/>
-            </p:cNvCxnSpPr>
-            <p:nvPr/>
-          </p:nvCxnSpPr>
-          <p:spPr bwMode="auto">
-            <a:xfrm rot="16200000" flipH="1">
-              <a:off x="4136072" y="1365126"/>
-              <a:ext cx="1588" cy="2996689"/>
-            </a:xfrm>
-            <a:prstGeom prst="curvedConnector3">
-              <a:avLst>
-                <a:gd name="adj1" fmla="val 25116003"/>
-              </a:avLst>
-            </a:prstGeom>
-            <a:solidFill>
-              <a:schemeClr val="accent1"/>
-            </a:solidFill>
-            <a:ln w="12700" cap="flat" cmpd="sng" algn="ctr">
-              <a:solidFill>
-                <a:schemeClr val="tx1"/>
-              </a:solidFill>
-              <a:prstDash val="solid"/>
-              <a:round/>
-              <a:headEnd type="none" w="med" len="med"/>
-              <a:tailEnd type="triangle" w="med" len="med"/>
-            </a:ln>
-            <a:effectLst/>
-          </p:spPr>
-        </p:cxnSp>
-        <p:cxnSp>
-          <p:nvCxnSpPr>
-            <p:cNvPr id="151" name="Curved Connector 150"/>
-            <p:cNvCxnSpPr>
-              <a:stCxn id="5" idx="4"/>
-              <a:endCxn id="11" idx="4"/>
-            </p:cNvCxnSpPr>
-            <p:nvPr/>
-          </p:nvCxnSpPr>
-          <p:spPr bwMode="auto">
-            <a:xfrm rot="16200000" flipH="1">
-              <a:off x="3735388" y="903288"/>
-              <a:ext cx="1588" cy="4006850"/>
-            </a:xfrm>
-            <a:prstGeom prst="curvedConnector3">
-              <a:avLst>
-                <a:gd name="adj1" fmla="val 43186411"/>
-              </a:avLst>
-            </a:prstGeom>
-            <a:solidFill>
-              <a:schemeClr val="accent1"/>
-            </a:solidFill>
-            <a:ln w="12700" cap="flat" cmpd="sng" algn="ctr">
-              <a:solidFill>
-                <a:schemeClr val="tx1"/>
-              </a:solidFill>
-              <a:prstDash val="solid"/>
-              <a:round/>
-              <a:headEnd type="none" w="med" len="med"/>
-              <a:tailEnd type="triangle" w="med" len="med"/>
-            </a:ln>
-            <a:effectLst/>
-          </p:spPr>
-        </p:cxnSp>
-        <p:sp>
-          <p:nvSpPr>
-            <p:cNvPr id="88" name="TextBox 87"/>
-            <p:cNvSpPr txBox="1"/>
-            <p:nvPr/>
-          </p:nvSpPr>
-          <p:spPr>
-            <a:xfrm>
-              <a:off x="4457700" y="2625725"/>
-              <a:ext cx="129844" cy="246221"/>
-            </a:xfrm>
-            <a:prstGeom prst="rect">
-              <a:avLst/>
-            </a:prstGeom>
-            <a:solidFill>
-              <a:schemeClr val="bg1"/>
-            </a:solidFill>
-          </p:spPr>
-          <p:txBody>
-            <a:bodyPr wrap="none" lIns="0" tIns="0" rIns="0" bIns="0" rtlCol="0" anchor="ctr" anchorCtr="1">
-              <a:spAutoFit/>
-            </a:bodyPr>
-            <a:lstStyle/>
-            <a:p>
-              <a:r>
-                <a:rPr lang="en-US" dirty="0">
-                  <a:latin typeface="+mn-lt"/>
-                </a:rPr>
-                <a:t>1</a:t>
-              </a:r>
-            </a:p>
-          </p:txBody>
-        </p:sp>
-        <p:sp>
-          <p:nvSpPr>
-            <p:cNvPr id="97" name="TextBox 96"/>
-            <p:cNvSpPr txBox="1"/>
-            <p:nvPr/>
-          </p:nvSpPr>
-          <p:spPr>
-            <a:xfrm>
-              <a:off x="2260600" y="2260600"/>
-              <a:ext cx="129844" cy="246221"/>
-            </a:xfrm>
-            <a:prstGeom prst="rect">
-              <a:avLst/>
-            </a:prstGeom>
-            <a:solidFill>
-              <a:schemeClr val="bg1"/>
-            </a:solidFill>
-          </p:spPr>
-          <p:txBody>
-            <a:bodyPr wrap="none" lIns="0" tIns="0" rIns="0" bIns="0" rtlCol="0" anchor="ctr" anchorCtr="1">
-              <a:spAutoFit/>
-            </a:bodyPr>
-            <a:lstStyle/>
-            <a:p>
-              <a:r>
-                <a:rPr lang="en-US" dirty="0">
-                  <a:latin typeface="+mn-lt"/>
-                </a:rPr>
-                <a:t>3</a:t>
-              </a:r>
-            </a:p>
-          </p:txBody>
-        </p:sp>
-        <p:sp>
-          <p:nvSpPr>
-            <p:cNvPr id="153" name="TextBox 152"/>
-            <p:cNvSpPr txBox="1"/>
-            <p:nvPr/>
-          </p:nvSpPr>
-          <p:spPr>
-            <a:xfrm>
-              <a:off x="5099050" y="2273300"/>
-              <a:ext cx="129844" cy="246221"/>
-            </a:xfrm>
-            <a:prstGeom prst="rect">
-              <a:avLst/>
-            </a:prstGeom>
-            <a:solidFill>
-              <a:schemeClr val="bg1"/>
-            </a:solidFill>
-          </p:spPr>
-          <p:txBody>
-            <a:bodyPr wrap="none" lIns="0" tIns="0" rIns="0" bIns="0" rtlCol="0" anchor="ctr" anchorCtr="1">
-              <a:spAutoFit/>
-            </a:bodyPr>
-            <a:lstStyle/>
-            <a:p>
-              <a:r>
-                <a:rPr lang="en-US" dirty="0">
-                  <a:latin typeface="+mn-lt"/>
-                </a:rPr>
-                <a:t>3</a:t>
-              </a:r>
-            </a:p>
-          </p:txBody>
-        </p:sp>
-        <p:sp>
-          <p:nvSpPr>
-            <p:cNvPr id="154" name="TextBox 153"/>
-            <p:cNvSpPr txBox="1"/>
-            <p:nvPr/>
-          </p:nvSpPr>
-          <p:spPr>
-            <a:xfrm>
-              <a:off x="4165600" y="2247900"/>
-              <a:ext cx="129844" cy="246221"/>
-            </a:xfrm>
-            <a:prstGeom prst="rect">
-              <a:avLst/>
-            </a:prstGeom>
-            <a:solidFill>
-              <a:schemeClr val="bg1"/>
-            </a:solidFill>
-          </p:spPr>
-          <p:txBody>
-            <a:bodyPr wrap="none" lIns="0" tIns="0" rIns="0" bIns="0" rtlCol="0" anchor="ctr" anchorCtr="1">
-              <a:spAutoFit/>
-            </a:bodyPr>
-            <a:lstStyle/>
-            <a:p>
-              <a:r>
-                <a:rPr lang="en-US" dirty="0">
-                  <a:latin typeface="+mn-lt"/>
-                </a:rPr>
-                <a:t>3</a:t>
-              </a:r>
-            </a:p>
-          </p:txBody>
-        </p:sp>
-        <p:sp>
-          <p:nvSpPr>
-            <p:cNvPr id="155" name="TextBox 154"/>
-            <p:cNvSpPr txBox="1"/>
-            <p:nvPr/>
-          </p:nvSpPr>
-          <p:spPr>
-            <a:xfrm>
-              <a:off x="3162300" y="2273300"/>
-              <a:ext cx="129844" cy="246221"/>
-            </a:xfrm>
-            <a:prstGeom prst="rect">
-              <a:avLst/>
-            </a:prstGeom>
-            <a:solidFill>
-              <a:schemeClr val="bg1"/>
-            </a:solidFill>
-          </p:spPr>
-          <p:txBody>
-            <a:bodyPr wrap="none" lIns="0" tIns="0" rIns="0" bIns="0" rtlCol="0" anchor="ctr" anchorCtr="1">
-              <a:spAutoFit/>
-            </a:bodyPr>
-            <a:lstStyle/>
-            <a:p>
-              <a:r>
-                <a:rPr lang="en-US" dirty="0">
-                  <a:latin typeface="+mn-lt"/>
-                </a:rPr>
-                <a:t>3</a:t>
-              </a:r>
-            </a:p>
-          </p:txBody>
-        </p:sp>
-        <p:sp>
-          <p:nvSpPr>
-            <p:cNvPr id="156" name="TextBox 155"/>
-            <p:cNvSpPr txBox="1"/>
-            <p:nvPr/>
-          </p:nvSpPr>
-          <p:spPr>
-            <a:xfrm>
-              <a:off x="2463800" y="1968500"/>
-              <a:ext cx="129844" cy="246221"/>
-            </a:xfrm>
-            <a:prstGeom prst="rect">
-              <a:avLst/>
-            </a:prstGeom>
-            <a:solidFill>
-              <a:schemeClr val="bg1"/>
-            </a:solidFill>
-          </p:spPr>
-          <p:txBody>
-            <a:bodyPr wrap="none" lIns="0" tIns="0" rIns="0" bIns="0" rtlCol="0" anchor="ctr" anchorCtr="1">
-              <a:spAutoFit/>
-            </a:bodyPr>
-            <a:lstStyle/>
-            <a:p>
-              <a:r>
-                <a:rPr lang="en-US" dirty="0">
-                  <a:latin typeface="+mn-lt"/>
-                </a:rPr>
-                <a:t>5</a:t>
-              </a:r>
-            </a:p>
-          </p:txBody>
-        </p:sp>
-        <p:sp>
-          <p:nvSpPr>
-            <p:cNvPr id="157" name="TextBox 156"/>
-            <p:cNvSpPr txBox="1"/>
-            <p:nvPr/>
-          </p:nvSpPr>
-          <p:spPr>
-            <a:xfrm>
-              <a:off x="4622800" y="1924050"/>
-              <a:ext cx="129844" cy="246221"/>
-            </a:xfrm>
-            <a:prstGeom prst="rect">
-              <a:avLst/>
-            </a:prstGeom>
-            <a:solidFill>
-              <a:schemeClr val="bg1"/>
-            </a:solidFill>
-          </p:spPr>
-          <p:txBody>
-            <a:bodyPr wrap="none" lIns="0" tIns="0" rIns="0" bIns="0" rtlCol="0" anchor="ctr" anchorCtr="1">
-              <a:spAutoFit/>
-            </a:bodyPr>
-            <a:lstStyle/>
-            <a:p>
-              <a:r>
-                <a:rPr lang="en-US" dirty="0">
-                  <a:latin typeface="+mn-lt"/>
-                </a:rPr>
-                <a:t>5</a:t>
-              </a:r>
-            </a:p>
-          </p:txBody>
-        </p:sp>
-        <p:sp>
-          <p:nvSpPr>
-            <p:cNvPr id="158" name="TextBox 157"/>
-            <p:cNvSpPr txBox="1"/>
-            <p:nvPr/>
-          </p:nvSpPr>
-          <p:spPr>
-            <a:xfrm>
-              <a:off x="3683000" y="1917700"/>
-              <a:ext cx="129844" cy="246221"/>
-            </a:xfrm>
-            <a:prstGeom prst="rect">
-              <a:avLst/>
-            </a:prstGeom>
-            <a:solidFill>
-              <a:schemeClr val="bg1"/>
-            </a:solidFill>
-          </p:spPr>
-          <p:txBody>
-            <a:bodyPr wrap="none" lIns="0" tIns="0" rIns="0" bIns="0" rtlCol="0" anchor="ctr" anchorCtr="1">
-              <a:spAutoFit/>
-            </a:bodyPr>
-            <a:lstStyle/>
-            <a:p>
-              <a:r>
-                <a:rPr lang="en-US" dirty="0">
-                  <a:latin typeface="+mn-lt"/>
-                </a:rPr>
-                <a:t>5</a:t>
-              </a:r>
-            </a:p>
-          </p:txBody>
-        </p:sp>
-        <p:sp>
-          <p:nvSpPr>
-            <p:cNvPr id="159" name="TextBox 158"/>
-            <p:cNvSpPr txBox="1"/>
-            <p:nvPr/>
-          </p:nvSpPr>
-          <p:spPr>
-            <a:xfrm>
-              <a:off x="3708400" y="3467100"/>
-              <a:ext cx="129844" cy="246221"/>
-            </a:xfrm>
-            <a:prstGeom prst="rect">
-              <a:avLst/>
-            </a:prstGeom>
-            <a:solidFill>
-              <a:schemeClr val="bg1"/>
-            </a:solidFill>
-          </p:spPr>
-          <p:txBody>
-            <a:bodyPr wrap="none" lIns="0" tIns="0" rIns="0" bIns="0" rtlCol="0" anchor="ctr" anchorCtr="1">
-              <a:spAutoFit/>
-            </a:bodyPr>
-            <a:lstStyle/>
-            <a:p>
-              <a:r>
-                <a:rPr lang="en-US" dirty="0">
-                  <a:latin typeface="+mn-lt"/>
-                </a:rPr>
-                <a:t>9</a:t>
-              </a:r>
-            </a:p>
-          </p:txBody>
-        </p:sp>
-        <p:sp>
-          <p:nvSpPr>
-            <p:cNvPr id="160" name="TextBox 159"/>
-            <p:cNvSpPr txBox="1"/>
-            <p:nvPr/>
-          </p:nvSpPr>
-          <p:spPr>
-            <a:xfrm>
-              <a:off x="2508250" y="3060700"/>
-              <a:ext cx="129844" cy="246221"/>
-            </a:xfrm>
-            <a:prstGeom prst="rect">
-              <a:avLst/>
-            </a:prstGeom>
-            <a:solidFill>
-              <a:schemeClr val="bg1"/>
-            </a:solidFill>
-          </p:spPr>
-          <p:txBody>
-            <a:bodyPr wrap="none" lIns="0" tIns="0" rIns="0" bIns="0" rtlCol="0" anchor="ctr" anchorCtr="1">
-              <a:spAutoFit/>
-            </a:bodyPr>
-            <a:lstStyle/>
-            <a:p>
-              <a:r>
-                <a:rPr lang="en-US" dirty="0">
-                  <a:latin typeface="+mn-lt"/>
-                </a:rPr>
-                <a:t>7</a:t>
-              </a:r>
-            </a:p>
-          </p:txBody>
-        </p:sp>
-        <p:sp>
-          <p:nvSpPr>
-            <p:cNvPr id="161" name="TextBox 160"/>
-            <p:cNvSpPr txBox="1"/>
-            <p:nvPr/>
-          </p:nvSpPr>
-          <p:spPr>
-            <a:xfrm>
-              <a:off x="4756150" y="3079750"/>
-              <a:ext cx="129844" cy="246221"/>
-            </a:xfrm>
-            <a:prstGeom prst="rect">
-              <a:avLst/>
-            </a:prstGeom>
-            <a:solidFill>
-              <a:schemeClr val="bg1"/>
-            </a:solidFill>
-          </p:spPr>
-          <p:txBody>
-            <a:bodyPr wrap="none" lIns="0" tIns="0" rIns="0" bIns="0" rtlCol="0" anchor="ctr" anchorCtr="1">
-              <a:spAutoFit/>
-            </a:bodyPr>
-            <a:lstStyle/>
-            <a:p>
-              <a:r>
-                <a:rPr lang="en-US" dirty="0">
-                  <a:latin typeface="+mn-lt"/>
-                </a:rPr>
-                <a:t>7</a:t>
-              </a:r>
-            </a:p>
-          </p:txBody>
-        </p:sp>
-      </p:grpSp>
-      <p:grpSp>
-        <p:nvGrpSpPr>
           <p:cNvPr id="41" name="Group 40">
             <a:extLst>
               <a:ext uri="{FF2B5EF4-FFF2-40B4-BE49-F238E27FC236}">
@@ -27642,7 +26224,7 @@
             <p:spPr>
               <a:xfrm>
                 <a:off x="1600630" y="3687675"/>
-                <a:ext cx="227626" cy="215444"/>
+                <a:ext cx="113814" cy="215444"/>
               </a:xfrm>
               <a:prstGeom prst="rect">
                 <a:avLst/>
@@ -27661,7 +26243,7 @@
                   <a:rPr lang="en-US" sz="1400" dirty="0">
                     <a:latin typeface="+mn-lt"/>
                   </a:rPr>
-                  <a:t>11</a:t>
+                  <a:t>4</a:t>
                 </a:r>
               </a:p>
             </p:txBody>
@@ -27778,7 +26360,7 @@
                   <a:rPr lang="en-US" sz="1400" dirty="0">
                     <a:latin typeface="+mn-lt"/>
                   </a:rPr>
-                  <a:t>7</a:t>
+                  <a:t>3</a:t>
                 </a:r>
               </a:p>
             </p:txBody>
@@ -27934,7 +26516,7 @@
                   <a:rPr lang="en-US" sz="1400" dirty="0">
                     <a:latin typeface="+mn-lt"/>
                   </a:rPr>
-                  <a:t>4</a:t>
+                  <a:t>2</a:t>
                 </a:r>
               </a:p>
             </p:txBody>
@@ -27973,7 +26555,7 @@
                   <a:rPr lang="en-US" sz="1400" dirty="0">
                     <a:latin typeface="+mn-lt"/>
                   </a:rPr>
-                  <a:t>2</a:t>
+                  <a:t>1</a:t>
                 </a:r>
               </a:p>
             </p:txBody>
@@ -28051,7 +26633,7 @@
                   <a:rPr lang="en-US" sz="1400" dirty="0">
                     <a:latin typeface="+mn-lt"/>
                   </a:rPr>
-                  <a:t>1</a:t>
+                  <a:t>0</a:t>
                 </a:r>
               </a:p>
             </p:txBody>
@@ -28063,92 +26645,6 @@
   <p:clrMapOvr>
     <a:masterClrMapping/>
   </p:clrMapOvr>
-  <p:timing>
-    <p:tnLst>
-      <p:par>
-        <p:cTn id="1" dur="indefinite" restart="never" nodeType="tmRoot">
-          <p:childTnLst>
-            <p:seq concurrent="1" nextAc="seek">
-              <p:cTn id="2" dur="indefinite" nodeType="mainSeq">
-                <p:childTnLst>
-                  <p:par>
-                    <p:cTn id="3" fill="hold">
-                      <p:stCondLst>
-                        <p:cond delay="indefinite"/>
-                        <p:cond evt="onBegin" delay="0">
-                          <p:tn val="2"/>
-                        </p:cond>
-                      </p:stCondLst>
-                      <p:childTnLst>
-                        <p:par>
-                          <p:cTn id="4" fill="hold">
-                            <p:stCondLst>
-                              <p:cond delay="0"/>
-                            </p:stCondLst>
-                            <p:childTnLst>
-                              <p:par>
-                                <p:cTn id="5" presetID="9" presetClass="entr" presetSubtype="0" fill="hold" nodeType="afterEffect">
-                                  <p:stCondLst>
-                                    <p:cond delay="0"/>
-                                  </p:stCondLst>
-                                  <p:childTnLst>
-                                    <p:set>
-                                      <p:cBhvr>
-                                        <p:cTn id="6" dur="1" fill="hold">
-                                          <p:stCondLst>
-                                            <p:cond delay="0"/>
-                                          </p:stCondLst>
-                                        </p:cTn>
-                                        <p:tgtEl>
-                                          <p:spTgt spid="162"/>
-                                        </p:tgtEl>
-                                        <p:attrNameLst>
-                                          <p:attrName>style.visibility</p:attrName>
-                                        </p:attrNameLst>
-                                      </p:cBhvr>
-                                      <p:to>
-                                        <p:strVal val="visible"/>
-                                      </p:to>
-                                    </p:set>
-                                    <p:animEffect transition="in" filter="dissolve">
-                                      <p:cBhvr>
-                                        <p:cTn id="7" dur="500"/>
-                                        <p:tgtEl>
-                                          <p:spTgt spid="162"/>
-                                        </p:tgtEl>
-                                      </p:cBhvr>
-                                    </p:animEffect>
-                                  </p:childTnLst>
-                                </p:cTn>
-                              </p:par>
-                            </p:childTnLst>
-                          </p:cTn>
-                        </p:par>
-                      </p:childTnLst>
-                    </p:cTn>
-                  </p:par>
-                </p:childTnLst>
-              </p:cTn>
-              <p:prevCondLst>
-                <p:cond evt="onPrev" delay="0">
-                  <p:tgtEl>
-                    <p:sldTgt/>
-                  </p:tgtEl>
-                </p:cond>
-              </p:prevCondLst>
-              <p:nextCondLst>
-                <p:cond evt="onNext" delay="0">
-                  <p:tgtEl>
-                    <p:sldTgt/>
-                  </p:tgtEl>
-                </p:cond>
-              </p:nextCondLst>
-            </p:seq>
-          </p:childTnLst>
-        </p:cTn>
-      </p:par>
-    </p:tnLst>
-  </p:timing>
 </p:sld>
 </file>
 

</xml_diff>